<commit_message>
Criando primeira versão em corona
</commit_message>
<xml_diff>
--- a/Modelagem do Game.pptx
+++ b/Modelagem do Game.pptx
@@ -6,6 +6,7 @@
   </p:sldMasterIdLst>
   <p:sldIdLst>
     <p:sldId id="256" r:id="rId2"/>
+    <p:sldId id="257" r:id="rId3"/>
   </p:sldIdLst>
   <p:sldSz cx="12192000" cy="6858000"/>
   <p:notesSz cx="6858000" cy="9144000"/>
@@ -2969,41 +2970,6 @@
           <a:chExt cx="0" cy="0"/>
         </a:xfrm>
       </p:grpSpPr>
-      <p:pic>
-        <p:nvPicPr>
-          <p:cNvPr id="5" name="Imagem 4"/>
-          <p:cNvPicPr>
-            <a:picLocks noChangeAspect="1"/>
-          </p:cNvPicPr>
-          <p:nvPr/>
-        </p:nvPicPr>
-        <p:blipFill rotWithShape="1">
-          <a:blip r:embed="rId2">
-            <a:extLst>
-              <a:ext uri="{28A0092B-C50C-407E-A947-70E740481C1C}">
-                <a14:useLocalDpi xmlns:a14="http://schemas.microsoft.com/office/drawing/2010/main" val="0"/>
-              </a:ext>
-            </a:extLst>
-          </a:blip>
-          <a:srcRect l="27741" t="15015" r="24343" b="15796"/>
-          <a:stretch/>
-        </p:blipFill>
-        <p:spPr>
-          <a:xfrm rot="16200000">
-            <a:off x="2463000" y="2537360"/>
-            <a:ext cx="2323071" cy="4744994"/>
-          </a:xfrm>
-          <a:prstGeom prst="rect">
-            <a:avLst/>
-          </a:prstGeom>
-          <a:noFill/>
-          <a:ln w="9525">
-            <a:solidFill>
-              <a:schemeClr val="accent1"/>
-            </a:solidFill>
-          </a:ln>
-        </p:spPr>
-      </p:pic>
       <p:grpSp>
         <p:nvGrpSpPr>
           <p:cNvPr id="4" name="Grupo 3"/>
@@ -3012,7 +2978,7 @@
         </p:nvGrpSpPr>
         <p:grpSpPr>
           <a:xfrm>
-            <a:off x="8590134" y="-201926"/>
+            <a:off x="9594899" y="-373580"/>
             <a:ext cx="2847975" cy="4888397"/>
             <a:chOff x="5756317" y="613620"/>
             <a:chExt cx="2847975" cy="4888397"/>
@@ -3033,7 +2999,7 @@
               <a:avLst/>
             </a:prstGeom>
             <a:blipFill dpi="0" rotWithShape="1">
-              <a:blip r:embed="rId3">
+              <a:blip r:embed="rId2">
                 <a:extLst>
                   <a:ext uri="{28A0092B-C50C-407E-A947-70E740481C1C}">
                     <a14:useLocalDpi xmlns:a14="http://schemas.microsoft.com/office/drawing/2010/main" val="0"/>
@@ -3235,108 +3201,173 @@
       </p:grpSp>
       <p:grpSp>
         <p:nvGrpSpPr>
-          <p:cNvPr id="6" name="Grupo 5"/>
+          <p:cNvPr id="21" name="Grupo 20"/>
           <p:cNvGrpSpPr/>
           <p:nvPr/>
         </p:nvGrpSpPr>
         <p:grpSpPr>
-          <a:xfrm rot="5400000">
-            <a:off x="2681519" y="-473698"/>
-            <a:ext cx="2847975" cy="4888397"/>
-            <a:chOff x="2909888" y="589686"/>
-            <a:chExt cx="2847975" cy="4888397"/>
+          <a:xfrm>
+            <a:off x="5385317" y="-69185"/>
+            <a:ext cx="4888397" cy="2847975"/>
+            <a:chOff x="1661308" y="546513"/>
+            <a:chExt cx="4888397" cy="2847975"/>
           </a:xfrm>
         </p:grpSpPr>
         <p:grpSp>
           <p:nvGrpSpPr>
-            <p:cNvPr id="3" name="Grupo 2"/>
+            <p:cNvPr id="20" name="Grupo 19"/>
             <p:cNvGrpSpPr/>
             <p:nvPr/>
           </p:nvGrpSpPr>
           <p:grpSpPr>
             <a:xfrm>
-              <a:off x="2909888" y="589686"/>
-              <a:ext cx="2847975" cy="4888397"/>
-              <a:chOff x="2909888" y="589686"/>
-              <a:chExt cx="2847975" cy="4888397"/>
+              <a:off x="1661308" y="546513"/>
+              <a:ext cx="4888397" cy="2847975"/>
+              <a:chOff x="1661308" y="546513"/>
+              <a:chExt cx="4888397" cy="2847975"/>
             </a:xfrm>
           </p:grpSpPr>
           <p:grpSp>
             <p:nvGrpSpPr>
-              <p:cNvPr id="2" name="Grupo 1"/>
+              <p:cNvPr id="19" name="Grupo 18"/>
               <p:cNvGrpSpPr/>
               <p:nvPr/>
             </p:nvGrpSpPr>
             <p:grpSpPr>
               <a:xfrm>
-                <a:off x="2909888" y="1186251"/>
-                <a:ext cx="2847975" cy="3698788"/>
-                <a:chOff x="2909888" y="1186251"/>
-                <a:chExt cx="2847975" cy="3698788"/>
+                <a:off x="1661308" y="546513"/>
+                <a:ext cx="4888397" cy="2847975"/>
+                <a:chOff x="1661308" y="546513"/>
+                <a:chExt cx="4888397" cy="2847975"/>
               </a:xfrm>
             </p:grpSpPr>
+            <p:grpSp>
+              <p:nvGrpSpPr>
+                <p:cNvPr id="2" name="Grupo 1"/>
+                <p:cNvGrpSpPr/>
+                <p:nvPr/>
+              </p:nvGrpSpPr>
+              <p:grpSpPr>
+                <a:xfrm rot="5400000">
+                  <a:off x="2679759" y="121107"/>
+                  <a:ext cx="2847975" cy="3698788"/>
+                  <a:chOff x="2909888" y="1186251"/>
+                  <a:chExt cx="2847975" cy="3698788"/>
+                </a:xfrm>
+              </p:grpSpPr>
+              <p:sp>
+                <p:nvSpPr>
+                  <p:cNvPr id="8" name="Retângulo 7"/>
+                  <p:cNvSpPr/>
+                  <p:nvPr/>
+                </p:nvSpPr>
+                <p:spPr>
+                  <a:xfrm>
+                    <a:off x="3286897" y="1186251"/>
+                    <a:ext cx="2092411" cy="3698788"/>
+                  </a:xfrm>
+                  <a:prstGeom prst="rect">
+                    <a:avLst/>
+                  </a:prstGeom>
+                  <a:solidFill>
+                    <a:schemeClr val="accent6"/>
+                  </a:solidFill>
+                  <a:ln w="12700">
+                    <a:solidFill>
+                      <a:schemeClr val="accent2"/>
+                    </a:solidFill>
+                  </a:ln>
+                </p:spPr>
+                <p:style>
+                  <a:lnRef idx="2">
+                    <a:schemeClr val="accent1">
+                      <a:shade val="50000"/>
+                    </a:schemeClr>
+                  </a:lnRef>
+                  <a:fillRef idx="1">
+                    <a:schemeClr val="accent1"/>
+                  </a:fillRef>
+                  <a:effectRef idx="0">
+                    <a:schemeClr val="accent1"/>
+                  </a:effectRef>
+                  <a:fontRef idx="minor">
+                    <a:schemeClr val="lt1"/>
+                  </a:fontRef>
+                </p:style>
+                <p:txBody>
+                  <a:bodyPr rtlCol="0" anchor="ctr"/>
+                  <a:lstStyle/>
+                  <a:p>
+                    <a:pPr algn="ctr"/>
+                    <a:endParaRPr lang="pt-BR"/>
+                  </a:p>
+                </p:txBody>
+              </p:sp>
+              <p:sp>
+                <p:nvSpPr>
+                  <p:cNvPr id="32" name="Menos 31"/>
+                  <p:cNvSpPr/>
+                  <p:nvPr/>
+                </p:nvSpPr>
+                <p:spPr>
+                  <a:xfrm>
+                    <a:off x="2909888" y="2891925"/>
+                    <a:ext cx="2847975" cy="280395"/>
+                  </a:xfrm>
+                  <a:prstGeom prst="mathMinus">
+                    <a:avLst>
+                      <a:gd name="adj1" fmla="val 24208"/>
+                    </a:avLst>
+                  </a:prstGeom>
+                  <a:solidFill>
+                    <a:schemeClr val="bg1"/>
+                  </a:solidFill>
+                  <a:ln>
+                    <a:noFill/>
+                  </a:ln>
+                </p:spPr>
+                <p:style>
+                  <a:lnRef idx="2">
+                    <a:schemeClr val="accent1">
+                      <a:shade val="50000"/>
+                    </a:schemeClr>
+                  </a:lnRef>
+                  <a:fillRef idx="1">
+                    <a:schemeClr val="accent1"/>
+                  </a:fillRef>
+                  <a:effectRef idx="0">
+                    <a:schemeClr val="accent1"/>
+                  </a:effectRef>
+                  <a:fontRef idx="minor">
+                    <a:schemeClr val="lt1"/>
+                  </a:fontRef>
+                </p:style>
+                <p:txBody>
+                  <a:bodyPr rtlCol="0" anchor="ctr"/>
+                  <a:lstStyle/>
+                  <a:p>
+                    <a:pPr algn="ctr"/>
+                    <a:endParaRPr lang="pt-BR"/>
+                  </a:p>
+                </p:txBody>
+              </p:sp>
+            </p:grpSp>
             <p:sp>
               <p:nvSpPr>
-                <p:cNvPr id="8" name="Retângulo 7"/>
+                <p:cNvPr id="33" name="Semicírculos 32"/>
                 <p:cNvSpPr/>
                 <p:nvPr/>
               </p:nvSpPr>
               <p:spPr>
-                <a:xfrm>
-                  <a:off x="3286897" y="1186251"/>
-                  <a:ext cx="2092411" cy="3698788"/>
+                <a:xfrm rot="5400000" flipV="1">
+                  <a:off x="5388744" y="1365189"/>
+                  <a:ext cx="1112317" cy="1209605"/>
                 </a:xfrm>
-                <a:prstGeom prst="rect">
-                  <a:avLst/>
-                </a:prstGeom>
-                <a:solidFill>
-                  <a:schemeClr val="accent6"/>
-                </a:solidFill>
-                <a:ln w="12700">
-                  <a:solidFill>
-                    <a:schemeClr val="accent2"/>
-                  </a:solidFill>
-                </a:ln>
-              </p:spPr>
-              <p:style>
-                <a:lnRef idx="2">
-                  <a:schemeClr val="accent1">
-                    <a:shade val="50000"/>
-                  </a:schemeClr>
-                </a:lnRef>
-                <a:fillRef idx="1">
-                  <a:schemeClr val="accent1"/>
-                </a:fillRef>
-                <a:effectRef idx="0">
-                  <a:schemeClr val="accent1"/>
-                </a:effectRef>
-                <a:fontRef idx="minor">
-                  <a:schemeClr val="lt1"/>
-                </a:fontRef>
-              </p:style>
-              <p:txBody>
-                <a:bodyPr rtlCol="0" anchor="ctr"/>
-                <a:lstStyle/>
-                <a:p>
-                  <a:pPr algn="ctr"/>
-                  <a:endParaRPr lang="pt-BR"/>
-                </a:p>
-              </p:txBody>
-            </p:sp>
-            <p:sp>
-              <p:nvSpPr>
-                <p:cNvPr id="32" name="Menos 31"/>
-                <p:cNvSpPr/>
-                <p:nvPr/>
-              </p:nvSpPr>
-              <p:spPr>
-                <a:xfrm>
-                  <a:off x="2909888" y="2891925"/>
-                  <a:ext cx="2847975" cy="280395"/>
-                </a:xfrm>
-                <a:prstGeom prst="mathMinus">
+                <a:prstGeom prst="blockArc">
                   <a:avLst>
-                    <a:gd name="adj1" fmla="val 24208"/>
+                    <a:gd name="adj1" fmla="val 10800000"/>
+                    <a:gd name="adj2" fmla="val 21584655"/>
+                    <a:gd name="adj3" fmla="val 7250"/>
                   </a:avLst>
                 </a:prstGeom>
                 <a:solidFill>
@@ -3367,34 +3398,735 @@
                 <a:lstStyle/>
                 <a:p>
                   <a:pPr algn="ctr"/>
-                  <a:endParaRPr lang="pt-BR"/>
+                  <a:endParaRPr lang="pt-BR">
+                    <a:solidFill>
+                      <a:schemeClr val="tx1"/>
+                    </a:solidFill>
+                  </a:endParaRPr>
+                </a:p>
+              </p:txBody>
+            </p:sp>
+            <p:sp>
+              <p:nvSpPr>
+                <p:cNvPr id="34" name="Semicírculos 33"/>
+                <p:cNvSpPr/>
+                <p:nvPr/>
+              </p:nvSpPr>
+              <p:spPr>
+                <a:xfrm rot="16200000" flipV="1">
+                  <a:off x="1709952" y="1368158"/>
+                  <a:ext cx="1112317" cy="1209605"/>
+                </a:xfrm>
+                <a:prstGeom prst="blockArc">
+                  <a:avLst>
+                    <a:gd name="adj1" fmla="val 10800000"/>
+                    <a:gd name="adj2" fmla="val 21584655"/>
+                    <a:gd name="adj3" fmla="val 7250"/>
+                  </a:avLst>
+                </a:prstGeom>
+                <a:solidFill>
+                  <a:schemeClr val="bg1"/>
+                </a:solidFill>
+                <a:ln>
+                  <a:noFill/>
+                </a:ln>
+              </p:spPr>
+              <p:style>
+                <a:lnRef idx="2">
+                  <a:schemeClr val="accent1">
+                    <a:shade val="50000"/>
+                  </a:schemeClr>
+                </a:lnRef>
+                <a:fillRef idx="1">
+                  <a:schemeClr val="accent1"/>
+                </a:fillRef>
+                <a:effectRef idx="0">
+                  <a:schemeClr val="accent1"/>
+                </a:effectRef>
+                <a:fontRef idx="minor">
+                  <a:schemeClr val="lt1"/>
+                </a:fontRef>
+              </p:style>
+              <p:txBody>
+                <a:bodyPr rtlCol="0" anchor="ctr"/>
+                <a:lstStyle/>
+                <a:p>
+                  <a:pPr algn="ctr"/>
+                  <a:endParaRPr lang="pt-BR">
+                    <a:solidFill>
+                      <a:schemeClr val="tx1"/>
+                    </a:solidFill>
+                  </a:endParaRPr>
                 </a:p>
               </p:txBody>
             </p:sp>
           </p:grpSp>
           <p:sp>
             <p:nvSpPr>
-              <p:cNvPr id="33" name="Semicírculos 32"/>
+              <p:cNvPr id="25" name="Elipse 24"/>
               <p:cNvSpPr/>
               <p:nvPr/>
             </p:nvSpPr>
             <p:spPr>
-              <a:xfrm flipV="1">
-                <a:off x="3777208" y="589686"/>
-                <a:ext cx="1112317" cy="1209605"/>
+              <a:xfrm rot="5400000">
+                <a:off x="4596076" y="2251728"/>
+                <a:ext cx="432000" cy="432000"/>
               </a:xfrm>
-              <a:prstGeom prst="blockArc">
-                <a:avLst>
-                  <a:gd name="adj1" fmla="val 10800000"/>
-                  <a:gd name="adj2" fmla="val 21584655"/>
-                  <a:gd name="adj3" fmla="val 7250"/>
-                </a:avLst>
+              <a:prstGeom prst="ellipse">
+                <a:avLst/>
+              </a:prstGeom>
+              <a:ln>
+                <a:noFill/>
+              </a:ln>
+              <a:scene3d>
+                <a:camera prst="orthographicFront"/>
+                <a:lightRig rig="threePt" dir="t"/>
+              </a:scene3d>
+              <a:sp3d>
+                <a:bevelT w="114300" prst="hardEdge"/>
+              </a:sp3d>
+            </p:spPr>
+            <p:style>
+              <a:lnRef idx="2">
+                <a:schemeClr val="accent1">
+                  <a:shade val="50000"/>
+                </a:schemeClr>
+              </a:lnRef>
+              <a:fillRef idx="1">
+                <a:schemeClr val="accent1"/>
+              </a:fillRef>
+              <a:effectRef idx="0">
+                <a:schemeClr val="accent1"/>
+              </a:effectRef>
+              <a:fontRef idx="minor">
+                <a:schemeClr val="lt1"/>
+              </a:fontRef>
+            </p:style>
+            <p:txBody>
+              <a:bodyPr rtlCol="0" anchor="ctr"/>
+              <a:lstStyle/>
+              <a:p>
+                <a:pPr algn="ctr"/>
+                <a:endParaRPr lang="pt-BR"/>
+              </a:p>
+            </p:txBody>
+          </p:sp>
+          <p:sp>
+            <p:nvSpPr>
+              <p:cNvPr id="26" name="Elipse 25"/>
+              <p:cNvSpPr/>
+              <p:nvPr/>
+            </p:nvSpPr>
+            <p:spPr>
+              <a:xfrm rot="5400000">
+                <a:off x="2953195" y="1197833"/>
+                <a:ext cx="432000" cy="432000"/>
+              </a:xfrm>
+              <a:prstGeom prst="ellipse">
+                <a:avLst/>
+              </a:prstGeom>
+              <a:solidFill>
+                <a:schemeClr val="accent2"/>
+              </a:solidFill>
+              <a:ln>
+                <a:noFill/>
+              </a:ln>
+              <a:scene3d>
+                <a:camera prst="orthographicFront"/>
+                <a:lightRig rig="threePt" dir="t"/>
+              </a:scene3d>
+              <a:sp3d>
+                <a:bevelT w="114300" prst="hardEdge"/>
+              </a:sp3d>
+            </p:spPr>
+            <p:style>
+              <a:lnRef idx="2">
+                <a:schemeClr val="accent1">
+                  <a:shade val="50000"/>
+                </a:schemeClr>
+              </a:lnRef>
+              <a:fillRef idx="1">
+                <a:schemeClr val="accent1"/>
+              </a:fillRef>
+              <a:effectRef idx="0">
+                <a:schemeClr val="accent1"/>
+              </a:effectRef>
+              <a:fontRef idx="minor">
+                <a:schemeClr val="lt1"/>
+              </a:fontRef>
+            </p:style>
+            <p:txBody>
+              <a:bodyPr rtlCol="0" anchor="ctr"/>
+              <a:lstStyle/>
+              <a:p>
+                <a:pPr algn="ctr"/>
+                <a:endParaRPr lang="pt-BR"/>
+              </a:p>
+            </p:txBody>
+          </p:sp>
+          <p:sp>
+            <p:nvSpPr>
+              <p:cNvPr id="24" name="Elipse 23"/>
+              <p:cNvSpPr/>
+              <p:nvPr/>
+            </p:nvSpPr>
+            <p:spPr>
+              <a:xfrm rot="5400000">
+                <a:off x="3668789" y="1871287"/>
+                <a:ext cx="216000" cy="216000"/>
+              </a:xfrm>
+              <a:prstGeom prst="ellipse">
+                <a:avLst/>
+              </a:prstGeom>
+              <a:solidFill>
+                <a:schemeClr val="tx1"/>
+              </a:solidFill>
+              <a:ln>
+                <a:solidFill>
+                  <a:schemeClr val="tx1"/>
+                </a:solidFill>
+              </a:ln>
+              <a:effectLst/>
+              <a:scene3d>
+                <a:camera prst="orthographicFront">
+                  <a:rot lat="0" lon="0" rev="0"/>
+                </a:camera>
+                <a:lightRig rig="contrasting" dir="t">
+                  <a:rot lat="0" lon="0" rev="7800000"/>
+                </a:lightRig>
+              </a:scene3d>
+              <a:sp3d>
+                <a:bevelT w="139700" h="139700" prst="angle"/>
+              </a:sp3d>
+            </p:spPr>
+            <p:style>
+              <a:lnRef idx="2">
+                <a:schemeClr val="dk1">
+                  <a:shade val="50000"/>
+                </a:schemeClr>
+              </a:lnRef>
+              <a:fillRef idx="1">
+                <a:schemeClr val="dk1"/>
+              </a:fillRef>
+              <a:effectRef idx="0">
+                <a:schemeClr val="dk1"/>
+              </a:effectRef>
+              <a:fontRef idx="minor">
+                <a:schemeClr val="lt1"/>
+              </a:fontRef>
+            </p:style>
+            <p:txBody>
+              <a:bodyPr rtlCol="0" anchor="ctr"/>
+              <a:lstStyle/>
+              <a:p>
+                <a:pPr algn="ctr"/>
+                <a:endParaRPr lang="pt-BR"/>
+              </a:p>
+            </p:txBody>
+          </p:sp>
+        </p:grpSp>
+        <p:grpSp>
+          <p:nvGrpSpPr>
+            <p:cNvPr id="18" name="Grupo 17"/>
+            <p:cNvGrpSpPr/>
+            <p:nvPr/>
+          </p:nvGrpSpPr>
+          <p:grpSpPr>
+            <a:xfrm>
+              <a:off x="3519138" y="958324"/>
+              <a:ext cx="2433110" cy="1779404"/>
+              <a:chOff x="3519138" y="958324"/>
+              <a:chExt cx="2433110" cy="1779404"/>
+            </a:xfrm>
+          </p:grpSpPr>
+          <p:grpSp>
+            <p:nvGrpSpPr>
+              <p:cNvPr id="12" name="Grupo 11"/>
+              <p:cNvGrpSpPr/>
+              <p:nvPr/>
+            </p:nvGrpSpPr>
+            <p:grpSpPr>
+              <a:xfrm>
+                <a:off x="3740233" y="963215"/>
+                <a:ext cx="730282" cy="288000"/>
+                <a:chOff x="3740233" y="963215"/>
+                <a:chExt cx="730282" cy="288000"/>
+              </a:xfrm>
+            </p:grpSpPr>
+            <p:sp>
+              <p:nvSpPr>
+                <p:cNvPr id="10" name="Heptágono 9"/>
+                <p:cNvSpPr/>
+                <p:nvPr/>
+              </p:nvSpPr>
+              <p:spPr>
+                <a:xfrm>
+                  <a:off x="4182515" y="963215"/>
+                  <a:ext cx="288000" cy="288000"/>
+                </a:xfrm>
+                <a:prstGeom prst="heptagon">
+                  <a:avLst/>
+                </a:prstGeom>
+                <a:noFill/>
+                <a:ln>
+                  <a:noFill/>
+                </a:ln>
+                <a:effectLst/>
+                <a:scene3d>
+                  <a:camera prst="orthographicFront">
+                    <a:rot lat="0" lon="0" rev="0"/>
+                  </a:camera>
+                  <a:lightRig rig="chilly" dir="t">
+                    <a:rot lat="0" lon="0" rev="18480000"/>
+                  </a:lightRig>
+                </a:scene3d>
+                <a:sp3d prstMaterial="clear">
+                  <a:bevelT h="63500" prst="softRound"/>
+                </a:sp3d>
+              </p:spPr>
+              <p:style>
+                <a:lnRef idx="2">
+                  <a:schemeClr val="accent6"/>
+                </a:lnRef>
+                <a:fillRef idx="1">
+                  <a:schemeClr val="lt1"/>
+                </a:fillRef>
+                <a:effectRef idx="0">
+                  <a:schemeClr val="accent6"/>
+                </a:effectRef>
+                <a:fontRef idx="minor">
+                  <a:schemeClr val="dk1"/>
+                </a:fontRef>
+              </p:style>
+              <p:txBody>
+                <a:bodyPr rtlCol="0" anchor="ctr"/>
+                <a:lstStyle/>
+                <a:p>
+                  <a:pPr algn="ctr"/>
+                  <a:r>
+                    <a:rPr lang="pt-BR" sz="1600" dirty="0" smtClean="0">
+                      <a:solidFill>
+                        <a:schemeClr val="bg1"/>
+                      </a:solidFill>
+                      <a:latin typeface="Bauhaus 93" panose="04030905020B02020C02" pitchFamily="82" charset="0"/>
+                    </a:rPr>
+                    <a:t>2</a:t>
+                  </a:r>
+                  <a:endParaRPr lang="pt-BR" sz="1600" dirty="0">
+                    <a:solidFill>
+                      <a:schemeClr val="bg1"/>
+                    </a:solidFill>
+                    <a:latin typeface="Bauhaus 93" panose="04030905020B02020C02" pitchFamily="82" charset="0"/>
+                  </a:endParaRPr>
+                </a:p>
+              </p:txBody>
+            </p:sp>
+            <p:sp>
+              <p:nvSpPr>
+                <p:cNvPr id="29" name="Heptágono 28"/>
+                <p:cNvSpPr/>
+                <p:nvPr/>
+              </p:nvSpPr>
+              <p:spPr>
+                <a:xfrm>
+                  <a:off x="3740233" y="963215"/>
+                  <a:ext cx="288000" cy="288000"/>
+                </a:xfrm>
+                <a:prstGeom prst="heptagon">
+                  <a:avLst/>
+                </a:prstGeom>
+                <a:noFill/>
+                <a:ln>
+                  <a:noFill/>
+                </a:ln>
+                <a:effectLst/>
+                <a:scene3d>
+                  <a:camera prst="orthographicFront">
+                    <a:rot lat="0" lon="0" rev="0"/>
+                  </a:camera>
+                  <a:lightRig rig="chilly" dir="t">
+                    <a:rot lat="0" lon="0" rev="18480000"/>
+                  </a:lightRig>
+                </a:scene3d>
+                <a:sp3d prstMaterial="clear">
+                  <a:bevelT h="63500" prst="softRound"/>
+                </a:sp3d>
+              </p:spPr>
+              <p:style>
+                <a:lnRef idx="2">
+                  <a:schemeClr val="accent6"/>
+                </a:lnRef>
+                <a:fillRef idx="1">
+                  <a:schemeClr val="lt1"/>
+                </a:fillRef>
+                <a:effectRef idx="0">
+                  <a:schemeClr val="accent6"/>
+                </a:effectRef>
+                <a:fontRef idx="minor">
+                  <a:schemeClr val="dk1"/>
+                </a:fontRef>
+              </p:style>
+              <p:txBody>
+                <a:bodyPr rtlCol="0" anchor="ctr"/>
+                <a:lstStyle/>
+                <a:p>
+                  <a:pPr algn="ctr"/>
+                  <a:r>
+                    <a:rPr lang="pt-BR" sz="1600" dirty="0" smtClean="0">
+                      <a:solidFill>
+                        <a:schemeClr val="bg1"/>
+                      </a:solidFill>
+                      <a:latin typeface="Bauhaus 93" panose="04030905020B02020C02" pitchFamily="82" charset="0"/>
+                    </a:rPr>
+                    <a:t>3</a:t>
+                  </a:r>
+                  <a:endParaRPr lang="pt-BR" sz="1600" dirty="0">
+                    <a:solidFill>
+                      <a:schemeClr val="bg1"/>
+                    </a:solidFill>
+                    <a:latin typeface="Bauhaus 93" panose="04030905020B02020C02" pitchFamily="82" charset="0"/>
+                  </a:endParaRPr>
+                </a:p>
+              </p:txBody>
+            </p:sp>
+          </p:grpSp>
+          <p:sp>
+            <p:nvSpPr>
+              <p:cNvPr id="13" name="Mais 12"/>
+              <p:cNvSpPr/>
+              <p:nvPr/>
+            </p:nvSpPr>
+            <p:spPr>
+              <a:xfrm>
+                <a:off x="4484549" y="963215"/>
+                <a:ext cx="180000" cy="180000"/>
+              </a:xfrm>
+              <a:prstGeom prst="mathPlus">
+                <a:avLst/>
               </a:prstGeom>
               <a:solidFill>
                 <a:schemeClr val="bg1"/>
               </a:solidFill>
               <a:ln>
+                <a:solidFill>
+                  <a:schemeClr val="tx2"/>
+                </a:solidFill>
+              </a:ln>
+              <a:effectLst/>
+              <a:scene3d>
+                <a:camera prst="orthographicFront">
+                  <a:rot lat="0" lon="0" rev="0"/>
+                </a:camera>
+                <a:lightRig rig="chilly" dir="t">
+                  <a:rot lat="0" lon="0" rev="18480000"/>
+                </a:lightRig>
+              </a:scene3d>
+              <a:sp3d prstMaterial="clear">
+                <a:bevelT h="63500"/>
+              </a:sp3d>
+            </p:spPr>
+            <p:style>
+              <a:lnRef idx="2">
+                <a:schemeClr val="accent1">
+                  <a:shade val="50000"/>
+                </a:schemeClr>
+              </a:lnRef>
+              <a:fillRef idx="1">
+                <a:schemeClr val="accent1"/>
+              </a:fillRef>
+              <a:effectRef idx="0">
+                <a:schemeClr val="accent1"/>
+              </a:effectRef>
+              <a:fontRef idx="minor">
+                <a:schemeClr val="lt1"/>
+              </a:fontRef>
+            </p:style>
+            <p:txBody>
+              <a:bodyPr rtlCol="0" anchor="ctr"/>
+              <a:lstStyle/>
+              <a:p>
+                <a:pPr algn="ctr"/>
+                <a:endParaRPr lang="pt-BR"/>
+              </a:p>
+            </p:txBody>
+          </p:sp>
+          <p:sp>
+            <p:nvSpPr>
+              <p:cNvPr id="30" name="Mais 29"/>
+              <p:cNvSpPr/>
+              <p:nvPr/>
+            </p:nvSpPr>
+            <p:spPr>
+              <a:xfrm>
+                <a:off x="4678583" y="963215"/>
+                <a:ext cx="180000" cy="180000"/>
+              </a:xfrm>
+              <a:prstGeom prst="mathPlus">
+                <a:avLst/>
+              </a:prstGeom>
+              <a:solidFill>
+                <a:schemeClr val="bg1"/>
+              </a:solidFill>
+              <a:ln>
+                <a:solidFill>
+                  <a:schemeClr val="tx2"/>
+                </a:solidFill>
+              </a:ln>
+              <a:effectLst/>
+              <a:scene3d>
+                <a:camera prst="orthographicFront">
+                  <a:rot lat="0" lon="0" rev="0"/>
+                </a:camera>
+                <a:lightRig rig="chilly" dir="t">
+                  <a:rot lat="0" lon="0" rev="18480000"/>
+                </a:lightRig>
+              </a:scene3d>
+              <a:sp3d prstMaterial="clear">
+                <a:bevelT h="63500"/>
+              </a:sp3d>
+            </p:spPr>
+            <p:style>
+              <a:lnRef idx="2">
+                <a:schemeClr val="accent1">
+                  <a:shade val="50000"/>
+                </a:schemeClr>
+              </a:lnRef>
+              <a:fillRef idx="1">
+                <a:schemeClr val="accent1"/>
+              </a:fillRef>
+              <a:effectRef idx="0">
+                <a:schemeClr val="accent1"/>
+              </a:effectRef>
+              <a:fontRef idx="minor">
+                <a:schemeClr val="lt1"/>
+              </a:fontRef>
+            </p:style>
+            <p:txBody>
+              <a:bodyPr rtlCol="0" anchor="ctr"/>
+              <a:lstStyle/>
+              <a:p>
+                <a:pPr algn="ctr"/>
+                <a:endParaRPr lang="pt-BR"/>
+              </a:p>
+            </p:txBody>
+          </p:sp>
+          <p:sp>
+            <p:nvSpPr>
+              <p:cNvPr id="31" name="Mais 30"/>
+              <p:cNvSpPr/>
+              <p:nvPr/>
+            </p:nvSpPr>
+            <p:spPr>
+              <a:xfrm>
+                <a:off x="3546199" y="958324"/>
+                <a:ext cx="180000" cy="180000"/>
+              </a:xfrm>
+              <a:prstGeom prst="mathPlus">
+                <a:avLst/>
+              </a:prstGeom>
+              <a:solidFill>
+                <a:schemeClr val="bg1"/>
+              </a:solidFill>
+              <a:ln>
+                <a:solidFill>
+                  <a:schemeClr val="tx2"/>
+                </a:solidFill>
+              </a:ln>
+              <a:effectLst/>
+              <a:scene3d>
+                <a:camera prst="orthographicFront">
+                  <a:rot lat="0" lon="0" rev="0"/>
+                </a:camera>
+                <a:lightRig rig="chilly" dir="t">
+                  <a:rot lat="0" lon="0" rev="18480000"/>
+                </a:lightRig>
+              </a:scene3d>
+              <a:sp3d prstMaterial="clear">
+                <a:bevelT h="63500"/>
+              </a:sp3d>
+            </p:spPr>
+            <p:style>
+              <a:lnRef idx="2">
+                <a:schemeClr val="accent1">
+                  <a:shade val="50000"/>
+                </a:schemeClr>
+              </a:lnRef>
+              <a:fillRef idx="1">
+                <a:schemeClr val="accent1"/>
+              </a:fillRef>
+              <a:effectRef idx="0">
+                <a:schemeClr val="accent1"/>
+              </a:effectRef>
+              <a:fontRef idx="minor">
+                <a:schemeClr val="lt1"/>
+              </a:fontRef>
+            </p:style>
+            <p:txBody>
+              <a:bodyPr rtlCol="0" anchor="ctr"/>
+              <a:lstStyle/>
+              <a:p>
+                <a:pPr algn="ctr"/>
+                <a:endParaRPr lang="pt-BR"/>
+              </a:p>
+            </p:txBody>
+          </p:sp>
+          <p:sp>
+            <p:nvSpPr>
+              <p:cNvPr id="36" name="Rosto feliz 35"/>
+              <p:cNvSpPr/>
+              <p:nvPr/>
+            </p:nvSpPr>
+            <p:spPr>
+              <a:xfrm>
+                <a:off x="3519138" y="2629728"/>
+                <a:ext cx="108000" cy="108000"/>
+              </a:xfrm>
+              <a:prstGeom prst="smileyFace">
+                <a:avLst/>
+              </a:prstGeom>
+              <a:solidFill>
+                <a:srgbClr val="FF0000"/>
+              </a:solidFill>
+              <a:ln>
                 <a:noFill/>
+              </a:ln>
+              <a:effectLst>
+                <a:outerShdw blurRad="50800" dist="38100" dir="10800000" algn="r" rotWithShape="0">
+                  <a:prstClr val="black">
+                    <a:alpha val="40000"/>
+                  </a:prstClr>
+                </a:outerShdw>
+              </a:effectLst>
+              <a:scene3d>
+                <a:camera prst="orthographicFront">
+                  <a:rot lat="0" lon="0" rev="0"/>
+                </a:camera>
+                <a:lightRig rig="chilly" dir="t">
+                  <a:rot lat="0" lon="0" rev="18480000"/>
+                </a:lightRig>
+              </a:scene3d>
+              <a:sp3d prstMaterial="clear">
+                <a:bevelT h="63500" prst="softRound"/>
+              </a:sp3d>
+            </p:spPr>
+            <p:style>
+              <a:lnRef idx="2">
+                <a:schemeClr val="accent1">
+                  <a:shade val="50000"/>
+                </a:schemeClr>
+              </a:lnRef>
+              <a:fillRef idx="1">
+                <a:schemeClr val="accent1"/>
+              </a:fillRef>
+              <a:effectRef idx="0">
+                <a:schemeClr val="accent1"/>
+              </a:effectRef>
+              <a:fontRef idx="minor">
+                <a:schemeClr val="lt1"/>
+              </a:fontRef>
+            </p:style>
+            <p:txBody>
+              <a:bodyPr rtlCol="0" anchor="ctr"/>
+              <a:lstStyle/>
+              <a:p>
+                <a:pPr algn="ctr"/>
+                <a:endParaRPr lang="pt-BR" dirty="0">
+                  <a:solidFill>
+                    <a:schemeClr val="tx1"/>
+                  </a:solidFill>
+                </a:endParaRPr>
+              </a:p>
+            </p:txBody>
+          </p:sp>
+          <p:sp>
+            <p:nvSpPr>
+              <p:cNvPr id="37" name="Rosto feliz 36"/>
+              <p:cNvSpPr/>
+              <p:nvPr/>
+            </p:nvSpPr>
+            <p:spPr>
+              <a:xfrm>
+                <a:off x="4920076" y="1440898"/>
+                <a:ext cx="108000" cy="108000"/>
+              </a:xfrm>
+              <a:prstGeom prst="smileyFace">
+                <a:avLst/>
+              </a:prstGeom>
+              <a:solidFill>
+                <a:schemeClr val="accent1"/>
+              </a:solidFill>
+              <a:ln>
+                <a:noFill/>
+              </a:ln>
+              <a:effectLst>
+                <a:outerShdw blurRad="50800" dist="38100" dir="10800000" algn="r" rotWithShape="0">
+                  <a:prstClr val="black">
+                    <a:alpha val="40000"/>
+                  </a:prstClr>
+                </a:outerShdw>
+              </a:effectLst>
+              <a:scene3d>
+                <a:camera prst="orthographicFront">
+                  <a:rot lat="0" lon="0" rev="0"/>
+                </a:camera>
+                <a:lightRig rig="chilly" dir="t">
+                  <a:rot lat="0" lon="0" rev="18480000"/>
+                </a:lightRig>
+              </a:scene3d>
+              <a:sp3d prstMaterial="clear">
+                <a:bevelT h="63500" prst="softRound"/>
+              </a:sp3d>
+            </p:spPr>
+            <p:style>
+              <a:lnRef idx="2">
+                <a:schemeClr val="accent1">
+                  <a:shade val="50000"/>
+                </a:schemeClr>
+              </a:lnRef>
+              <a:fillRef idx="1">
+                <a:schemeClr val="accent1"/>
+              </a:fillRef>
+              <a:effectRef idx="0">
+                <a:schemeClr val="accent1"/>
+              </a:effectRef>
+              <a:fontRef idx="minor">
+                <a:schemeClr val="lt1"/>
+              </a:fontRef>
+            </p:style>
+            <p:txBody>
+              <a:bodyPr rtlCol="0" anchor="ctr"/>
+              <a:lstStyle/>
+              <a:p>
+                <a:pPr algn="ctr"/>
+                <a:endParaRPr lang="pt-BR" dirty="0">
+                  <a:solidFill>
+                    <a:schemeClr val="tx1"/>
+                  </a:solidFill>
+                </a:endParaRPr>
+              </a:p>
+            </p:txBody>
+          </p:sp>
+          <p:sp>
+            <p:nvSpPr>
+              <p:cNvPr id="38" name="Retângulo 37"/>
+              <p:cNvSpPr/>
+              <p:nvPr/>
+            </p:nvSpPr>
+            <p:spPr>
+              <a:xfrm>
+                <a:off x="5952248" y="1731673"/>
+                <a:ext cx="0" cy="482574"/>
+              </a:xfrm>
+              <a:prstGeom prst="rect">
+                <a:avLst/>
+              </a:prstGeom>
+              <a:solidFill>
+                <a:schemeClr val="tx1"/>
+              </a:solidFill>
+              <a:ln>
+                <a:solidFill>
+                  <a:schemeClr val="tx1"/>
+                </a:solidFill>
               </a:ln>
             </p:spPr>
             <p:style>
@@ -3418,93 +4150,33 @@
               <a:lstStyle/>
               <a:p>
                 <a:pPr algn="ctr"/>
-                <a:endParaRPr lang="pt-BR">
-                  <a:solidFill>
-                    <a:schemeClr val="tx1"/>
-                  </a:solidFill>
-                </a:endParaRPr>
-              </a:p>
-            </p:txBody>
-          </p:sp>
-          <p:sp>
-            <p:nvSpPr>
-              <p:cNvPr id="34" name="Semicírculos 33"/>
-              <p:cNvSpPr/>
-              <p:nvPr/>
-            </p:nvSpPr>
-            <p:spPr>
-              <a:xfrm rot="10800000" flipV="1">
-                <a:off x="3780177" y="4268478"/>
-                <a:ext cx="1112317" cy="1209605"/>
-              </a:xfrm>
-              <a:prstGeom prst="blockArc">
-                <a:avLst>
-                  <a:gd name="adj1" fmla="val 10800000"/>
-                  <a:gd name="adj2" fmla="val 21584655"/>
-                  <a:gd name="adj3" fmla="val 7250"/>
-                </a:avLst>
-              </a:prstGeom>
-              <a:solidFill>
-                <a:schemeClr val="bg1"/>
-              </a:solidFill>
-              <a:ln>
-                <a:noFill/>
-              </a:ln>
-            </p:spPr>
-            <p:style>
-              <a:lnRef idx="2">
-                <a:schemeClr val="accent1">
-                  <a:shade val="50000"/>
-                </a:schemeClr>
-              </a:lnRef>
-              <a:fillRef idx="1">
-                <a:schemeClr val="accent1"/>
-              </a:fillRef>
-              <a:effectRef idx="0">
-                <a:schemeClr val="accent1"/>
-              </a:effectRef>
-              <a:fontRef idx="minor">
-                <a:schemeClr val="lt1"/>
-              </a:fontRef>
-            </p:style>
-            <p:txBody>
-              <a:bodyPr rtlCol="0" anchor="ctr"/>
-              <a:lstStyle/>
-              <a:p>
-                <a:pPr algn="ctr"/>
-                <a:endParaRPr lang="pt-BR">
-                  <a:solidFill>
-                    <a:schemeClr val="tx1"/>
-                  </a:solidFill>
-                </a:endParaRPr>
+                <a:endParaRPr lang="pt-BR"/>
               </a:p>
             </p:txBody>
           </p:sp>
         </p:grpSp>
         <p:sp>
           <p:nvSpPr>
-            <p:cNvPr id="25" name="Elipse 24"/>
+            <p:cNvPr id="39" name="Retângulo 38"/>
             <p:cNvSpPr/>
             <p:nvPr/>
           </p:nvSpPr>
           <p:spPr>
             <a:xfrm>
-              <a:off x="4615103" y="2111315"/>
-              <a:ext cx="432000" cy="432000"/>
+              <a:off x="2255672" y="1757249"/>
+              <a:ext cx="0" cy="482574"/>
             </a:xfrm>
-            <a:prstGeom prst="ellipse">
+            <a:prstGeom prst="rect">
               <a:avLst/>
             </a:prstGeom>
+            <a:solidFill>
+              <a:schemeClr val="tx1"/>
+            </a:solidFill>
             <a:ln>
-              <a:noFill/>
+              <a:solidFill>
+                <a:schemeClr val="tx1"/>
+              </a:solidFill>
             </a:ln>
-            <a:scene3d>
-              <a:camera prst="orthographicFront"/>
-              <a:lightRig rig="threePt" dir="t"/>
-            </a:scene3d>
-            <a:sp3d>
-              <a:bevelT w="114300" prst="hardEdge"/>
-            </a:sp3d>
           </p:spPr>
           <p:style>
             <a:lnRef idx="2">
@@ -3531,180 +4203,918 @@
             </a:p>
           </p:txBody>
         </p:sp>
-        <p:sp>
-          <p:nvSpPr>
-            <p:cNvPr id="26" name="Elipse 25"/>
-            <p:cNvSpPr/>
+      </p:grpSp>
+      <p:grpSp>
+        <p:nvGrpSpPr>
+          <p:cNvPr id="77" name="Grupo 76"/>
+          <p:cNvGrpSpPr/>
+          <p:nvPr/>
+        </p:nvGrpSpPr>
+        <p:grpSpPr>
+          <a:xfrm>
+            <a:off x="-446775" y="2481424"/>
+            <a:ext cx="8907776" cy="4150953"/>
+            <a:chOff x="-446775" y="2481424"/>
+            <a:chExt cx="8907776" cy="4150953"/>
+          </a:xfrm>
+        </p:grpSpPr>
+        <p:grpSp>
+          <p:nvGrpSpPr>
+            <p:cNvPr id="41" name="Grupo 40"/>
+            <p:cNvGrpSpPr/>
             <p:nvPr/>
-          </p:nvSpPr>
+          </p:nvGrpSpPr>
+          <p:grpSpPr>
+            <a:xfrm>
+              <a:off x="1730316" y="3779819"/>
+              <a:ext cx="4744994" cy="2323071"/>
+              <a:chOff x="1275525" y="3668800"/>
+              <a:chExt cx="4744994" cy="2323071"/>
+            </a:xfrm>
+          </p:grpSpPr>
+          <p:pic>
+            <p:nvPicPr>
+              <p:cNvPr id="5" name="Imagem 4"/>
+              <p:cNvPicPr>
+                <a:picLocks noChangeAspect="1"/>
+              </p:cNvPicPr>
+              <p:nvPr/>
+            </p:nvPicPr>
+            <p:blipFill rotWithShape="1">
+              <a:blip r:embed="rId3">
+                <a:extLst>
+                  <a:ext uri="{28A0092B-C50C-407E-A947-70E740481C1C}">
+                    <a14:useLocalDpi xmlns:a14="http://schemas.microsoft.com/office/drawing/2010/main" val="0"/>
+                  </a:ext>
+                </a:extLst>
+              </a:blip>
+              <a:srcRect l="27741" t="15015" r="24343" b="15796"/>
+              <a:stretch/>
+            </p:blipFill>
+            <p:spPr>
+              <a:xfrm rot="16200000">
+                <a:off x="2486486" y="2457839"/>
+                <a:ext cx="2323071" cy="4744994"/>
+              </a:xfrm>
+              <a:prstGeom prst="rect">
+                <a:avLst/>
+              </a:prstGeom>
+              <a:noFill/>
+              <a:ln w="9525">
+                <a:noFill/>
+              </a:ln>
+            </p:spPr>
+          </p:pic>
+          <p:sp>
+            <p:nvSpPr>
+              <p:cNvPr id="7" name="Retângulo 6"/>
+              <p:cNvSpPr/>
+              <p:nvPr/>
+            </p:nvSpPr>
+            <p:spPr>
+              <a:xfrm>
+                <a:off x="1842762" y="3779598"/>
+                <a:ext cx="3679200" cy="2073600"/>
+              </a:xfrm>
+              <a:prstGeom prst="rect">
+                <a:avLst/>
+              </a:prstGeom>
+              <a:blipFill dpi="0" rotWithShape="1">
+                <a:blip r:embed="rId4">
+                  <a:extLst>
+                    <a:ext uri="{28A0092B-C50C-407E-A947-70E740481C1C}">
+                      <a14:useLocalDpi xmlns:a14="http://schemas.microsoft.com/office/drawing/2010/main" val="0"/>
+                    </a:ext>
+                  </a:extLst>
+                </a:blip>
+                <a:srcRect/>
+                <a:stretch>
+                  <a:fillRect/>
+                </a:stretch>
+              </a:blipFill>
+              <a:ln>
+                <a:noFill/>
+              </a:ln>
+            </p:spPr>
+            <p:style>
+              <a:lnRef idx="2">
+                <a:schemeClr val="accent1">
+                  <a:shade val="50000"/>
+                </a:schemeClr>
+              </a:lnRef>
+              <a:fillRef idx="1">
+                <a:schemeClr val="accent1"/>
+              </a:fillRef>
+              <a:effectRef idx="0">
+                <a:schemeClr val="accent1"/>
+              </a:effectRef>
+              <a:fontRef idx="minor">
+                <a:schemeClr val="lt1"/>
+              </a:fontRef>
+            </p:style>
+            <p:txBody>
+              <a:bodyPr rtlCol="0" anchor="ctr"/>
+              <a:lstStyle/>
+              <a:p>
+                <a:pPr algn="ctr"/>
+                <a:endParaRPr lang="pt-BR"/>
+              </a:p>
+            </p:txBody>
+          </p:sp>
+        </p:grpSp>
+        <p:cxnSp>
+          <p:nvCxnSpPr>
+            <p:cNvPr id="43" name="Conector angulado 42"/>
+            <p:cNvCxnSpPr/>
+            <p:nvPr/>
+          </p:nvCxnSpPr>
+          <p:spPr>
+            <a:xfrm rot="16200000" flipV="1">
+              <a:off x="1845277" y="3080951"/>
+              <a:ext cx="1540475" cy="1013255"/>
+            </a:xfrm>
+            <a:prstGeom prst="bentConnector3">
+              <a:avLst/>
+            </a:prstGeom>
+            <a:ln>
+              <a:solidFill>
+                <a:srgbClr val="FF0000"/>
+              </a:solidFill>
+              <a:tailEnd type="triangle"/>
+            </a:ln>
+          </p:spPr>
+          <p:style>
+            <a:lnRef idx="1">
+              <a:schemeClr val="dk1"/>
+            </a:lnRef>
+            <a:fillRef idx="0">
+              <a:schemeClr val="dk1"/>
+            </a:fillRef>
+            <a:effectRef idx="0">
+              <a:schemeClr val="dk1"/>
+            </a:effectRef>
+            <a:fontRef idx="minor">
+              <a:schemeClr val="tx1"/>
+            </a:fontRef>
+          </p:style>
+        </p:cxnSp>
+        <p:cxnSp>
+          <p:nvCxnSpPr>
+            <p:cNvPr id="45" name="Conector angulado 44"/>
+            <p:cNvCxnSpPr/>
+            <p:nvPr/>
+          </p:nvCxnSpPr>
           <p:spPr>
             <a:xfrm>
-              <a:off x="3561208" y="3754196"/>
-              <a:ext cx="432000" cy="432000"/>
+              <a:off x="4859038" y="5511114"/>
+              <a:ext cx="1712962" cy="955589"/>
             </a:xfrm>
-            <a:prstGeom prst="ellipse">
+            <a:prstGeom prst="bentConnector3">
               <a:avLst/>
             </a:prstGeom>
-            <a:solidFill>
-              <a:schemeClr val="accent2"/>
-            </a:solidFill>
             <a:ln>
-              <a:noFill/>
+              <a:solidFill>
+                <a:srgbClr val="FF0000"/>
+              </a:solidFill>
+              <a:tailEnd type="triangle"/>
             </a:ln>
-            <a:scene3d>
-              <a:camera prst="orthographicFront"/>
-              <a:lightRig rig="threePt" dir="t"/>
-            </a:scene3d>
-            <a:sp3d>
-              <a:bevelT w="114300" prst="hardEdge"/>
-            </a:sp3d>
           </p:spPr>
           <p:style>
-            <a:lnRef idx="2">
-              <a:schemeClr val="accent1">
-                <a:shade val="50000"/>
-              </a:schemeClr>
+            <a:lnRef idx="1">
+              <a:schemeClr val="accent1"/>
             </a:lnRef>
-            <a:fillRef idx="1">
+            <a:fillRef idx="0">
               <a:schemeClr val="accent1"/>
             </a:fillRef>
             <a:effectRef idx="0">
               <a:schemeClr val="accent1"/>
             </a:effectRef>
             <a:fontRef idx="minor">
+              <a:schemeClr val="tx1"/>
+            </a:fontRef>
+          </p:style>
+        </p:cxnSp>
+        <p:cxnSp>
+          <p:nvCxnSpPr>
+            <p:cNvPr id="47" name="Conector angulado 46"/>
+            <p:cNvCxnSpPr/>
+            <p:nvPr/>
+          </p:nvCxnSpPr>
+          <p:spPr>
+            <a:xfrm rot="5400000" flipH="1" flipV="1">
+              <a:off x="3602269" y="3581125"/>
+              <a:ext cx="844198" cy="156888"/>
+            </a:xfrm>
+            <a:prstGeom prst="bentConnector3">
+              <a:avLst/>
+            </a:prstGeom>
+            <a:ln>
+              <a:solidFill>
+                <a:srgbClr val="FF0000"/>
+              </a:solidFill>
+              <a:tailEnd type="triangle"/>
+            </a:ln>
+          </p:spPr>
+          <p:style>
+            <a:lnRef idx="1">
+              <a:schemeClr val="accent1"/>
+            </a:lnRef>
+            <a:fillRef idx="0">
+              <a:schemeClr val="accent1"/>
+            </a:fillRef>
+            <a:effectRef idx="0">
+              <a:schemeClr val="accent1"/>
+            </a:effectRef>
+            <a:fontRef idx="minor">
+              <a:schemeClr val="tx1"/>
+            </a:fontRef>
+          </p:style>
+        </p:cxnSp>
+        <p:cxnSp>
+          <p:nvCxnSpPr>
+            <p:cNvPr id="50" name="Conector angulado 49"/>
+            <p:cNvCxnSpPr/>
+            <p:nvPr/>
+          </p:nvCxnSpPr>
+          <p:spPr>
+            <a:xfrm rot="16200000" flipV="1">
+              <a:off x="3913007" y="3577419"/>
+              <a:ext cx="844198" cy="156888"/>
+            </a:xfrm>
+            <a:prstGeom prst="bentConnector3">
+              <a:avLst/>
+            </a:prstGeom>
+            <a:ln>
+              <a:solidFill>
+                <a:srgbClr val="FF0000"/>
+              </a:solidFill>
+              <a:tailEnd type="triangle"/>
+            </a:ln>
+          </p:spPr>
+          <p:style>
+            <a:lnRef idx="1">
+              <a:schemeClr val="accent1"/>
+            </a:lnRef>
+            <a:fillRef idx="0">
+              <a:schemeClr val="accent1"/>
+            </a:fillRef>
+            <a:effectRef idx="0">
+              <a:schemeClr val="accent1"/>
+            </a:effectRef>
+            <a:fontRef idx="minor">
+              <a:schemeClr val="tx1"/>
+            </a:fontRef>
+          </p:style>
+        </p:cxnSp>
+        <p:cxnSp>
+          <p:nvCxnSpPr>
+            <p:cNvPr id="52" name="Conector angulado 51"/>
+            <p:cNvCxnSpPr/>
+            <p:nvPr/>
+          </p:nvCxnSpPr>
+          <p:spPr>
+            <a:xfrm flipV="1">
+              <a:off x="4805038" y="3587578"/>
+              <a:ext cx="1022938" cy="424249"/>
+            </a:xfrm>
+            <a:prstGeom prst="bentConnector3">
+              <a:avLst/>
+            </a:prstGeom>
+            <a:ln>
+              <a:solidFill>
+                <a:srgbClr val="FF0000"/>
+              </a:solidFill>
+              <a:tailEnd type="triangle"/>
+            </a:ln>
+          </p:spPr>
+          <p:style>
+            <a:lnRef idx="1">
+              <a:schemeClr val="accent1"/>
+            </a:lnRef>
+            <a:fillRef idx="0">
+              <a:schemeClr val="accent1"/>
+            </a:fillRef>
+            <a:effectRef idx="0">
+              <a:schemeClr val="accent1"/>
+            </a:effectRef>
+            <a:fontRef idx="minor">
+              <a:schemeClr val="tx1"/>
+            </a:fontRef>
+          </p:style>
+        </p:cxnSp>
+        <p:cxnSp>
+          <p:nvCxnSpPr>
+            <p:cNvPr id="54" name="Conector angulado 53"/>
+            <p:cNvCxnSpPr/>
+            <p:nvPr/>
+          </p:nvCxnSpPr>
+          <p:spPr>
+            <a:xfrm flipV="1">
+              <a:off x="5008689" y="4266634"/>
+              <a:ext cx="2033859" cy="198274"/>
+            </a:xfrm>
+            <a:prstGeom prst="bentConnector3">
+              <a:avLst/>
+            </a:prstGeom>
+            <a:ln>
+              <a:solidFill>
+                <a:srgbClr val="FF0000"/>
+              </a:solidFill>
+              <a:tailEnd type="triangle"/>
+            </a:ln>
+          </p:spPr>
+          <p:style>
+            <a:lnRef idx="1">
+              <a:schemeClr val="accent1"/>
+            </a:lnRef>
+            <a:fillRef idx="0">
+              <a:schemeClr val="accent1"/>
+            </a:fillRef>
+            <a:effectRef idx="0">
+              <a:schemeClr val="accent1"/>
+            </a:effectRef>
+            <a:fontRef idx="minor">
+              <a:schemeClr val="tx1"/>
+            </a:fontRef>
+          </p:style>
+        </p:cxnSp>
+        <p:cxnSp>
+          <p:nvCxnSpPr>
+            <p:cNvPr id="57" name="Conector angulado 56"/>
+            <p:cNvCxnSpPr/>
+            <p:nvPr/>
+          </p:nvCxnSpPr>
+          <p:spPr>
+            <a:xfrm rot="10800000" flipV="1">
+              <a:off x="1367481" y="4941354"/>
+              <a:ext cx="2446638" cy="569759"/>
+            </a:xfrm>
+            <a:prstGeom prst="bentConnector3">
+              <a:avLst/>
+            </a:prstGeom>
+            <a:ln>
+              <a:solidFill>
+                <a:srgbClr val="FF0000"/>
+              </a:solidFill>
+              <a:tailEnd type="triangle"/>
+            </a:ln>
+          </p:spPr>
+          <p:style>
+            <a:lnRef idx="1">
+              <a:schemeClr val="accent1"/>
+            </a:lnRef>
+            <a:fillRef idx="0">
+              <a:schemeClr val="accent1"/>
+            </a:fillRef>
+            <a:effectRef idx="0">
+              <a:schemeClr val="accent1"/>
+            </a:effectRef>
+            <a:fontRef idx="minor">
+              <a:schemeClr val="tx1"/>
+            </a:fontRef>
+          </p:style>
+        </p:cxnSp>
+        <p:cxnSp>
+          <p:nvCxnSpPr>
+            <p:cNvPr id="59" name="Conector angulado 58"/>
+            <p:cNvCxnSpPr/>
+            <p:nvPr/>
+          </p:nvCxnSpPr>
+          <p:spPr>
+            <a:xfrm rot="10800000" flipV="1">
+              <a:off x="2297553" y="5648325"/>
+              <a:ext cx="1312422" cy="685800"/>
+            </a:xfrm>
+            <a:prstGeom prst="bentConnector3">
+              <a:avLst/>
+            </a:prstGeom>
+            <a:ln>
+              <a:solidFill>
+                <a:srgbClr val="FF0000"/>
+              </a:solidFill>
+              <a:tailEnd type="triangle"/>
+            </a:ln>
+          </p:spPr>
+          <p:style>
+            <a:lnRef idx="1">
+              <a:schemeClr val="accent1"/>
+            </a:lnRef>
+            <a:fillRef idx="0">
+              <a:schemeClr val="accent1"/>
+            </a:fillRef>
+            <a:effectRef idx="0">
+              <a:schemeClr val="accent1"/>
+            </a:effectRef>
+            <a:fontRef idx="minor">
+              <a:schemeClr val="tx1"/>
+            </a:fontRef>
+          </p:style>
+        </p:cxnSp>
+        <p:sp>
+          <p:nvSpPr>
+            <p:cNvPr id="60" name="CaixaDeTexto 59"/>
+            <p:cNvSpPr txBox="1"/>
+            <p:nvPr/>
+          </p:nvSpPr>
+          <p:spPr>
+            <a:xfrm>
+              <a:off x="1569154" y="2481424"/>
+              <a:ext cx="1083328" cy="307777"/>
+            </a:xfrm>
+            <a:prstGeom prst="rect">
+              <a:avLst/>
+            </a:prstGeom>
+          </p:spPr>
+          <p:style>
+            <a:lnRef idx="2">
+              <a:schemeClr val="dk1"/>
+            </a:lnRef>
+            <a:fillRef idx="1">
               <a:schemeClr val="lt1"/>
+            </a:fillRef>
+            <a:effectRef idx="0">
+              <a:schemeClr val="dk1"/>
+            </a:effectRef>
+            <a:fontRef idx="minor">
+              <a:schemeClr val="dk1"/>
             </a:fontRef>
           </p:style>
           <p:txBody>
-            <a:bodyPr rtlCol="0" anchor="ctr"/>
+            <a:bodyPr wrap="square" rtlCol="0">
+              <a:spAutoFit/>
+            </a:bodyPr>
             <a:lstStyle/>
             <a:p>
               <a:pPr algn="ctr"/>
-              <a:endParaRPr lang="pt-BR"/>
+              <a:r>
+                <a:rPr lang="pt-BR" sz="1400" dirty="0" smtClean="0"/>
+                <a:t>Jogador 1</a:t>
+              </a:r>
+              <a:endParaRPr lang="pt-BR" sz="1400" dirty="0"/>
             </a:p>
           </p:txBody>
         </p:sp>
         <p:sp>
           <p:nvSpPr>
-            <p:cNvPr id="24" name="Elipse 23"/>
-            <p:cNvSpPr/>
+            <p:cNvPr id="61" name="CaixaDeTexto 60"/>
+            <p:cNvSpPr txBox="1"/>
             <p:nvPr/>
           </p:nvSpPr>
           <p:spPr>
             <a:xfrm>
-              <a:off x="4234662" y="3254602"/>
-              <a:ext cx="216000" cy="216000"/>
+              <a:off x="3633906" y="2904421"/>
+              <a:ext cx="1083328" cy="307777"/>
             </a:xfrm>
-            <a:prstGeom prst="ellipse">
+            <a:prstGeom prst="rect">
               <a:avLst/>
             </a:prstGeom>
-            <a:solidFill>
-              <a:schemeClr val="tx1"/>
-            </a:solidFill>
-            <a:ln>
-              <a:solidFill>
-                <a:schemeClr val="tx1"/>
-              </a:solidFill>
-            </a:ln>
-            <a:effectLst/>
-            <a:scene3d>
-              <a:camera prst="orthographicFront">
-                <a:rot lat="0" lon="0" rev="0"/>
-              </a:camera>
-              <a:lightRig rig="contrasting" dir="t">
-                <a:rot lat="0" lon="0" rev="7800000"/>
-              </a:lightRig>
-            </a:scene3d>
-            <a:sp3d>
-              <a:bevelT w="139700" h="139700" prst="angle"/>
-            </a:sp3d>
           </p:spPr>
           <p:style>
             <a:lnRef idx="2">
-              <a:schemeClr val="dk1">
-                <a:shade val="50000"/>
-              </a:schemeClr>
+              <a:schemeClr val="dk1"/>
             </a:lnRef>
             <a:fillRef idx="1">
-              <a:schemeClr val="dk1"/>
+              <a:schemeClr val="lt1"/>
             </a:fillRef>
             <a:effectRef idx="0">
               <a:schemeClr val="dk1"/>
             </a:effectRef>
             <a:fontRef idx="minor">
-              <a:schemeClr val="lt1"/>
+              <a:schemeClr val="dk1"/>
             </a:fontRef>
           </p:style>
           <p:txBody>
-            <a:bodyPr rtlCol="0" anchor="ctr"/>
+            <a:bodyPr wrap="square" rtlCol="0">
+              <a:spAutoFit/>
+            </a:bodyPr>
             <a:lstStyle/>
             <a:p>
               <a:pPr algn="ctr"/>
-              <a:endParaRPr lang="pt-BR"/>
+              <a:r>
+                <a:rPr lang="pt-BR" sz="1400" dirty="0" smtClean="0"/>
+                <a:t>Placar</a:t>
+              </a:r>
+              <a:endParaRPr lang="pt-BR" sz="1400" dirty="0"/>
+            </a:p>
+          </p:txBody>
+        </p:sp>
+        <p:sp>
+          <p:nvSpPr>
+            <p:cNvPr id="62" name="CaixaDeTexto 61"/>
+            <p:cNvSpPr txBox="1"/>
+            <p:nvPr/>
+          </p:nvSpPr>
+          <p:spPr>
+            <a:xfrm>
+              <a:off x="5868727" y="3438172"/>
+              <a:ext cx="1083328" cy="307777"/>
+            </a:xfrm>
+            <a:prstGeom prst="rect">
+              <a:avLst/>
+            </a:prstGeom>
+          </p:spPr>
+          <p:style>
+            <a:lnRef idx="2">
+              <a:schemeClr val="dk1"/>
+            </a:lnRef>
+            <a:fillRef idx="1">
+              <a:schemeClr val="lt1"/>
+            </a:fillRef>
+            <a:effectRef idx="0">
+              <a:schemeClr val="dk1"/>
+            </a:effectRef>
+            <a:fontRef idx="minor">
+              <a:schemeClr val="dk1"/>
+            </a:fontRef>
+          </p:style>
+          <p:txBody>
+            <a:bodyPr wrap="square" rtlCol="0">
+              <a:spAutoFit/>
+            </a:bodyPr>
+            <a:lstStyle/>
+            <a:p>
+              <a:pPr algn="ctr"/>
+              <a:r>
+                <a:rPr lang="pt-BR" sz="1400" dirty="0" smtClean="0"/>
+                <a:t>Coletas</a:t>
+              </a:r>
+              <a:endParaRPr lang="pt-BR" sz="1400" dirty="0"/>
+            </a:p>
+          </p:txBody>
+        </p:sp>
+        <p:sp>
+          <p:nvSpPr>
+            <p:cNvPr id="63" name="CaixaDeTexto 62"/>
+            <p:cNvSpPr txBox="1"/>
+            <p:nvPr/>
+          </p:nvSpPr>
+          <p:spPr>
+            <a:xfrm>
+              <a:off x="7089277" y="4112745"/>
+              <a:ext cx="1083328" cy="307777"/>
+            </a:xfrm>
+            <a:prstGeom prst="rect">
+              <a:avLst/>
+            </a:prstGeom>
+          </p:spPr>
+          <p:style>
+            <a:lnRef idx="2">
+              <a:schemeClr val="dk1"/>
+            </a:lnRef>
+            <a:fillRef idx="1">
+              <a:schemeClr val="lt1"/>
+            </a:fillRef>
+            <a:effectRef idx="0">
+              <a:schemeClr val="dk1"/>
+            </a:effectRef>
+            <a:fontRef idx="minor">
+              <a:schemeClr val="dk1"/>
+            </a:fontRef>
+          </p:style>
+          <p:txBody>
+            <a:bodyPr wrap="square" rtlCol="0">
+              <a:spAutoFit/>
+            </a:bodyPr>
+            <a:lstStyle/>
+            <a:p>
+              <a:pPr algn="ctr"/>
+              <a:r>
+                <a:rPr lang="pt-BR" sz="1400" dirty="0" smtClean="0"/>
+                <a:t>Plus</a:t>
+              </a:r>
+              <a:endParaRPr lang="pt-BR" sz="1400" dirty="0"/>
+            </a:p>
+          </p:txBody>
+        </p:sp>
+        <p:sp>
+          <p:nvSpPr>
+            <p:cNvPr id="64" name="CaixaDeTexto 63"/>
+            <p:cNvSpPr txBox="1"/>
+            <p:nvPr/>
+          </p:nvSpPr>
+          <p:spPr>
+            <a:xfrm>
+              <a:off x="6606563" y="6324600"/>
+              <a:ext cx="1083328" cy="307777"/>
+            </a:xfrm>
+            <a:prstGeom prst="rect">
+              <a:avLst/>
+            </a:prstGeom>
+          </p:spPr>
+          <p:style>
+            <a:lnRef idx="2">
+              <a:schemeClr val="dk1"/>
+            </a:lnRef>
+            <a:fillRef idx="1">
+              <a:schemeClr val="lt1"/>
+            </a:fillRef>
+            <a:effectRef idx="0">
+              <a:schemeClr val="dk1"/>
+            </a:effectRef>
+            <a:fontRef idx="minor">
+              <a:schemeClr val="dk1"/>
+            </a:fontRef>
+          </p:style>
+          <p:txBody>
+            <a:bodyPr wrap="square" rtlCol="0">
+              <a:spAutoFit/>
+            </a:bodyPr>
+            <a:lstStyle/>
+            <a:p>
+              <a:pPr algn="ctr"/>
+              <a:r>
+                <a:rPr lang="pt-BR" sz="1400" dirty="0" smtClean="0"/>
+                <a:t>Jogador 2</a:t>
+              </a:r>
+              <a:endParaRPr lang="pt-BR" sz="1400" dirty="0"/>
+            </a:p>
+          </p:txBody>
+        </p:sp>
+        <p:sp>
+          <p:nvSpPr>
+            <p:cNvPr id="65" name="CaixaDeTexto 64"/>
+            <p:cNvSpPr txBox="1"/>
+            <p:nvPr/>
+          </p:nvSpPr>
+          <p:spPr>
+            <a:xfrm>
+              <a:off x="1187948" y="6183142"/>
+              <a:ext cx="1083328" cy="307777"/>
+            </a:xfrm>
+            <a:prstGeom prst="rect">
+              <a:avLst/>
+            </a:prstGeom>
+          </p:spPr>
+          <p:style>
+            <a:lnRef idx="2">
+              <a:schemeClr val="dk1"/>
+            </a:lnRef>
+            <a:fillRef idx="1">
+              <a:schemeClr val="lt1"/>
+            </a:fillRef>
+            <a:effectRef idx="0">
+              <a:schemeClr val="dk1"/>
+            </a:effectRef>
+            <a:fontRef idx="minor">
+              <a:schemeClr val="dk1"/>
+            </a:fontRef>
+          </p:style>
+          <p:txBody>
+            <a:bodyPr wrap="square" rtlCol="0">
+              <a:spAutoFit/>
+            </a:bodyPr>
+            <a:lstStyle/>
+            <a:p>
+              <a:pPr algn="ctr"/>
+              <a:r>
+                <a:rPr lang="pt-BR" sz="1400" dirty="0" err="1" smtClean="0"/>
+                <a:t>Less</a:t>
+              </a:r>
+              <a:endParaRPr lang="pt-BR" sz="1400" dirty="0"/>
+            </a:p>
+          </p:txBody>
+        </p:sp>
+        <p:sp>
+          <p:nvSpPr>
+            <p:cNvPr id="66" name="CaixaDeTexto 65"/>
+            <p:cNvSpPr txBox="1"/>
+            <p:nvPr/>
+          </p:nvSpPr>
+          <p:spPr>
+            <a:xfrm>
+              <a:off x="258578" y="5366413"/>
+              <a:ext cx="1083328" cy="307777"/>
+            </a:xfrm>
+            <a:prstGeom prst="rect">
+              <a:avLst/>
+            </a:prstGeom>
+          </p:spPr>
+          <p:style>
+            <a:lnRef idx="2">
+              <a:schemeClr val="dk1"/>
+            </a:lnRef>
+            <a:fillRef idx="1">
+              <a:schemeClr val="lt1"/>
+            </a:fillRef>
+            <a:effectRef idx="0">
+              <a:schemeClr val="dk1"/>
+            </a:effectRef>
+            <a:fontRef idx="minor">
+              <a:schemeClr val="dk1"/>
+            </a:fontRef>
+          </p:style>
+          <p:txBody>
+            <a:bodyPr wrap="square" rtlCol="0">
+              <a:spAutoFit/>
+            </a:bodyPr>
+            <a:lstStyle/>
+            <a:p>
+              <a:pPr algn="ctr"/>
+              <a:r>
+                <a:rPr lang="pt-BR" sz="1400" dirty="0" smtClean="0"/>
+                <a:t>Disco</a:t>
+              </a:r>
+              <a:endParaRPr lang="pt-BR" sz="1400" dirty="0"/>
+            </a:p>
+          </p:txBody>
+        </p:sp>
+        <p:cxnSp>
+          <p:nvCxnSpPr>
+            <p:cNvPr id="69" name="Conector angulado 68"/>
+            <p:cNvCxnSpPr>
+              <a:stCxn id="7" idx="3"/>
+            </p:cNvCxnSpPr>
+            <p:nvPr/>
+          </p:nvCxnSpPr>
+          <p:spPr>
+            <a:xfrm>
+              <a:off x="5976753" y="4927417"/>
+              <a:ext cx="1374394" cy="583697"/>
+            </a:xfrm>
+            <a:prstGeom prst="bentConnector3">
+              <a:avLst/>
+            </a:prstGeom>
+            <a:ln>
+              <a:solidFill>
+                <a:srgbClr val="FF0000"/>
+              </a:solidFill>
+              <a:tailEnd type="triangle"/>
+            </a:ln>
+          </p:spPr>
+          <p:style>
+            <a:lnRef idx="1">
+              <a:schemeClr val="accent1"/>
+            </a:lnRef>
+            <a:fillRef idx="0">
+              <a:schemeClr val="accent1"/>
+            </a:fillRef>
+            <a:effectRef idx="0">
+              <a:schemeClr val="accent1"/>
+            </a:effectRef>
+            <a:fontRef idx="minor">
+              <a:schemeClr val="tx1"/>
+            </a:fontRef>
+          </p:style>
+        </p:cxnSp>
+        <p:sp>
+          <p:nvSpPr>
+            <p:cNvPr id="70" name="CaixaDeTexto 69"/>
+            <p:cNvSpPr txBox="1"/>
+            <p:nvPr/>
+          </p:nvSpPr>
+          <p:spPr>
+            <a:xfrm>
+              <a:off x="7377673" y="5366413"/>
+              <a:ext cx="1083328" cy="307777"/>
+            </a:xfrm>
+            <a:prstGeom prst="rect">
+              <a:avLst/>
+            </a:prstGeom>
+          </p:spPr>
+          <p:style>
+            <a:lnRef idx="2">
+              <a:schemeClr val="dk1"/>
+            </a:lnRef>
+            <a:fillRef idx="1">
+              <a:schemeClr val="lt1"/>
+            </a:fillRef>
+            <a:effectRef idx="0">
+              <a:schemeClr val="dk1"/>
+            </a:effectRef>
+            <a:fontRef idx="minor">
+              <a:schemeClr val="dk1"/>
+            </a:fontRef>
+          </p:style>
+          <p:txBody>
+            <a:bodyPr wrap="square" rtlCol="0">
+              <a:spAutoFit/>
+            </a:bodyPr>
+            <a:lstStyle/>
+            <a:p>
+              <a:pPr algn="ctr"/>
+              <a:r>
+                <a:rPr lang="pt-BR" sz="1400" dirty="0" smtClean="0"/>
+                <a:t>Gol</a:t>
+              </a:r>
+              <a:endParaRPr lang="pt-BR" sz="1400" dirty="0"/>
+            </a:p>
+          </p:txBody>
+        </p:sp>
+        <p:cxnSp>
+          <p:nvCxnSpPr>
+            <p:cNvPr id="72" name="Conector angulado 71"/>
+            <p:cNvCxnSpPr/>
+            <p:nvPr/>
+          </p:nvCxnSpPr>
+          <p:spPr>
+            <a:xfrm rot="10800000">
+              <a:off x="680297" y="3872618"/>
+              <a:ext cx="1860065" cy="511731"/>
+            </a:xfrm>
+            <a:prstGeom prst="bentConnector3">
+              <a:avLst/>
+            </a:prstGeom>
+            <a:ln>
+              <a:solidFill>
+                <a:srgbClr val="FF0000"/>
+              </a:solidFill>
+              <a:tailEnd type="triangle"/>
+            </a:ln>
+          </p:spPr>
+          <p:style>
+            <a:lnRef idx="1">
+              <a:schemeClr val="accent1"/>
+            </a:lnRef>
+            <a:fillRef idx="0">
+              <a:schemeClr val="accent1"/>
+            </a:fillRef>
+            <a:effectRef idx="0">
+              <a:schemeClr val="accent1"/>
+            </a:effectRef>
+            <a:fontRef idx="minor">
+              <a:schemeClr val="tx1"/>
+            </a:fontRef>
+          </p:style>
+        </p:cxnSp>
+        <p:sp>
+          <p:nvSpPr>
+            <p:cNvPr id="76" name="CaixaDeTexto 75"/>
+            <p:cNvSpPr txBox="1"/>
+            <p:nvPr/>
+          </p:nvSpPr>
+          <p:spPr>
+            <a:xfrm>
+              <a:off x="-446775" y="3728917"/>
+              <a:ext cx="1083328" cy="307777"/>
+            </a:xfrm>
+            <a:prstGeom prst="rect">
+              <a:avLst/>
+            </a:prstGeom>
+          </p:spPr>
+          <p:style>
+            <a:lnRef idx="2">
+              <a:schemeClr val="dk1"/>
+            </a:lnRef>
+            <a:fillRef idx="1">
+              <a:schemeClr val="lt1"/>
+            </a:fillRef>
+            <a:effectRef idx="0">
+              <a:schemeClr val="dk1"/>
+            </a:effectRef>
+            <a:fontRef idx="minor">
+              <a:schemeClr val="dk1"/>
+            </a:fontRef>
+          </p:style>
+          <p:txBody>
+            <a:bodyPr wrap="square" rtlCol="0">
+              <a:spAutoFit/>
+            </a:bodyPr>
+            <a:lstStyle/>
+            <a:p>
+              <a:pPr algn="ctr"/>
+              <a:r>
+                <a:rPr lang="pt-BR" sz="1400" dirty="0" smtClean="0"/>
+                <a:t>Campo</a:t>
+              </a:r>
+              <a:endParaRPr lang="pt-BR" sz="1400" dirty="0"/>
             </a:p>
           </p:txBody>
         </p:sp>
       </p:grpSp>
-      <p:sp>
-        <p:nvSpPr>
-          <p:cNvPr id="7" name="Retângulo 6"/>
-          <p:cNvSpPr/>
-          <p:nvPr/>
-        </p:nvSpPr>
-        <p:spPr>
-          <a:xfrm>
-            <a:off x="1819276" y="3859120"/>
-            <a:ext cx="3676650" cy="2070193"/>
-          </a:xfrm>
-          <a:prstGeom prst="rect">
-            <a:avLst/>
-          </a:prstGeom>
-          <a:blipFill dpi="0" rotWithShape="1">
-            <a:blip r:embed="rId4">
-              <a:extLst>
-                <a:ext uri="{28A0092B-C50C-407E-A947-70E740481C1C}">
-                  <a14:useLocalDpi xmlns:a14="http://schemas.microsoft.com/office/drawing/2010/main" val="0"/>
-                </a:ext>
-              </a:extLst>
-            </a:blip>
-            <a:srcRect/>
-            <a:stretch>
-              <a:fillRect/>
-            </a:stretch>
-          </a:blipFill>
-          <a:ln>
-            <a:noFill/>
-          </a:ln>
-        </p:spPr>
-        <p:style>
-          <a:lnRef idx="2">
-            <a:schemeClr val="accent1">
-              <a:shade val="50000"/>
-            </a:schemeClr>
-          </a:lnRef>
-          <a:fillRef idx="1">
-            <a:schemeClr val="accent1"/>
-          </a:fillRef>
-          <a:effectRef idx="0">
-            <a:schemeClr val="accent1"/>
-          </a:effectRef>
-          <a:fontRef idx="minor">
-            <a:schemeClr val="lt1"/>
-          </a:fontRef>
-        </p:style>
-        <p:txBody>
-          <a:bodyPr rtlCol="0" anchor="ctr"/>
-          <a:lstStyle/>
-          <a:p>
-            <a:pPr algn="ctr"/>
-            <a:endParaRPr lang="pt-BR"/>
-          </a:p>
-        </p:txBody>
-      </p:sp>
     </p:spTree>
     <p:extLst>
       <p:ext uri="{BB962C8B-B14F-4D97-AF65-F5344CB8AC3E}">
         <p14:creationId xmlns:p14="http://schemas.microsoft.com/office/powerpoint/2010/main" val="2481311032"/>
+      </p:ext>
+    </p:extLst>
+  </p:cSld>
+  <p:clrMapOvr>
+    <a:masterClrMapping/>
+  </p:clrMapOvr>
+</p:sld>
+</file>
+
+<file path=ppt/slides/slide2.xml><?xml version="1.0" encoding="utf-8"?>
+<p:sld xmlns:a="http://schemas.openxmlformats.org/drawingml/2006/main" xmlns:r="http://schemas.openxmlformats.org/officeDocument/2006/relationships" xmlns:p="http://schemas.openxmlformats.org/presentationml/2006/main">
+  <p:cSld>
+    <p:spTree>
+      <p:nvGrpSpPr>
+        <p:cNvPr id="1" name=""/>
+        <p:cNvGrpSpPr/>
+        <p:nvPr/>
+      </p:nvGrpSpPr>
+      <p:grpSpPr>
+        <a:xfrm>
+          <a:off x="0" y="0"/>
+          <a:ext cx="0" cy="0"/>
+          <a:chOff x="0" y="0"/>
+          <a:chExt cx="0" cy="0"/>
+        </a:xfrm>
+      </p:grpSpPr>
+    </p:spTree>
+    <p:extLst>
+      <p:ext uri="{BB962C8B-B14F-4D97-AF65-F5344CB8AC3E}">
+        <p14:creationId xmlns:p14="http://schemas.microsoft.com/office/powerpoint/2010/main" val="3598448004"/>
       </p:ext>
     </p:extLst>
   </p:cSld>

</xml_diff>

<commit_message>
Adicionando bordar estáticas e repulsão nas colisões
</commit_message>
<xml_diff>
--- a/Modelagem do Game.pptx
+++ b/Modelagem do Game.pptx
@@ -5111,6 +5111,124 @@
           <a:chExt cx="0" cy="0"/>
         </a:xfrm>
       </p:grpSpPr>
+      <p:pic>
+        <p:nvPicPr>
+          <p:cNvPr id="2" name="Imagem 1"/>
+          <p:cNvPicPr>
+            <a:picLocks noChangeAspect="1"/>
+          </p:cNvPicPr>
+          <p:nvPr/>
+        </p:nvPicPr>
+        <p:blipFill>
+          <a:blip r:embed="rId2">
+            <a:extLst>
+              <a:ext uri="{28A0092B-C50C-407E-A947-70E740481C1C}">
+                <a14:useLocalDpi xmlns:a14="http://schemas.microsoft.com/office/drawing/2010/main" val="0"/>
+              </a:ext>
+            </a:extLst>
+          </a:blip>
+          <a:stretch>
+            <a:fillRect/>
+          </a:stretch>
+        </p:blipFill>
+        <p:spPr>
+          <a:xfrm>
+            <a:off x="7696109" y="1621375"/>
+            <a:ext cx="2103302" cy="3706689"/>
+          </a:xfrm>
+          <a:prstGeom prst="rect">
+            <a:avLst/>
+          </a:prstGeom>
+        </p:spPr>
+      </p:pic>
+      <p:sp>
+        <p:nvSpPr>
+          <p:cNvPr id="3" name="Quadro 2"/>
+          <p:cNvSpPr/>
+          <p:nvPr/>
+        </p:nvSpPr>
+        <p:spPr>
+          <a:xfrm>
+            <a:off x="3764189" y="1263235"/>
+            <a:ext cx="2102400" cy="3708000"/>
+          </a:xfrm>
+          <a:prstGeom prst="frame">
+            <a:avLst>
+              <a:gd name="adj1" fmla="val 725"/>
+            </a:avLst>
+          </a:prstGeom>
+          <a:solidFill>
+            <a:schemeClr val="accent2"/>
+          </a:solidFill>
+          <a:ln/>
+        </p:spPr>
+        <p:style>
+          <a:lnRef idx="2">
+            <a:schemeClr val="accent2"/>
+          </a:lnRef>
+          <a:fillRef idx="1">
+            <a:schemeClr val="lt1"/>
+          </a:fillRef>
+          <a:effectRef idx="0">
+            <a:schemeClr val="accent2"/>
+          </a:effectRef>
+          <a:fontRef idx="minor">
+            <a:schemeClr val="dk1"/>
+          </a:fontRef>
+        </p:style>
+        <p:txBody>
+          <a:bodyPr rtlCol="0" anchor="ctr"/>
+          <a:lstStyle/>
+          <a:p>
+            <a:pPr algn="ctr"/>
+            <a:endParaRPr lang="pt-BR">
+              <a:solidFill>
+                <a:schemeClr val="tx1"/>
+              </a:solidFill>
+            </a:endParaRPr>
+          </a:p>
+        </p:txBody>
+      </p:sp>
+      <p:sp>
+        <p:nvSpPr>
+          <p:cNvPr id="4" name="Retângulo 3"/>
+          <p:cNvSpPr/>
+          <p:nvPr/>
+        </p:nvSpPr>
+        <p:spPr>
+          <a:xfrm rot="16200000">
+            <a:off x="1844040" y="1028700"/>
+            <a:ext cx="45720" cy="2979420"/>
+          </a:xfrm>
+          <a:prstGeom prst="rect">
+            <a:avLst/>
+          </a:prstGeom>
+        </p:spPr>
+        <p:style>
+          <a:lnRef idx="2">
+            <a:schemeClr val="accent1">
+              <a:shade val="50000"/>
+            </a:schemeClr>
+          </a:lnRef>
+          <a:fillRef idx="1">
+            <a:schemeClr val="accent1"/>
+          </a:fillRef>
+          <a:effectRef idx="0">
+            <a:schemeClr val="accent1"/>
+          </a:effectRef>
+          <a:fontRef idx="minor">
+            <a:schemeClr val="lt1"/>
+          </a:fontRef>
+        </p:style>
+        <p:txBody>
+          <a:bodyPr rtlCol="0" anchor="ctr"/>
+          <a:lstStyle/>
+          <a:p>
+            <a:pPr algn="ctr"/>
+            <a:endParaRPr lang="pt-BR"/>
+          </a:p>
+        </p:txBody>
+      </p:sp>
     </p:spTree>
     <p:extLst>
       <p:ext uri="{BB962C8B-B14F-4D97-AF65-F5344CB8AC3E}">

</xml_diff>

<commit_message>
Novo game para teste de funcionalidades baseado no GiseUp
</commit_message>
<xml_diff>
--- a/Modelagem do Game.pptx
+++ b/Modelagem do Game.pptx
@@ -244,7 +244,7 @@
           <a:p>
             <a:fld id="{54BA3F7A-26B6-4A40-9DE1-5C2320B3D16B}" type="datetimeFigureOut">
               <a:rPr lang="pt-BR" smtClean="0"/>
-              <a:t>18/02/2019</a:t>
+              <a:t>20/02/2019</a:t>
             </a:fld>
             <a:endParaRPr lang="pt-BR"/>
           </a:p>
@@ -414,7 +414,7 @@
           <a:p>
             <a:fld id="{54BA3F7A-26B6-4A40-9DE1-5C2320B3D16B}" type="datetimeFigureOut">
               <a:rPr lang="pt-BR" smtClean="0"/>
-              <a:t>18/02/2019</a:t>
+              <a:t>20/02/2019</a:t>
             </a:fld>
             <a:endParaRPr lang="pt-BR"/>
           </a:p>
@@ -594,7 +594,7 @@
           <a:p>
             <a:fld id="{54BA3F7A-26B6-4A40-9DE1-5C2320B3D16B}" type="datetimeFigureOut">
               <a:rPr lang="pt-BR" smtClean="0"/>
-              <a:t>18/02/2019</a:t>
+              <a:t>20/02/2019</a:t>
             </a:fld>
             <a:endParaRPr lang="pt-BR"/>
           </a:p>
@@ -764,7 +764,7 @@
           <a:p>
             <a:fld id="{54BA3F7A-26B6-4A40-9DE1-5C2320B3D16B}" type="datetimeFigureOut">
               <a:rPr lang="pt-BR" smtClean="0"/>
-              <a:t>18/02/2019</a:t>
+              <a:t>20/02/2019</a:t>
             </a:fld>
             <a:endParaRPr lang="pt-BR"/>
           </a:p>
@@ -1010,7 +1010,7 @@
           <a:p>
             <a:fld id="{54BA3F7A-26B6-4A40-9DE1-5C2320B3D16B}" type="datetimeFigureOut">
               <a:rPr lang="pt-BR" smtClean="0"/>
-              <a:t>18/02/2019</a:t>
+              <a:t>20/02/2019</a:t>
             </a:fld>
             <a:endParaRPr lang="pt-BR"/>
           </a:p>
@@ -1242,7 +1242,7 @@
           <a:p>
             <a:fld id="{54BA3F7A-26B6-4A40-9DE1-5C2320B3D16B}" type="datetimeFigureOut">
               <a:rPr lang="pt-BR" smtClean="0"/>
-              <a:t>18/02/2019</a:t>
+              <a:t>20/02/2019</a:t>
             </a:fld>
             <a:endParaRPr lang="pt-BR"/>
           </a:p>
@@ -1609,7 +1609,7 @@
           <a:p>
             <a:fld id="{54BA3F7A-26B6-4A40-9DE1-5C2320B3D16B}" type="datetimeFigureOut">
               <a:rPr lang="pt-BR" smtClean="0"/>
-              <a:t>18/02/2019</a:t>
+              <a:t>20/02/2019</a:t>
             </a:fld>
             <a:endParaRPr lang="pt-BR"/>
           </a:p>
@@ -1727,7 +1727,7 @@
           <a:p>
             <a:fld id="{54BA3F7A-26B6-4A40-9DE1-5C2320B3D16B}" type="datetimeFigureOut">
               <a:rPr lang="pt-BR" smtClean="0"/>
-              <a:t>18/02/2019</a:t>
+              <a:t>20/02/2019</a:t>
             </a:fld>
             <a:endParaRPr lang="pt-BR"/>
           </a:p>
@@ -1822,7 +1822,7 @@
           <a:p>
             <a:fld id="{54BA3F7A-26B6-4A40-9DE1-5C2320B3D16B}" type="datetimeFigureOut">
               <a:rPr lang="pt-BR" smtClean="0"/>
-              <a:t>18/02/2019</a:t>
+              <a:t>20/02/2019</a:t>
             </a:fld>
             <a:endParaRPr lang="pt-BR"/>
           </a:p>
@@ -2099,7 +2099,7 @@
           <a:p>
             <a:fld id="{54BA3F7A-26B6-4A40-9DE1-5C2320B3D16B}" type="datetimeFigureOut">
               <a:rPr lang="pt-BR" smtClean="0"/>
-              <a:t>18/02/2019</a:t>
+              <a:t>20/02/2019</a:t>
             </a:fld>
             <a:endParaRPr lang="pt-BR"/>
           </a:p>
@@ -2352,7 +2352,7 @@
           <a:p>
             <a:fld id="{54BA3F7A-26B6-4A40-9DE1-5C2320B3D16B}" type="datetimeFigureOut">
               <a:rPr lang="pt-BR" smtClean="0"/>
-              <a:t>18/02/2019</a:t>
+              <a:t>20/02/2019</a:t>
             </a:fld>
             <a:endParaRPr lang="pt-BR"/>
           </a:p>
@@ -2565,7 +2565,7 @@
           <a:p>
             <a:fld id="{54BA3F7A-26B6-4A40-9DE1-5C2320B3D16B}" type="datetimeFigureOut">
               <a:rPr lang="pt-BR" smtClean="0"/>
-              <a:t>18/02/2019</a:t>
+              <a:t>20/02/2019</a:t>
             </a:fld>
             <a:endParaRPr lang="pt-BR"/>
           </a:p>
@@ -2970,235 +2970,220 @@
           <a:chExt cx="0" cy="0"/>
         </a:xfrm>
       </p:grpSpPr>
-      <p:grpSp>
-        <p:nvGrpSpPr>
-          <p:cNvPr id="4" name="Grupo 3"/>
-          <p:cNvGrpSpPr/>
+      <p:sp>
+        <p:nvSpPr>
+          <p:cNvPr id="27" name="Retângulo 26"/>
+          <p:cNvSpPr/>
           <p:nvPr/>
-        </p:nvGrpSpPr>
-        <p:grpSpPr>
+        </p:nvSpPr>
+        <p:spPr>
           <a:xfrm>
-            <a:off x="9594899" y="-373580"/>
-            <a:ext cx="2847975" cy="4888397"/>
-            <a:chOff x="5756317" y="613620"/>
-            <a:chExt cx="2847975" cy="4888397"/>
+            <a:off x="9609378" y="1529765"/>
+            <a:ext cx="2092411" cy="3698788"/>
           </a:xfrm>
-        </p:grpSpPr>
-        <p:sp>
-          <p:nvSpPr>
-            <p:cNvPr id="27" name="Retângulo 26"/>
-            <p:cNvSpPr/>
-            <p:nvPr/>
-          </p:nvSpPr>
-          <p:spPr>
-            <a:xfrm>
-              <a:off x="6133326" y="1210185"/>
-              <a:ext cx="2092411" cy="3698788"/>
-            </a:xfrm>
-            <a:prstGeom prst="rect">
-              <a:avLst/>
-            </a:prstGeom>
-            <a:blipFill dpi="0" rotWithShape="1">
-              <a:blip r:embed="rId2">
-                <a:extLst>
-                  <a:ext uri="{28A0092B-C50C-407E-A947-70E740481C1C}">
-                    <a14:useLocalDpi xmlns:a14="http://schemas.microsoft.com/office/drawing/2010/main" val="0"/>
-                  </a:ext>
-                </a:extLst>
-              </a:blip>
-              <a:srcRect/>
-              <a:stretch>
-                <a:fillRect/>
-              </a:stretch>
-            </a:blipFill>
-            <a:ln w="12700">
+          <a:prstGeom prst="rect">
+            <a:avLst/>
+          </a:prstGeom>
+          <a:blipFill dpi="0" rotWithShape="1">
+            <a:blip r:embed="rId2">
+              <a:extLst>
+                <a:ext uri="{28A0092B-C50C-407E-A947-70E740481C1C}">
+                  <a14:useLocalDpi xmlns:a14="http://schemas.microsoft.com/office/drawing/2010/main" val="0"/>
+                </a:ext>
+              </a:extLst>
+            </a:blip>
+            <a:srcRect/>
+            <a:stretch>
+              <a:fillRect/>
+            </a:stretch>
+          </a:blipFill>
+          <a:ln w="12700">
+            <a:solidFill>
+              <a:schemeClr val="accent2"/>
+            </a:solidFill>
+          </a:ln>
+        </p:spPr>
+        <p:style>
+          <a:lnRef idx="2">
+            <a:schemeClr val="accent1">
+              <a:shade val="50000"/>
+            </a:schemeClr>
+          </a:lnRef>
+          <a:fillRef idx="1">
+            <a:schemeClr val="accent1"/>
+          </a:fillRef>
+          <a:effectRef idx="0">
+            <a:schemeClr val="accent1"/>
+          </a:effectRef>
+          <a:fontRef idx="minor">
+            <a:schemeClr val="lt1"/>
+          </a:fontRef>
+        </p:style>
+        <p:txBody>
+          <a:bodyPr rtlCol="0" anchor="ctr"/>
+          <a:lstStyle/>
+          <a:p>
+            <a:pPr algn="ctr"/>
+            <a:endParaRPr lang="pt-BR"/>
+          </a:p>
+        </p:txBody>
+      </p:sp>
+      <p:sp>
+        <p:nvSpPr>
+          <p:cNvPr id="28" name="Menos 27"/>
+          <p:cNvSpPr/>
+          <p:nvPr/>
+        </p:nvSpPr>
+        <p:spPr>
+          <a:xfrm>
+            <a:off x="9232369" y="3235439"/>
+            <a:ext cx="2847975" cy="280395"/>
+          </a:xfrm>
+          <a:prstGeom prst="mathMinus">
+            <a:avLst>
+              <a:gd name="adj1" fmla="val 24208"/>
+            </a:avLst>
+          </a:prstGeom>
+          <a:solidFill>
+            <a:schemeClr val="bg1"/>
+          </a:solidFill>
+          <a:ln>
+            <a:noFill/>
+          </a:ln>
+        </p:spPr>
+        <p:style>
+          <a:lnRef idx="2">
+            <a:schemeClr val="accent1">
+              <a:shade val="50000"/>
+            </a:schemeClr>
+          </a:lnRef>
+          <a:fillRef idx="1">
+            <a:schemeClr val="accent1"/>
+          </a:fillRef>
+          <a:effectRef idx="0">
+            <a:schemeClr val="accent1"/>
+          </a:effectRef>
+          <a:fontRef idx="minor">
+            <a:schemeClr val="lt1"/>
+          </a:fontRef>
+        </p:style>
+        <p:txBody>
+          <a:bodyPr rtlCol="0" anchor="ctr"/>
+          <a:lstStyle/>
+          <a:p>
+            <a:pPr algn="ctr"/>
+            <a:endParaRPr lang="pt-BR"/>
+          </a:p>
+        </p:txBody>
+      </p:sp>
+      <p:sp>
+        <p:nvSpPr>
+          <p:cNvPr id="22" name="Semicírculos 21"/>
+          <p:cNvSpPr/>
+          <p:nvPr/>
+        </p:nvSpPr>
+        <p:spPr>
+          <a:xfrm flipV="1">
+            <a:off x="10099689" y="933200"/>
+            <a:ext cx="1112317" cy="1209605"/>
+          </a:xfrm>
+          <a:prstGeom prst="blockArc">
+            <a:avLst>
+              <a:gd name="adj1" fmla="val 10800000"/>
+              <a:gd name="adj2" fmla="val 21584655"/>
+              <a:gd name="adj3" fmla="val 7250"/>
+            </a:avLst>
+          </a:prstGeom>
+          <a:solidFill>
+            <a:schemeClr val="bg1"/>
+          </a:solidFill>
+          <a:ln>
+            <a:noFill/>
+          </a:ln>
+        </p:spPr>
+        <p:style>
+          <a:lnRef idx="2">
+            <a:schemeClr val="accent1">
+              <a:shade val="50000"/>
+            </a:schemeClr>
+          </a:lnRef>
+          <a:fillRef idx="1">
+            <a:schemeClr val="accent1"/>
+          </a:fillRef>
+          <a:effectRef idx="0">
+            <a:schemeClr val="accent1"/>
+          </a:effectRef>
+          <a:fontRef idx="minor">
+            <a:schemeClr val="lt1"/>
+          </a:fontRef>
+        </p:style>
+        <p:txBody>
+          <a:bodyPr rtlCol="0" anchor="ctr"/>
+          <a:lstStyle/>
+          <a:p>
+            <a:pPr algn="ctr"/>
+            <a:endParaRPr lang="pt-BR">
               <a:solidFill>
-                <a:schemeClr val="accent2"/>
+                <a:schemeClr val="tx1"/>
               </a:solidFill>
-            </a:ln>
-          </p:spPr>
-          <p:style>
-            <a:lnRef idx="2">
-              <a:schemeClr val="accent1">
-                <a:shade val="50000"/>
-              </a:schemeClr>
-            </a:lnRef>
-            <a:fillRef idx="1">
-              <a:schemeClr val="accent1"/>
-            </a:fillRef>
-            <a:effectRef idx="0">
-              <a:schemeClr val="accent1"/>
-            </a:effectRef>
-            <a:fontRef idx="minor">
-              <a:schemeClr val="lt1"/>
-            </a:fontRef>
-          </p:style>
-          <p:txBody>
-            <a:bodyPr rtlCol="0" anchor="ctr"/>
-            <a:lstStyle/>
-            <a:p>
-              <a:pPr algn="ctr"/>
-              <a:endParaRPr lang="pt-BR"/>
-            </a:p>
-          </p:txBody>
-        </p:sp>
-        <p:sp>
-          <p:nvSpPr>
-            <p:cNvPr id="28" name="Menos 27"/>
-            <p:cNvSpPr/>
-            <p:nvPr/>
-          </p:nvSpPr>
-          <p:spPr>
-            <a:xfrm>
-              <a:off x="5756317" y="2915859"/>
-              <a:ext cx="2847975" cy="280395"/>
-            </a:xfrm>
-            <a:prstGeom prst="mathMinus">
-              <a:avLst>
-                <a:gd name="adj1" fmla="val 24208"/>
-              </a:avLst>
-            </a:prstGeom>
-            <a:solidFill>
-              <a:schemeClr val="bg1"/>
-            </a:solidFill>
-            <a:ln>
-              <a:noFill/>
-            </a:ln>
-          </p:spPr>
-          <p:style>
-            <a:lnRef idx="2">
-              <a:schemeClr val="accent1">
-                <a:shade val="50000"/>
-              </a:schemeClr>
-            </a:lnRef>
-            <a:fillRef idx="1">
-              <a:schemeClr val="accent1"/>
-            </a:fillRef>
-            <a:effectRef idx="0">
-              <a:schemeClr val="accent1"/>
-            </a:effectRef>
-            <a:fontRef idx="minor">
-              <a:schemeClr val="lt1"/>
-            </a:fontRef>
-          </p:style>
-          <p:txBody>
-            <a:bodyPr rtlCol="0" anchor="ctr"/>
-            <a:lstStyle/>
-            <a:p>
-              <a:pPr algn="ctr"/>
-              <a:endParaRPr lang="pt-BR"/>
-            </a:p>
-          </p:txBody>
-        </p:sp>
-        <p:sp>
-          <p:nvSpPr>
-            <p:cNvPr id="22" name="Semicírculos 21"/>
-            <p:cNvSpPr/>
-            <p:nvPr/>
-          </p:nvSpPr>
-          <p:spPr>
-            <a:xfrm flipV="1">
-              <a:off x="6623637" y="613620"/>
-              <a:ext cx="1112317" cy="1209605"/>
-            </a:xfrm>
-            <a:prstGeom prst="blockArc">
-              <a:avLst>
-                <a:gd name="adj1" fmla="val 10800000"/>
-                <a:gd name="adj2" fmla="val 21584655"/>
-                <a:gd name="adj3" fmla="val 7250"/>
-              </a:avLst>
-            </a:prstGeom>
-            <a:solidFill>
-              <a:schemeClr val="bg1"/>
-            </a:solidFill>
-            <a:ln>
-              <a:noFill/>
-            </a:ln>
-          </p:spPr>
-          <p:style>
-            <a:lnRef idx="2">
-              <a:schemeClr val="accent1">
-                <a:shade val="50000"/>
-              </a:schemeClr>
-            </a:lnRef>
-            <a:fillRef idx="1">
-              <a:schemeClr val="accent1"/>
-            </a:fillRef>
-            <a:effectRef idx="0">
-              <a:schemeClr val="accent1"/>
-            </a:effectRef>
-            <a:fontRef idx="minor">
-              <a:schemeClr val="lt1"/>
-            </a:fontRef>
-          </p:style>
-          <p:txBody>
-            <a:bodyPr rtlCol="0" anchor="ctr"/>
-            <a:lstStyle/>
-            <a:p>
-              <a:pPr algn="ctr"/>
-              <a:endParaRPr lang="pt-BR">
-                <a:solidFill>
-                  <a:schemeClr val="tx1"/>
-                </a:solidFill>
-              </a:endParaRPr>
-            </a:p>
-          </p:txBody>
-        </p:sp>
-        <p:sp>
-          <p:nvSpPr>
-            <p:cNvPr id="23" name="Semicírculos 22"/>
-            <p:cNvSpPr/>
-            <p:nvPr/>
-          </p:nvSpPr>
-          <p:spPr>
-            <a:xfrm rot="10800000" flipV="1">
-              <a:off x="6626606" y="4292412"/>
-              <a:ext cx="1112317" cy="1209605"/>
-            </a:xfrm>
-            <a:prstGeom prst="blockArc">
-              <a:avLst>
-                <a:gd name="adj1" fmla="val 10800000"/>
-                <a:gd name="adj2" fmla="val 21584655"/>
-                <a:gd name="adj3" fmla="val 7250"/>
-              </a:avLst>
-            </a:prstGeom>
-            <a:solidFill>
-              <a:schemeClr val="bg1"/>
-            </a:solidFill>
-            <a:ln>
-              <a:noFill/>
-            </a:ln>
-          </p:spPr>
-          <p:style>
-            <a:lnRef idx="2">
-              <a:schemeClr val="accent1">
-                <a:shade val="50000"/>
-              </a:schemeClr>
-            </a:lnRef>
-            <a:fillRef idx="1">
-              <a:schemeClr val="accent1"/>
-            </a:fillRef>
-            <a:effectRef idx="0">
-              <a:schemeClr val="accent1"/>
-            </a:effectRef>
-            <a:fontRef idx="minor">
-              <a:schemeClr val="lt1"/>
-            </a:fontRef>
-          </p:style>
-          <p:txBody>
-            <a:bodyPr rtlCol="0" anchor="ctr"/>
-            <a:lstStyle/>
-            <a:p>
-              <a:pPr algn="ctr"/>
-              <a:endParaRPr lang="pt-BR">
-                <a:solidFill>
-                  <a:schemeClr val="tx1"/>
-                </a:solidFill>
-              </a:endParaRPr>
-            </a:p>
-          </p:txBody>
-        </p:sp>
-      </p:grpSp>
+            </a:endParaRPr>
+          </a:p>
+        </p:txBody>
+      </p:sp>
+      <p:sp>
+        <p:nvSpPr>
+          <p:cNvPr id="23" name="Semicírculos 22"/>
+          <p:cNvSpPr/>
+          <p:nvPr/>
+        </p:nvSpPr>
+        <p:spPr>
+          <a:xfrm rot="10800000" flipV="1">
+            <a:off x="10102658" y="4611992"/>
+            <a:ext cx="1112317" cy="1209605"/>
+          </a:xfrm>
+          <a:prstGeom prst="blockArc">
+            <a:avLst>
+              <a:gd name="adj1" fmla="val 10800000"/>
+              <a:gd name="adj2" fmla="val 21584655"/>
+              <a:gd name="adj3" fmla="val 7250"/>
+            </a:avLst>
+          </a:prstGeom>
+          <a:solidFill>
+            <a:schemeClr val="bg1"/>
+          </a:solidFill>
+          <a:ln>
+            <a:noFill/>
+          </a:ln>
+        </p:spPr>
+        <p:style>
+          <a:lnRef idx="2">
+            <a:schemeClr val="accent1">
+              <a:shade val="50000"/>
+            </a:schemeClr>
+          </a:lnRef>
+          <a:fillRef idx="1">
+            <a:schemeClr val="accent1"/>
+          </a:fillRef>
+          <a:effectRef idx="0">
+            <a:schemeClr val="accent1"/>
+          </a:effectRef>
+          <a:fontRef idx="minor">
+            <a:schemeClr val="lt1"/>
+          </a:fontRef>
+        </p:style>
+        <p:txBody>
+          <a:bodyPr rtlCol="0" anchor="ctr"/>
+          <a:lstStyle/>
+          <a:p>
+            <a:pPr algn="ctr"/>
+            <a:endParaRPr lang="pt-BR">
+              <a:solidFill>
+                <a:schemeClr val="tx1"/>
+              </a:solidFill>
+            </a:endParaRPr>
+          </a:p>
+        </p:txBody>
+      </p:sp>
       <p:grpSp>
         <p:nvGrpSpPr>
           <p:cNvPr id="21" name="Grupo 20"/>
@@ -5133,7 +5118,7 @@
         </p:blipFill>
         <p:spPr>
           <a:xfrm>
-            <a:off x="7696109" y="1621375"/>
+            <a:off x="6814661" y="1160056"/>
             <a:ext cx="2103302" cy="3706689"/>
           </a:xfrm>
           <a:prstGeom prst="rect">
@@ -5203,6 +5188,54 @@
           <a:prstGeom prst="rect">
             <a:avLst/>
           </a:prstGeom>
+        </p:spPr>
+        <p:style>
+          <a:lnRef idx="2">
+            <a:schemeClr val="accent1">
+              <a:shade val="50000"/>
+            </a:schemeClr>
+          </a:lnRef>
+          <a:fillRef idx="1">
+            <a:schemeClr val="accent1"/>
+          </a:fillRef>
+          <a:effectRef idx="0">
+            <a:schemeClr val="accent1"/>
+          </a:effectRef>
+          <a:fontRef idx="minor">
+            <a:schemeClr val="lt1"/>
+          </a:fontRef>
+        </p:style>
+        <p:txBody>
+          <a:bodyPr rtlCol="0" anchor="ctr"/>
+          <a:lstStyle/>
+          <a:p>
+            <a:pPr algn="ctr"/>
+            <a:endParaRPr lang="pt-BR"/>
+          </a:p>
+        </p:txBody>
+      </p:sp>
+      <p:sp>
+        <p:nvSpPr>
+          <p:cNvPr id="5" name="Retângulo 4"/>
+          <p:cNvSpPr/>
+          <p:nvPr/>
+        </p:nvSpPr>
+        <p:spPr>
+          <a:xfrm>
+            <a:off x="692030" y="1949895"/>
+            <a:ext cx="2092411" cy="3698788"/>
+          </a:xfrm>
+          <a:prstGeom prst="rect">
+            <a:avLst/>
+          </a:prstGeom>
+          <a:solidFill>
+            <a:srgbClr val="00B0F0"/>
+          </a:solidFill>
+          <a:ln w="12700">
+            <a:solidFill>
+              <a:schemeClr val="accent2"/>
+            </a:solidFill>
+          </a:ln>
         </p:spPr>
         <p:style>
           <a:lnRef idx="2">

</xml_diff>

<commit_message>
Nova versão do game, com novas funcionalidades
</commit_message>
<xml_diff>
--- a/Modelagem do Game.pptx
+++ b/Modelagem do Game.pptx
@@ -244,7 +244,7 @@
           <a:p>
             <a:fld id="{54BA3F7A-26B6-4A40-9DE1-5C2320B3D16B}" type="datetimeFigureOut">
               <a:rPr lang="pt-BR" smtClean="0"/>
-              <a:t>20/02/2019</a:t>
+              <a:t>21/02/2019</a:t>
             </a:fld>
             <a:endParaRPr lang="pt-BR"/>
           </a:p>
@@ -414,7 +414,7 @@
           <a:p>
             <a:fld id="{54BA3F7A-26B6-4A40-9DE1-5C2320B3D16B}" type="datetimeFigureOut">
               <a:rPr lang="pt-BR" smtClean="0"/>
-              <a:t>20/02/2019</a:t>
+              <a:t>21/02/2019</a:t>
             </a:fld>
             <a:endParaRPr lang="pt-BR"/>
           </a:p>
@@ -594,7 +594,7 @@
           <a:p>
             <a:fld id="{54BA3F7A-26B6-4A40-9DE1-5C2320B3D16B}" type="datetimeFigureOut">
               <a:rPr lang="pt-BR" smtClean="0"/>
-              <a:t>20/02/2019</a:t>
+              <a:t>21/02/2019</a:t>
             </a:fld>
             <a:endParaRPr lang="pt-BR"/>
           </a:p>
@@ -764,7 +764,7 @@
           <a:p>
             <a:fld id="{54BA3F7A-26B6-4A40-9DE1-5C2320B3D16B}" type="datetimeFigureOut">
               <a:rPr lang="pt-BR" smtClean="0"/>
-              <a:t>20/02/2019</a:t>
+              <a:t>21/02/2019</a:t>
             </a:fld>
             <a:endParaRPr lang="pt-BR"/>
           </a:p>
@@ -1010,7 +1010,7 @@
           <a:p>
             <a:fld id="{54BA3F7A-26B6-4A40-9DE1-5C2320B3D16B}" type="datetimeFigureOut">
               <a:rPr lang="pt-BR" smtClean="0"/>
-              <a:t>20/02/2019</a:t>
+              <a:t>21/02/2019</a:t>
             </a:fld>
             <a:endParaRPr lang="pt-BR"/>
           </a:p>
@@ -1242,7 +1242,7 @@
           <a:p>
             <a:fld id="{54BA3F7A-26B6-4A40-9DE1-5C2320B3D16B}" type="datetimeFigureOut">
               <a:rPr lang="pt-BR" smtClean="0"/>
-              <a:t>20/02/2019</a:t>
+              <a:t>21/02/2019</a:t>
             </a:fld>
             <a:endParaRPr lang="pt-BR"/>
           </a:p>
@@ -1609,7 +1609,7 @@
           <a:p>
             <a:fld id="{54BA3F7A-26B6-4A40-9DE1-5C2320B3D16B}" type="datetimeFigureOut">
               <a:rPr lang="pt-BR" smtClean="0"/>
-              <a:t>20/02/2019</a:t>
+              <a:t>21/02/2019</a:t>
             </a:fld>
             <a:endParaRPr lang="pt-BR"/>
           </a:p>
@@ -1727,7 +1727,7 @@
           <a:p>
             <a:fld id="{54BA3F7A-26B6-4A40-9DE1-5C2320B3D16B}" type="datetimeFigureOut">
               <a:rPr lang="pt-BR" smtClean="0"/>
-              <a:t>20/02/2019</a:t>
+              <a:t>21/02/2019</a:t>
             </a:fld>
             <a:endParaRPr lang="pt-BR"/>
           </a:p>
@@ -1822,7 +1822,7 @@
           <a:p>
             <a:fld id="{54BA3F7A-26B6-4A40-9DE1-5C2320B3D16B}" type="datetimeFigureOut">
               <a:rPr lang="pt-BR" smtClean="0"/>
-              <a:t>20/02/2019</a:t>
+              <a:t>21/02/2019</a:t>
             </a:fld>
             <a:endParaRPr lang="pt-BR"/>
           </a:p>
@@ -2099,7 +2099,7 @@
           <a:p>
             <a:fld id="{54BA3F7A-26B6-4A40-9DE1-5C2320B3D16B}" type="datetimeFigureOut">
               <a:rPr lang="pt-BR" smtClean="0"/>
-              <a:t>20/02/2019</a:t>
+              <a:t>21/02/2019</a:t>
             </a:fld>
             <a:endParaRPr lang="pt-BR"/>
           </a:p>
@@ -2352,7 +2352,7 @@
           <a:p>
             <a:fld id="{54BA3F7A-26B6-4A40-9DE1-5C2320B3D16B}" type="datetimeFigureOut">
               <a:rPr lang="pt-BR" smtClean="0"/>
-              <a:t>20/02/2019</a:t>
+              <a:t>21/02/2019</a:t>
             </a:fld>
             <a:endParaRPr lang="pt-BR"/>
           </a:p>
@@ -2565,7 +2565,7 @@
           <a:p>
             <a:fld id="{54BA3F7A-26B6-4A40-9DE1-5C2320B3D16B}" type="datetimeFigureOut">
               <a:rPr lang="pt-BR" smtClean="0"/>
-              <a:t>20/02/2019</a:t>
+              <a:t>21/02/2019</a:t>
             </a:fld>
             <a:endParaRPr lang="pt-BR"/>
           </a:p>
@@ -5228,13 +5228,21 @@
           <a:prstGeom prst="rect">
             <a:avLst/>
           </a:prstGeom>
-          <a:solidFill>
-            <a:srgbClr val="00B0F0"/>
-          </a:solidFill>
+          <a:blipFill dpi="0" rotWithShape="1">
+            <a:blip r:embed="rId3">
+              <a:extLst>
+                <a:ext uri="{28A0092B-C50C-407E-A947-70E740481C1C}">
+                  <a14:useLocalDpi xmlns:a14="http://schemas.microsoft.com/office/drawing/2010/main" val="0"/>
+                </a:ext>
+              </a:extLst>
+            </a:blip>
+            <a:srcRect/>
+            <a:stretch>
+              <a:fillRect/>
+            </a:stretch>
+          </a:blipFill>
           <a:ln w="12700">
-            <a:solidFill>
-              <a:schemeClr val="accent2"/>
-            </a:solidFill>
+            <a:noFill/>
           </a:ln>
         </p:spPr>
         <p:style>
@@ -5262,6 +5270,35 @@
           </a:p>
         </p:txBody>
       </p:sp>
+      <p:pic>
+        <p:nvPicPr>
+          <p:cNvPr id="8" name="Imagem 7"/>
+          <p:cNvPicPr>
+            <a:picLocks noChangeAspect="1"/>
+          </p:cNvPicPr>
+          <p:nvPr/>
+        </p:nvPicPr>
+        <p:blipFill rotWithShape="1">
+          <a:blip r:embed="rId4">
+            <a:extLst>
+              <a:ext uri="{28A0092B-C50C-407E-A947-70E740481C1C}">
+                <a14:useLocalDpi xmlns:a14="http://schemas.microsoft.com/office/drawing/2010/main" val="0"/>
+              </a:ext>
+            </a:extLst>
+          </a:blip>
+          <a:srcRect t="35000"/>
+          <a:stretch/>
+        </p:blipFill>
+        <p:spPr>
+          <a:xfrm>
+            <a:off x="4572000" y="3086100"/>
+            <a:ext cx="3048000" cy="1485900"/>
+          </a:xfrm>
+          <a:prstGeom prst="rect">
+            <a:avLst/>
+          </a:prstGeom>
+        </p:spPr>
+      </p:pic>
     </p:spTree>
     <p:extLst>
       <p:ext uri="{BB962C8B-B14F-4D97-AF65-F5344CB8AC3E}">

</xml_diff>

<commit_message>
Projeto para movimentação de personagens
</commit_message>
<xml_diff>
--- a/Modelagem do Game.pptx
+++ b/Modelagem do Game.pptx
@@ -4145,883 +4145,853 @@
           </a:p>
         </p:txBody>
       </p:sp>
-      <p:grpSp>
-        <p:nvGrpSpPr>
-          <p:cNvPr id="77" name="Grupo 76"/>
-          <p:cNvGrpSpPr/>
-          <p:nvPr/>
-        </p:nvGrpSpPr>
-        <p:grpSpPr>
-          <a:xfrm>
-            <a:off x="-446775" y="2481424"/>
-            <a:ext cx="8907776" cy="4150953"/>
-            <a:chOff x="-446775" y="2481424"/>
-            <a:chExt cx="8907776" cy="4150953"/>
-          </a:xfrm>
-        </p:grpSpPr>
-        <p:grpSp>
-          <p:nvGrpSpPr>
-            <p:cNvPr id="41" name="Grupo 40"/>
-            <p:cNvGrpSpPr/>
-            <p:nvPr/>
-          </p:nvGrpSpPr>
-          <p:grpSpPr>
-            <a:xfrm>
-              <a:off x="1730316" y="3779819"/>
-              <a:ext cx="4744994" cy="2323071"/>
-              <a:chOff x="1275525" y="3668800"/>
-              <a:chExt cx="4744994" cy="2323071"/>
-            </a:xfrm>
-          </p:grpSpPr>
-          <p:pic>
-            <p:nvPicPr>
-              <p:cNvPr id="5" name="Imagem 4"/>
-              <p:cNvPicPr>
-                <a:picLocks noChangeAspect="1"/>
-              </p:cNvPicPr>
-              <p:nvPr/>
-            </p:nvPicPr>
-            <p:blipFill rotWithShape="1">
-              <a:blip r:embed="rId3">
-                <a:extLst>
-                  <a:ext uri="{28A0092B-C50C-407E-A947-70E740481C1C}">
-                    <a14:useLocalDpi xmlns:a14="http://schemas.microsoft.com/office/drawing/2010/main" val="0"/>
-                  </a:ext>
-                </a:extLst>
-              </a:blip>
-              <a:srcRect l="27741" t="15015" r="24343" b="15796"/>
-              <a:stretch/>
-            </p:blipFill>
-            <p:spPr>
-              <a:xfrm rot="16200000">
-                <a:off x="2486486" y="2457839"/>
-                <a:ext cx="2323071" cy="4744994"/>
-              </a:xfrm>
-              <a:prstGeom prst="rect">
-                <a:avLst/>
-              </a:prstGeom>
-              <a:noFill/>
-              <a:ln w="9525">
-                <a:noFill/>
-              </a:ln>
-            </p:spPr>
-          </p:pic>
-          <p:sp>
-            <p:nvSpPr>
-              <p:cNvPr id="7" name="Retângulo 6"/>
-              <p:cNvSpPr/>
-              <p:nvPr/>
-            </p:nvSpPr>
-            <p:spPr>
-              <a:xfrm>
-                <a:off x="1842762" y="3779598"/>
-                <a:ext cx="3679200" cy="2073600"/>
-              </a:xfrm>
-              <a:prstGeom prst="rect">
-                <a:avLst/>
-              </a:prstGeom>
-              <a:blipFill dpi="0" rotWithShape="1">
-                <a:blip r:embed="rId4">
-                  <a:extLst>
-                    <a:ext uri="{28A0092B-C50C-407E-A947-70E740481C1C}">
-                      <a14:useLocalDpi xmlns:a14="http://schemas.microsoft.com/office/drawing/2010/main" val="0"/>
-                    </a:ext>
-                  </a:extLst>
-                </a:blip>
-                <a:srcRect/>
-                <a:stretch>
-                  <a:fillRect/>
-                </a:stretch>
-              </a:blipFill>
-              <a:ln>
-                <a:noFill/>
-              </a:ln>
-            </p:spPr>
-            <p:style>
-              <a:lnRef idx="2">
-                <a:schemeClr val="accent1">
-                  <a:shade val="50000"/>
-                </a:schemeClr>
-              </a:lnRef>
-              <a:fillRef idx="1">
-                <a:schemeClr val="accent1"/>
-              </a:fillRef>
-              <a:effectRef idx="0">
-                <a:schemeClr val="accent1"/>
-              </a:effectRef>
-              <a:fontRef idx="minor">
-                <a:schemeClr val="lt1"/>
-              </a:fontRef>
-            </p:style>
-            <p:txBody>
-              <a:bodyPr rtlCol="0" anchor="ctr"/>
-              <a:lstStyle/>
-              <a:p>
-                <a:pPr algn="ctr"/>
-                <a:endParaRPr lang="pt-BR"/>
-              </a:p>
-            </p:txBody>
-          </p:sp>
-        </p:grpSp>
-        <p:cxnSp>
-          <p:nvCxnSpPr>
-            <p:cNvPr id="43" name="Conector angulado 42"/>
-            <p:cNvCxnSpPr/>
-            <p:nvPr/>
-          </p:nvCxnSpPr>
-          <p:spPr>
-            <a:xfrm rot="16200000" flipV="1">
-              <a:off x="1845277" y="3080951"/>
-              <a:ext cx="1540475" cy="1013255"/>
-            </a:xfrm>
-            <a:prstGeom prst="bentConnector3">
-              <a:avLst/>
-            </a:prstGeom>
-            <a:ln>
-              <a:solidFill>
-                <a:srgbClr val="FF0000"/>
-              </a:solidFill>
-              <a:tailEnd type="triangle"/>
-            </a:ln>
-          </p:spPr>
-          <p:style>
-            <a:lnRef idx="1">
-              <a:schemeClr val="dk1"/>
-            </a:lnRef>
-            <a:fillRef idx="0">
-              <a:schemeClr val="dk1"/>
-            </a:fillRef>
-            <a:effectRef idx="0">
-              <a:schemeClr val="dk1"/>
-            </a:effectRef>
-            <a:fontRef idx="minor">
-              <a:schemeClr val="tx1"/>
-            </a:fontRef>
-          </p:style>
-        </p:cxnSp>
-        <p:cxnSp>
-          <p:nvCxnSpPr>
-            <p:cNvPr id="45" name="Conector angulado 44"/>
-            <p:cNvCxnSpPr/>
-            <p:nvPr/>
-          </p:nvCxnSpPr>
-          <p:spPr>
-            <a:xfrm>
-              <a:off x="4859038" y="5511114"/>
-              <a:ext cx="1712962" cy="955589"/>
-            </a:xfrm>
-            <a:prstGeom prst="bentConnector3">
-              <a:avLst/>
-            </a:prstGeom>
-            <a:ln>
-              <a:solidFill>
-                <a:srgbClr val="FF0000"/>
-              </a:solidFill>
-              <a:tailEnd type="triangle"/>
-            </a:ln>
-          </p:spPr>
-          <p:style>
-            <a:lnRef idx="1">
-              <a:schemeClr val="accent1"/>
-            </a:lnRef>
-            <a:fillRef idx="0">
-              <a:schemeClr val="accent1"/>
-            </a:fillRef>
-            <a:effectRef idx="0">
-              <a:schemeClr val="accent1"/>
-            </a:effectRef>
-            <a:fontRef idx="minor">
-              <a:schemeClr val="tx1"/>
-            </a:fontRef>
-          </p:style>
-        </p:cxnSp>
-        <p:cxnSp>
-          <p:nvCxnSpPr>
-            <p:cNvPr id="47" name="Conector angulado 46"/>
-            <p:cNvCxnSpPr/>
-            <p:nvPr/>
-          </p:nvCxnSpPr>
-          <p:spPr>
-            <a:xfrm rot="5400000" flipH="1" flipV="1">
-              <a:off x="3602269" y="3581125"/>
-              <a:ext cx="844198" cy="156888"/>
-            </a:xfrm>
-            <a:prstGeom prst="bentConnector3">
-              <a:avLst/>
-            </a:prstGeom>
-            <a:ln>
-              <a:solidFill>
-                <a:srgbClr val="FF0000"/>
-              </a:solidFill>
-              <a:tailEnd type="triangle"/>
-            </a:ln>
-          </p:spPr>
-          <p:style>
-            <a:lnRef idx="1">
-              <a:schemeClr val="accent1"/>
-            </a:lnRef>
-            <a:fillRef idx="0">
-              <a:schemeClr val="accent1"/>
-            </a:fillRef>
-            <a:effectRef idx="0">
-              <a:schemeClr val="accent1"/>
-            </a:effectRef>
-            <a:fontRef idx="minor">
-              <a:schemeClr val="tx1"/>
-            </a:fontRef>
-          </p:style>
-        </p:cxnSp>
-        <p:cxnSp>
-          <p:nvCxnSpPr>
-            <p:cNvPr id="50" name="Conector angulado 49"/>
-            <p:cNvCxnSpPr/>
-            <p:nvPr/>
-          </p:nvCxnSpPr>
-          <p:spPr>
-            <a:xfrm rot="16200000" flipV="1">
-              <a:off x="3913007" y="3577419"/>
-              <a:ext cx="844198" cy="156888"/>
-            </a:xfrm>
-            <a:prstGeom prst="bentConnector3">
-              <a:avLst/>
-            </a:prstGeom>
-            <a:ln>
-              <a:solidFill>
-                <a:srgbClr val="FF0000"/>
-              </a:solidFill>
-              <a:tailEnd type="triangle"/>
-            </a:ln>
-          </p:spPr>
-          <p:style>
-            <a:lnRef idx="1">
-              <a:schemeClr val="accent1"/>
-            </a:lnRef>
-            <a:fillRef idx="0">
-              <a:schemeClr val="accent1"/>
-            </a:fillRef>
-            <a:effectRef idx="0">
-              <a:schemeClr val="accent1"/>
-            </a:effectRef>
-            <a:fontRef idx="minor">
-              <a:schemeClr val="tx1"/>
-            </a:fontRef>
-          </p:style>
-        </p:cxnSp>
-        <p:cxnSp>
-          <p:nvCxnSpPr>
-            <p:cNvPr id="52" name="Conector angulado 51"/>
-            <p:cNvCxnSpPr/>
-            <p:nvPr/>
-          </p:nvCxnSpPr>
-          <p:spPr>
-            <a:xfrm flipV="1">
-              <a:off x="4805038" y="3587578"/>
-              <a:ext cx="1022938" cy="424249"/>
-            </a:xfrm>
-            <a:prstGeom prst="bentConnector3">
-              <a:avLst/>
-            </a:prstGeom>
-            <a:ln>
-              <a:solidFill>
-                <a:srgbClr val="FF0000"/>
-              </a:solidFill>
-              <a:tailEnd type="triangle"/>
-            </a:ln>
-          </p:spPr>
-          <p:style>
-            <a:lnRef idx="1">
-              <a:schemeClr val="accent1"/>
-            </a:lnRef>
-            <a:fillRef idx="0">
-              <a:schemeClr val="accent1"/>
-            </a:fillRef>
-            <a:effectRef idx="0">
-              <a:schemeClr val="accent1"/>
-            </a:effectRef>
-            <a:fontRef idx="minor">
-              <a:schemeClr val="tx1"/>
-            </a:fontRef>
-          </p:style>
-        </p:cxnSp>
-        <p:cxnSp>
-          <p:nvCxnSpPr>
-            <p:cNvPr id="54" name="Conector angulado 53"/>
-            <p:cNvCxnSpPr/>
-            <p:nvPr/>
-          </p:nvCxnSpPr>
-          <p:spPr>
-            <a:xfrm flipV="1">
-              <a:off x="5008689" y="4266634"/>
-              <a:ext cx="2033859" cy="198274"/>
-            </a:xfrm>
-            <a:prstGeom prst="bentConnector3">
-              <a:avLst/>
-            </a:prstGeom>
-            <a:ln>
-              <a:solidFill>
-                <a:srgbClr val="FF0000"/>
-              </a:solidFill>
-              <a:tailEnd type="triangle"/>
-            </a:ln>
-          </p:spPr>
-          <p:style>
-            <a:lnRef idx="1">
-              <a:schemeClr val="accent1"/>
-            </a:lnRef>
-            <a:fillRef idx="0">
-              <a:schemeClr val="accent1"/>
-            </a:fillRef>
-            <a:effectRef idx="0">
-              <a:schemeClr val="accent1"/>
-            </a:effectRef>
-            <a:fontRef idx="minor">
-              <a:schemeClr val="tx1"/>
-            </a:fontRef>
-          </p:style>
-        </p:cxnSp>
-        <p:cxnSp>
-          <p:nvCxnSpPr>
-            <p:cNvPr id="57" name="Conector angulado 56"/>
-            <p:cNvCxnSpPr/>
-            <p:nvPr/>
-          </p:nvCxnSpPr>
-          <p:spPr>
-            <a:xfrm rot="10800000" flipV="1">
-              <a:off x="1367481" y="4941354"/>
-              <a:ext cx="2446638" cy="569759"/>
-            </a:xfrm>
-            <a:prstGeom prst="bentConnector3">
-              <a:avLst/>
-            </a:prstGeom>
-            <a:ln>
-              <a:solidFill>
-                <a:srgbClr val="FF0000"/>
-              </a:solidFill>
-              <a:tailEnd type="triangle"/>
-            </a:ln>
-          </p:spPr>
-          <p:style>
-            <a:lnRef idx="1">
-              <a:schemeClr val="accent1"/>
-            </a:lnRef>
-            <a:fillRef idx="0">
-              <a:schemeClr val="accent1"/>
-            </a:fillRef>
-            <a:effectRef idx="0">
-              <a:schemeClr val="accent1"/>
-            </a:effectRef>
-            <a:fontRef idx="minor">
-              <a:schemeClr val="tx1"/>
-            </a:fontRef>
-          </p:style>
-        </p:cxnSp>
-        <p:cxnSp>
-          <p:nvCxnSpPr>
-            <p:cNvPr id="59" name="Conector angulado 58"/>
-            <p:cNvCxnSpPr/>
-            <p:nvPr/>
-          </p:nvCxnSpPr>
-          <p:spPr>
-            <a:xfrm rot="10800000" flipV="1">
-              <a:off x="2297553" y="5648325"/>
-              <a:ext cx="1312422" cy="685800"/>
-            </a:xfrm>
-            <a:prstGeom prst="bentConnector3">
-              <a:avLst/>
-            </a:prstGeom>
-            <a:ln>
-              <a:solidFill>
-                <a:srgbClr val="FF0000"/>
-              </a:solidFill>
-              <a:tailEnd type="triangle"/>
-            </a:ln>
-          </p:spPr>
-          <p:style>
-            <a:lnRef idx="1">
-              <a:schemeClr val="accent1"/>
-            </a:lnRef>
-            <a:fillRef idx="0">
-              <a:schemeClr val="accent1"/>
-            </a:fillRef>
-            <a:effectRef idx="0">
-              <a:schemeClr val="accent1"/>
-            </a:effectRef>
-            <a:fontRef idx="minor">
-              <a:schemeClr val="tx1"/>
-            </a:fontRef>
-          </p:style>
-        </p:cxnSp>
-        <p:sp>
-          <p:nvSpPr>
-            <p:cNvPr id="60" name="CaixaDeTexto 59"/>
-            <p:cNvSpPr txBox="1"/>
-            <p:nvPr/>
-          </p:nvSpPr>
-          <p:spPr>
-            <a:xfrm>
-              <a:off x="1569154" y="2481424"/>
-              <a:ext cx="1083328" cy="307777"/>
-            </a:xfrm>
-            <a:prstGeom prst="rect">
-              <a:avLst/>
-            </a:prstGeom>
-          </p:spPr>
-          <p:style>
-            <a:lnRef idx="2">
-              <a:schemeClr val="dk1"/>
-            </a:lnRef>
-            <a:fillRef idx="1">
-              <a:schemeClr val="lt1"/>
-            </a:fillRef>
-            <a:effectRef idx="0">
-              <a:schemeClr val="dk1"/>
-            </a:effectRef>
-            <a:fontRef idx="minor">
-              <a:schemeClr val="dk1"/>
-            </a:fontRef>
-          </p:style>
-          <p:txBody>
-            <a:bodyPr wrap="square" rtlCol="0">
-              <a:spAutoFit/>
-            </a:bodyPr>
-            <a:lstStyle/>
-            <a:p>
-              <a:pPr algn="ctr"/>
-              <a:r>
-                <a:rPr lang="pt-BR" sz="1400" dirty="0" smtClean="0"/>
-                <a:t>Jogador 1</a:t>
-              </a:r>
-              <a:endParaRPr lang="pt-BR" sz="1400" dirty="0"/>
-            </a:p>
-          </p:txBody>
-        </p:sp>
-        <p:sp>
-          <p:nvSpPr>
-            <p:cNvPr id="61" name="CaixaDeTexto 60"/>
-            <p:cNvSpPr txBox="1"/>
-            <p:nvPr/>
-          </p:nvSpPr>
-          <p:spPr>
-            <a:xfrm>
-              <a:off x="3633906" y="2904421"/>
-              <a:ext cx="1083328" cy="307777"/>
-            </a:xfrm>
-            <a:prstGeom prst="rect">
-              <a:avLst/>
-            </a:prstGeom>
-          </p:spPr>
-          <p:style>
-            <a:lnRef idx="2">
-              <a:schemeClr val="dk1"/>
-            </a:lnRef>
-            <a:fillRef idx="1">
-              <a:schemeClr val="lt1"/>
-            </a:fillRef>
-            <a:effectRef idx="0">
-              <a:schemeClr val="dk1"/>
-            </a:effectRef>
-            <a:fontRef idx="minor">
-              <a:schemeClr val="dk1"/>
-            </a:fontRef>
-          </p:style>
-          <p:txBody>
-            <a:bodyPr wrap="square" rtlCol="0">
-              <a:spAutoFit/>
-            </a:bodyPr>
-            <a:lstStyle/>
-            <a:p>
-              <a:pPr algn="ctr"/>
-              <a:r>
-                <a:rPr lang="pt-BR" sz="1400" dirty="0" smtClean="0"/>
-                <a:t>Placar</a:t>
-              </a:r>
-              <a:endParaRPr lang="pt-BR" sz="1400" dirty="0"/>
-            </a:p>
-          </p:txBody>
-        </p:sp>
-        <p:sp>
-          <p:nvSpPr>
-            <p:cNvPr id="62" name="CaixaDeTexto 61"/>
-            <p:cNvSpPr txBox="1"/>
-            <p:nvPr/>
-          </p:nvSpPr>
-          <p:spPr>
-            <a:xfrm>
-              <a:off x="5868727" y="3438172"/>
-              <a:ext cx="1083328" cy="307777"/>
-            </a:xfrm>
-            <a:prstGeom prst="rect">
-              <a:avLst/>
-            </a:prstGeom>
-          </p:spPr>
-          <p:style>
-            <a:lnRef idx="2">
-              <a:schemeClr val="dk1"/>
-            </a:lnRef>
-            <a:fillRef idx="1">
-              <a:schemeClr val="lt1"/>
-            </a:fillRef>
-            <a:effectRef idx="0">
-              <a:schemeClr val="dk1"/>
-            </a:effectRef>
-            <a:fontRef idx="minor">
-              <a:schemeClr val="dk1"/>
-            </a:fontRef>
-          </p:style>
-          <p:txBody>
-            <a:bodyPr wrap="square" rtlCol="0">
-              <a:spAutoFit/>
-            </a:bodyPr>
-            <a:lstStyle/>
-            <a:p>
-              <a:pPr algn="ctr"/>
-              <a:r>
-                <a:rPr lang="pt-BR" sz="1400" dirty="0" smtClean="0"/>
-                <a:t>Coletas</a:t>
-              </a:r>
-              <a:endParaRPr lang="pt-BR" sz="1400" dirty="0"/>
-            </a:p>
-          </p:txBody>
-        </p:sp>
-        <p:sp>
-          <p:nvSpPr>
-            <p:cNvPr id="63" name="CaixaDeTexto 62"/>
-            <p:cNvSpPr txBox="1"/>
-            <p:nvPr/>
-          </p:nvSpPr>
-          <p:spPr>
-            <a:xfrm>
-              <a:off x="7089277" y="4112745"/>
-              <a:ext cx="1083328" cy="307777"/>
-            </a:xfrm>
-            <a:prstGeom prst="rect">
-              <a:avLst/>
-            </a:prstGeom>
-          </p:spPr>
-          <p:style>
-            <a:lnRef idx="2">
-              <a:schemeClr val="dk1"/>
-            </a:lnRef>
-            <a:fillRef idx="1">
-              <a:schemeClr val="lt1"/>
-            </a:fillRef>
-            <a:effectRef idx="0">
-              <a:schemeClr val="dk1"/>
-            </a:effectRef>
-            <a:fontRef idx="minor">
-              <a:schemeClr val="dk1"/>
-            </a:fontRef>
-          </p:style>
-          <p:txBody>
-            <a:bodyPr wrap="square" rtlCol="0">
-              <a:spAutoFit/>
-            </a:bodyPr>
-            <a:lstStyle/>
-            <a:p>
-              <a:pPr algn="ctr"/>
-              <a:r>
-                <a:rPr lang="pt-BR" sz="1400" dirty="0" smtClean="0"/>
-                <a:t>Plus</a:t>
-              </a:r>
-              <a:endParaRPr lang="pt-BR" sz="1400" dirty="0"/>
-            </a:p>
-          </p:txBody>
-        </p:sp>
-        <p:sp>
-          <p:nvSpPr>
-            <p:cNvPr id="64" name="CaixaDeTexto 63"/>
-            <p:cNvSpPr txBox="1"/>
-            <p:nvPr/>
-          </p:nvSpPr>
-          <p:spPr>
-            <a:xfrm>
-              <a:off x="6606563" y="6324600"/>
-              <a:ext cx="1083328" cy="307777"/>
-            </a:xfrm>
-            <a:prstGeom prst="rect">
-              <a:avLst/>
-            </a:prstGeom>
-          </p:spPr>
-          <p:style>
-            <a:lnRef idx="2">
-              <a:schemeClr val="dk1"/>
-            </a:lnRef>
-            <a:fillRef idx="1">
-              <a:schemeClr val="lt1"/>
-            </a:fillRef>
-            <a:effectRef idx="0">
-              <a:schemeClr val="dk1"/>
-            </a:effectRef>
-            <a:fontRef idx="minor">
-              <a:schemeClr val="dk1"/>
-            </a:fontRef>
-          </p:style>
-          <p:txBody>
-            <a:bodyPr wrap="square" rtlCol="0">
-              <a:spAutoFit/>
-            </a:bodyPr>
-            <a:lstStyle/>
-            <a:p>
-              <a:pPr algn="ctr"/>
-              <a:r>
-                <a:rPr lang="pt-BR" sz="1400" dirty="0" smtClean="0"/>
-                <a:t>Jogador 2</a:t>
-              </a:r>
-              <a:endParaRPr lang="pt-BR" sz="1400" dirty="0"/>
-            </a:p>
-          </p:txBody>
-        </p:sp>
-        <p:sp>
-          <p:nvSpPr>
-            <p:cNvPr id="65" name="CaixaDeTexto 64"/>
-            <p:cNvSpPr txBox="1"/>
-            <p:nvPr/>
-          </p:nvSpPr>
-          <p:spPr>
-            <a:xfrm>
-              <a:off x="1187948" y="6183142"/>
-              <a:ext cx="1083328" cy="307777"/>
-            </a:xfrm>
-            <a:prstGeom prst="rect">
-              <a:avLst/>
-            </a:prstGeom>
-          </p:spPr>
-          <p:style>
-            <a:lnRef idx="2">
-              <a:schemeClr val="dk1"/>
-            </a:lnRef>
-            <a:fillRef idx="1">
-              <a:schemeClr val="lt1"/>
-            </a:fillRef>
-            <a:effectRef idx="0">
-              <a:schemeClr val="dk1"/>
-            </a:effectRef>
-            <a:fontRef idx="minor">
-              <a:schemeClr val="dk1"/>
-            </a:fontRef>
-          </p:style>
-          <p:txBody>
-            <a:bodyPr wrap="square" rtlCol="0">
-              <a:spAutoFit/>
-            </a:bodyPr>
-            <a:lstStyle/>
-            <a:p>
-              <a:pPr algn="ctr"/>
-              <a:r>
-                <a:rPr lang="pt-BR" sz="1400" dirty="0" err="1" smtClean="0"/>
-                <a:t>Less</a:t>
-              </a:r>
-              <a:endParaRPr lang="pt-BR" sz="1400" dirty="0"/>
-            </a:p>
-          </p:txBody>
-        </p:sp>
-        <p:sp>
-          <p:nvSpPr>
-            <p:cNvPr id="66" name="CaixaDeTexto 65"/>
-            <p:cNvSpPr txBox="1"/>
-            <p:nvPr/>
-          </p:nvSpPr>
-          <p:spPr>
-            <a:xfrm>
-              <a:off x="258578" y="5366413"/>
-              <a:ext cx="1083328" cy="307777"/>
-            </a:xfrm>
-            <a:prstGeom prst="rect">
-              <a:avLst/>
-            </a:prstGeom>
-          </p:spPr>
-          <p:style>
-            <a:lnRef idx="2">
-              <a:schemeClr val="dk1"/>
-            </a:lnRef>
-            <a:fillRef idx="1">
-              <a:schemeClr val="lt1"/>
-            </a:fillRef>
-            <a:effectRef idx="0">
-              <a:schemeClr val="dk1"/>
-            </a:effectRef>
-            <a:fontRef idx="minor">
-              <a:schemeClr val="dk1"/>
-            </a:fontRef>
-          </p:style>
-          <p:txBody>
-            <a:bodyPr wrap="square" rtlCol="0">
-              <a:spAutoFit/>
-            </a:bodyPr>
-            <a:lstStyle/>
-            <a:p>
-              <a:pPr algn="ctr"/>
-              <a:r>
-                <a:rPr lang="pt-BR" sz="1400" dirty="0" smtClean="0"/>
-                <a:t>Disco</a:t>
-              </a:r>
-              <a:endParaRPr lang="pt-BR" sz="1400" dirty="0"/>
-            </a:p>
-          </p:txBody>
-        </p:sp>
-        <p:cxnSp>
-          <p:nvCxnSpPr>
-            <p:cNvPr id="69" name="Conector angulado 68"/>
-            <p:cNvCxnSpPr>
-              <a:stCxn id="7" idx="3"/>
-            </p:cNvCxnSpPr>
-            <p:nvPr/>
-          </p:nvCxnSpPr>
-          <p:spPr>
-            <a:xfrm>
-              <a:off x="5976753" y="4927417"/>
-              <a:ext cx="1374394" cy="583697"/>
-            </a:xfrm>
-            <a:prstGeom prst="bentConnector3">
-              <a:avLst/>
-            </a:prstGeom>
-            <a:ln>
-              <a:solidFill>
-                <a:srgbClr val="FF0000"/>
-              </a:solidFill>
-              <a:tailEnd type="triangle"/>
-            </a:ln>
-          </p:spPr>
-          <p:style>
-            <a:lnRef idx="1">
-              <a:schemeClr val="accent1"/>
-            </a:lnRef>
-            <a:fillRef idx="0">
-              <a:schemeClr val="accent1"/>
-            </a:fillRef>
-            <a:effectRef idx="0">
-              <a:schemeClr val="accent1"/>
-            </a:effectRef>
-            <a:fontRef idx="minor">
-              <a:schemeClr val="tx1"/>
-            </a:fontRef>
-          </p:style>
-        </p:cxnSp>
-        <p:sp>
-          <p:nvSpPr>
-            <p:cNvPr id="70" name="CaixaDeTexto 69"/>
-            <p:cNvSpPr txBox="1"/>
-            <p:nvPr/>
-          </p:nvSpPr>
-          <p:spPr>
-            <a:xfrm>
-              <a:off x="7377673" y="5366413"/>
-              <a:ext cx="1083328" cy="307777"/>
-            </a:xfrm>
-            <a:prstGeom prst="rect">
-              <a:avLst/>
-            </a:prstGeom>
-          </p:spPr>
-          <p:style>
-            <a:lnRef idx="2">
-              <a:schemeClr val="dk1"/>
-            </a:lnRef>
-            <a:fillRef idx="1">
-              <a:schemeClr val="lt1"/>
-            </a:fillRef>
-            <a:effectRef idx="0">
-              <a:schemeClr val="dk1"/>
-            </a:effectRef>
-            <a:fontRef idx="minor">
-              <a:schemeClr val="dk1"/>
-            </a:fontRef>
-          </p:style>
-          <p:txBody>
-            <a:bodyPr wrap="square" rtlCol="0">
-              <a:spAutoFit/>
-            </a:bodyPr>
-            <a:lstStyle/>
-            <a:p>
-              <a:pPr algn="ctr"/>
-              <a:r>
-                <a:rPr lang="pt-BR" sz="1400" dirty="0" smtClean="0"/>
-                <a:t>Gol</a:t>
-              </a:r>
-              <a:endParaRPr lang="pt-BR" sz="1400" dirty="0"/>
-            </a:p>
-          </p:txBody>
-        </p:sp>
-        <p:cxnSp>
-          <p:nvCxnSpPr>
-            <p:cNvPr id="72" name="Conector angulado 71"/>
-            <p:cNvCxnSpPr/>
-            <p:nvPr/>
-          </p:nvCxnSpPr>
-          <p:spPr>
-            <a:xfrm rot="10800000">
-              <a:off x="680297" y="3872618"/>
-              <a:ext cx="1860065" cy="511731"/>
-            </a:xfrm>
-            <a:prstGeom prst="bentConnector3">
-              <a:avLst/>
-            </a:prstGeom>
-            <a:ln>
-              <a:solidFill>
-                <a:srgbClr val="FF0000"/>
-              </a:solidFill>
-              <a:tailEnd type="triangle"/>
-            </a:ln>
-          </p:spPr>
-          <p:style>
-            <a:lnRef idx="1">
-              <a:schemeClr val="accent1"/>
-            </a:lnRef>
-            <a:fillRef idx="0">
-              <a:schemeClr val="accent1"/>
-            </a:fillRef>
-            <a:effectRef idx="0">
-              <a:schemeClr val="accent1"/>
-            </a:effectRef>
-            <a:fontRef idx="minor">
-              <a:schemeClr val="tx1"/>
-            </a:fontRef>
-          </p:style>
-        </p:cxnSp>
-        <p:sp>
-          <p:nvSpPr>
-            <p:cNvPr id="76" name="CaixaDeTexto 75"/>
-            <p:cNvSpPr txBox="1"/>
-            <p:nvPr/>
-          </p:nvSpPr>
-          <p:spPr>
-            <a:xfrm>
-              <a:off x="-446775" y="3728917"/>
-              <a:ext cx="1083328" cy="307777"/>
-            </a:xfrm>
-            <a:prstGeom prst="rect">
-              <a:avLst/>
-            </a:prstGeom>
-          </p:spPr>
-          <p:style>
-            <a:lnRef idx="2">
-              <a:schemeClr val="dk1"/>
-            </a:lnRef>
-            <a:fillRef idx="1">
-              <a:schemeClr val="lt1"/>
-            </a:fillRef>
-            <a:effectRef idx="0">
-              <a:schemeClr val="dk1"/>
-            </a:effectRef>
-            <a:fontRef idx="minor">
-              <a:schemeClr val="dk1"/>
-            </a:fontRef>
-          </p:style>
-          <p:txBody>
-            <a:bodyPr wrap="square" rtlCol="0">
-              <a:spAutoFit/>
-            </a:bodyPr>
-            <a:lstStyle/>
-            <a:p>
-              <a:pPr algn="ctr"/>
-              <a:r>
-                <a:rPr lang="pt-BR" sz="1400" dirty="0" smtClean="0"/>
-                <a:t>Campo</a:t>
-              </a:r>
-              <a:endParaRPr lang="pt-BR" sz="1400" dirty="0"/>
-            </a:p>
-          </p:txBody>
-        </p:sp>
-      </p:grpSp>
+      <p:pic>
+        <p:nvPicPr>
+          <p:cNvPr id="5" name="Imagem 4"/>
+          <p:cNvPicPr>
+            <a:picLocks noChangeAspect="1"/>
+          </p:cNvPicPr>
+          <p:nvPr/>
+        </p:nvPicPr>
+        <p:blipFill rotWithShape="1">
+          <a:blip r:embed="rId3">
+            <a:extLst>
+              <a:ext uri="{28A0092B-C50C-407E-A947-70E740481C1C}">
+                <a14:useLocalDpi xmlns:a14="http://schemas.microsoft.com/office/drawing/2010/main" val="0"/>
+              </a:ext>
+            </a:extLst>
+          </a:blip>
+          <a:srcRect l="27741" t="15015" r="24343" b="15796"/>
+          <a:stretch/>
+        </p:blipFill>
+        <p:spPr>
+          <a:xfrm rot="16200000">
+            <a:off x="2941277" y="2568858"/>
+            <a:ext cx="2323071" cy="4744994"/>
+          </a:xfrm>
+          <a:prstGeom prst="rect">
+            <a:avLst/>
+          </a:prstGeom>
+          <a:noFill/>
+          <a:ln w="9525">
+            <a:noFill/>
+          </a:ln>
+        </p:spPr>
+      </p:pic>
+      <p:sp>
+        <p:nvSpPr>
+          <p:cNvPr id="7" name="Retângulo 6"/>
+          <p:cNvSpPr/>
+          <p:nvPr/>
+        </p:nvSpPr>
+        <p:spPr>
+          <a:xfrm>
+            <a:off x="2297553" y="3890617"/>
+            <a:ext cx="3679200" cy="2073600"/>
+          </a:xfrm>
+          <a:prstGeom prst="rect">
+            <a:avLst/>
+          </a:prstGeom>
+          <a:blipFill dpi="0" rotWithShape="1">
+            <a:blip r:embed="rId4">
+              <a:extLst>
+                <a:ext uri="{28A0092B-C50C-407E-A947-70E740481C1C}">
+                  <a14:useLocalDpi xmlns:a14="http://schemas.microsoft.com/office/drawing/2010/main" val="0"/>
+                </a:ext>
+              </a:extLst>
+            </a:blip>
+            <a:srcRect/>
+            <a:stretch>
+              <a:fillRect/>
+            </a:stretch>
+          </a:blipFill>
+          <a:ln>
+            <a:noFill/>
+          </a:ln>
+        </p:spPr>
+        <p:style>
+          <a:lnRef idx="2">
+            <a:schemeClr val="accent1">
+              <a:shade val="50000"/>
+            </a:schemeClr>
+          </a:lnRef>
+          <a:fillRef idx="1">
+            <a:schemeClr val="accent1"/>
+          </a:fillRef>
+          <a:effectRef idx="0">
+            <a:schemeClr val="accent1"/>
+          </a:effectRef>
+          <a:fontRef idx="minor">
+            <a:schemeClr val="lt1"/>
+          </a:fontRef>
+        </p:style>
+        <p:txBody>
+          <a:bodyPr rtlCol="0" anchor="ctr"/>
+          <a:lstStyle/>
+          <a:p>
+            <a:pPr algn="ctr"/>
+            <a:endParaRPr lang="pt-BR"/>
+          </a:p>
+        </p:txBody>
+      </p:sp>
+      <p:cxnSp>
+        <p:nvCxnSpPr>
+          <p:cNvPr id="43" name="Conector angulado 42"/>
+          <p:cNvCxnSpPr/>
+          <p:nvPr/>
+        </p:nvCxnSpPr>
+        <p:spPr>
+          <a:xfrm rot="16200000" flipV="1">
+            <a:off x="1845277" y="3080951"/>
+            <a:ext cx="1540475" cy="1013255"/>
+          </a:xfrm>
+          <a:prstGeom prst="bentConnector3">
+            <a:avLst/>
+          </a:prstGeom>
+          <a:ln>
+            <a:solidFill>
+              <a:srgbClr val="FF0000"/>
+            </a:solidFill>
+            <a:tailEnd type="triangle"/>
+          </a:ln>
+        </p:spPr>
+        <p:style>
+          <a:lnRef idx="1">
+            <a:schemeClr val="dk1"/>
+          </a:lnRef>
+          <a:fillRef idx="0">
+            <a:schemeClr val="dk1"/>
+          </a:fillRef>
+          <a:effectRef idx="0">
+            <a:schemeClr val="dk1"/>
+          </a:effectRef>
+          <a:fontRef idx="minor">
+            <a:schemeClr val="tx1"/>
+          </a:fontRef>
+        </p:style>
+      </p:cxnSp>
+      <p:cxnSp>
+        <p:nvCxnSpPr>
+          <p:cNvPr id="45" name="Conector angulado 44"/>
+          <p:cNvCxnSpPr/>
+          <p:nvPr/>
+        </p:nvCxnSpPr>
+        <p:spPr>
+          <a:xfrm>
+            <a:off x="4859038" y="5511114"/>
+            <a:ext cx="1712962" cy="955589"/>
+          </a:xfrm>
+          <a:prstGeom prst="bentConnector3">
+            <a:avLst/>
+          </a:prstGeom>
+          <a:ln>
+            <a:solidFill>
+              <a:srgbClr val="FF0000"/>
+            </a:solidFill>
+            <a:tailEnd type="triangle"/>
+          </a:ln>
+        </p:spPr>
+        <p:style>
+          <a:lnRef idx="1">
+            <a:schemeClr val="accent1"/>
+          </a:lnRef>
+          <a:fillRef idx="0">
+            <a:schemeClr val="accent1"/>
+          </a:fillRef>
+          <a:effectRef idx="0">
+            <a:schemeClr val="accent1"/>
+          </a:effectRef>
+          <a:fontRef idx="minor">
+            <a:schemeClr val="tx1"/>
+          </a:fontRef>
+        </p:style>
+      </p:cxnSp>
+      <p:cxnSp>
+        <p:nvCxnSpPr>
+          <p:cNvPr id="47" name="Conector angulado 46"/>
+          <p:cNvCxnSpPr/>
+          <p:nvPr/>
+        </p:nvCxnSpPr>
+        <p:spPr>
+          <a:xfrm rot="5400000" flipH="1" flipV="1">
+            <a:off x="3602269" y="3581125"/>
+            <a:ext cx="844198" cy="156888"/>
+          </a:xfrm>
+          <a:prstGeom prst="bentConnector3">
+            <a:avLst/>
+          </a:prstGeom>
+          <a:ln>
+            <a:solidFill>
+              <a:srgbClr val="FF0000"/>
+            </a:solidFill>
+            <a:tailEnd type="triangle"/>
+          </a:ln>
+        </p:spPr>
+        <p:style>
+          <a:lnRef idx="1">
+            <a:schemeClr val="accent1"/>
+          </a:lnRef>
+          <a:fillRef idx="0">
+            <a:schemeClr val="accent1"/>
+          </a:fillRef>
+          <a:effectRef idx="0">
+            <a:schemeClr val="accent1"/>
+          </a:effectRef>
+          <a:fontRef idx="minor">
+            <a:schemeClr val="tx1"/>
+          </a:fontRef>
+        </p:style>
+      </p:cxnSp>
+      <p:cxnSp>
+        <p:nvCxnSpPr>
+          <p:cNvPr id="50" name="Conector angulado 49"/>
+          <p:cNvCxnSpPr/>
+          <p:nvPr/>
+        </p:nvCxnSpPr>
+        <p:spPr>
+          <a:xfrm rot="16200000" flipV="1">
+            <a:off x="3913007" y="3577419"/>
+            <a:ext cx="844198" cy="156888"/>
+          </a:xfrm>
+          <a:prstGeom prst="bentConnector3">
+            <a:avLst/>
+          </a:prstGeom>
+          <a:ln>
+            <a:solidFill>
+              <a:srgbClr val="FF0000"/>
+            </a:solidFill>
+            <a:tailEnd type="triangle"/>
+          </a:ln>
+        </p:spPr>
+        <p:style>
+          <a:lnRef idx="1">
+            <a:schemeClr val="accent1"/>
+          </a:lnRef>
+          <a:fillRef idx="0">
+            <a:schemeClr val="accent1"/>
+          </a:fillRef>
+          <a:effectRef idx="0">
+            <a:schemeClr val="accent1"/>
+          </a:effectRef>
+          <a:fontRef idx="minor">
+            <a:schemeClr val="tx1"/>
+          </a:fontRef>
+        </p:style>
+      </p:cxnSp>
+      <p:cxnSp>
+        <p:nvCxnSpPr>
+          <p:cNvPr id="52" name="Conector angulado 51"/>
+          <p:cNvCxnSpPr/>
+          <p:nvPr/>
+        </p:nvCxnSpPr>
+        <p:spPr>
+          <a:xfrm flipV="1">
+            <a:off x="4805038" y="3587578"/>
+            <a:ext cx="1022938" cy="424249"/>
+          </a:xfrm>
+          <a:prstGeom prst="bentConnector3">
+            <a:avLst/>
+          </a:prstGeom>
+          <a:ln>
+            <a:solidFill>
+              <a:srgbClr val="FF0000"/>
+            </a:solidFill>
+            <a:tailEnd type="triangle"/>
+          </a:ln>
+        </p:spPr>
+        <p:style>
+          <a:lnRef idx="1">
+            <a:schemeClr val="accent1"/>
+          </a:lnRef>
+          <a:fillRef idx="0">
+            <a:schemeClr val="accent1"/>
+          </a:fillRef>
+          <a:effectRef idx="0">
+            <a:schemeClr val="accent1"/>
+          </a:effectRef>
+          <a:fontRef idx="minor">
+            <a:schemeClr val="tx1"/>
+          </a:fontRef>
+        </p:style>
+      </p:cxnSp>
+      <p:cxnSp>
+        <p:nvCxnSpPr>
+          <p:cNvPr id="54" name="Conector angulado 53"/>
+          <p:cNvCxnSpPr/>
+          <p:nvPr/>
+        </p:nvCxnSpPr>
+        <p:spPr>
+          <a:xfrm flipV="1">
+            <a:off x="5008689" y="4266634"/>
+            <a:ext cx="2033859" cy="198274"/>
+          </a:xfrm>
+          <a:prstGeom prst="bentConnector3">
+            <a:avLst/>
+          </a:prstGeom>
+          <a:ln>
+            <a:solidFill>
+              <a:srgbClr val="FF0000"/>
+            </a:solidFill>
+            <a:tailEnd type="triangle"/>
+          </a:ln>
+        </p:spPr>
+        <p:style>
+          <a:lnRef idx="1">
+            <a:schemeClr val="accent1"/>
+          </a:lnRef>
+          <a:fillRef idx="0">
+            <a:schemeClr val="accent1"/>
+          </a:fillRef>
+          <a:effectRef idx="0">
+            <a:schemeClr val="accent1"/>
+          </a:effectRef>
+          <a:fontRef idx="minor">
+            <a:schemeClr val="tx1"/>
+          </a:fontRef>
+        </p:style>
+      </p:cxnSp>
+      <p:cxnSp>
+        <p:nvCxnSpPr>
+          <p:cNvPr id="57" name="Conector angulado 56"/>
+          <p:cNvCxnSpPr/>
+          <p:nvPr/>
+        </p:nvCxnSpPr>
+        <p:spPr>
+          <a:xfrm rot="10800000" flipV="1">
+            <a:off x="1367481" y="4941354"/>
+            <a:ext cx="2446638" cy="569759"/>
+          </a:xfrm>
+          <a:prstGeom prst="bentConnector3">
+            <a:avLst/>
+          </a:prstGeom>
+          <a:ln>
+            <a:solidFill>
+              <a:srgbClr val="FF0000"/>
+            </a:solidFill>
+            <a:tailEnd type="triangle"/>
+          </a:ln>
+        </p:spPr>
+        <p:style>
+          <a:lnRef idx="1">
+            <a:schemeClr val="accent1"/>
+          </a:lnRef>
+          <a:fillRef idx="0">
+            <a:schemeClr val="accent1"/>
+          </a:fillRef>
+          <a:effectRef idx="0">
+            <a:schemeClr val="accent1"/>
+          </a:effectRef>
+          <a:fontRef idx="minor">
+            <a:schemeClr val="tx1"/>
+          </a:fontRef>
+        </p:style>
+      </p:cxnSp>
+      <p:cxnSp>
+        <p:nvCxnSpPr>
+          <p:cNvPr id="59" name="Conector angulado 58"/>
+          <p:cNvCxnSpPr/>
+          <p:nvPr/>
+        </p:nvCxnSpPr>
+        <p:spPr>
+          <a:xfrm rot="10800000" flipV="1">
+            <a:off x="2297553" y="5648325"/>
+            <a:ext cx="1312422" cy="685800"/>
+          </a:xfrm>
+          <a:prstGeom prst="bentConnector3">
+            <a:avLst/>
+          </a:prstGeom>
+          <a:ln>
+            <a:solidFill>
+              <a:srgbClr val="FF0000"/>
+            </a:solidFill>
+            <a:tailEnd type="triangle"/>
+          </a:ln>
+        </p:spPr>
+        <p:style>
+          <a:lnRef idx="1">
+            <a:schemeClr val="accent1"/>
+          </a:lnRef>
+          <a:fillRef idx="0">
+            <a:schemeClr val="accent1"/>
+          </a:fillRef>
+          <a:effectRef idx="0">
+            <a:schemeClr val="accent1"/>
+          </a:effectRef>
+          <a:fontRef idx="minor">
+            <a:schemeClr val="tx1"/>
+          </a:fontRef>
+        </p:style>
+      </p:cxnSp>
+      <p:sp>
+        <p:nvSpPr>
+          <p:cNvPr id="60" name="CaixaDeTexto 59"/>
+          <p:cNvSpPr txBox="1"/>
+          <p:nvPr/>
+        </p:nvSpPr>
+        <p:spPr>
+          <a:xfrm>
+            <a:off x="1569154" y="2481424"/>
+            <a:ext cx="1083328" cy="307777"/>
+          </a:xfrm>
+          <a:prstGeom prst="rect">
+            <a:avLst/>
+          </a:prstGeom>
+        </p:spPr>
+        <p:style>
+          <a:lnRef idx="2">
+            <a:schemeClr val="dk1"/>
+          </a:lnRef>
+          <a:fillRef idx="1">
+            <a:schemeClr val="lt1"/>
+          </a:fillRef>
+          <a:effectRef idx="0">
+            <a:schemeClr val="dk1"/>
+          </a:effectRef>
+          <a:fontRef idx="minor">
+            <a:schemeClr val="dk1"/>
+          </a:fontRef>
+        </p:style>
+        <p:txBody>
+          <a:bodyPr wrap="square" rtlCol="0">
+            <a:spAutoFit/>
+          </a:bodyPr>
+          <a:lstStyle/>
+          <a:p>
+            <a:pPr algn="ctr"/>
+            <a:r>
+              <a:rPr lang="pt-BR" sz="1400" dirty="0" smtClean="0"/>
+              <a:t>Jogador 1</a:t>
+            </a:r>
+            <a:endParaRPr lang="pt-BR" sz="1400" dirty="0"/>
+          </a:p>
+        </p:txBody>
+      </p:sp>
+      <p:sp>
+        <p:nvSpPr>
+          <p:cNvPr id="61" name="CaixaDeTexto 60"/>
+          <p:cNvSpPr txBox="1"/>
+          <p:nvPr/>
+        </p:nvSpPr>
+        <p:spPr>
+          <a:xfrm>
+            <a:off x="3633906" y="2904421"/>
+            <a:ext cx="1083328" cy="307777"/>
+          </a:xfrm>
+          <a:prstGeom prst="rect">
+            <a:avLst/>
+          </a:prstGeom>
+        </p:spPr>
+        <p:style>
+          <a:lnRef idx="2">
+            <a:schemeClr val="dk1"/>
+          </a:lnRef>
+          <a:fillRef idx="1">
+            <a:schemeClr val="lt1"/>
+          </a:fillRef>
+          <a:effectRef idx="0">
+            <a:schemeClr val="dk1"/>
+          </a:effectRef>
+          <a:fontRef idx="minor">
+            <a:schemeClr val="dk1"/>
+          </a:fontRef>
+        </p:style>
+        <p:txBody>
+          <a:bodyPr wrap="square" rtlCol="0">
+            <a:spAutoFit/>
+          </a:bodyPr>
+          <a:lstStyle/>
+          <a:p>
+            <a:pPr algn="ctr"/>
+            <a:r>
+              <a:rPr lang="pt-BR" sz="1400" dirty="0" smtClean="0"/>
+              <a:t>Placar</a:t>
+            </a:r>
+            <a:endParaRPr lang="pt-BR" sz="1400" dirty="0"/>
+          </a:p>
+        </p:txBody>
+      </p:sp>
+      <p:sp>
+        <p:nvSpPr>
+          <p:cNvPr id="62" name="CaixaDeTexto 61"/>
+          <p:cNvSpPr txBox="1"/>
+          <p:nvPr/>
+        </p:nvSpPr>
+        <p:spPr>
+          <a:xfrm>
+            <a:off x="5868727" y="3438172"/>
+            <a:ext cx="1083328" cy="307777"/>
+          </a:xfrm>
+          <a:prstGeom prst="rect">
+            <a:avLst/>
+          </a:prstGeom>
+        </p:spPr>
+        <p:style>
+          <a:lnRef idx="2">
+            <a:schemeClr val="dk1"/>
+          </a:lnRef>
+          <a:fillRef idx="1">
+            <a:schemeClr val="lt1"/>
+          </a:fillRef>
+          <a:effectRef idx="0">
+            <a:schemeClr val="dk1"/>
+          </a:effectRef>
+          <a:fontRef idx="minor">
+            <a:schemeClr val="dk1"/>
+          </a:fontRef>
+        </p:style>
+        <p:txBody>
+          <a:bodyPr wrap="square" rtlCol="0">
+            <a:spAutoFit/>
+          </a:bodyPr>
+          <a:lstStyle/>
+          <a:p>
+            <a:pPr algn="ctr"/>
+            <a:r>
+              <a:rPr lang="pt-BR" sz="1400" dirty="0" smtClean="0"/>
+              <a:t>Coletas</a:t>
+            </a:r>
+            <a:endParaRPr lang="pt-BR" sz="1400" dirty="0"/>
+          </a:p>
+        </p:txBody>
+      </p:sp>
+      <p:sp>
+        <p:nvSpPr>
+          <p:cNvPr id="63" name="CaixaDeTexto 62"/>
+          <p:cNvSpPr txBox="1"/>
+          <p:nvPr/>
+        </p:nvSpPr>
+        <p:spPr>
+          <a:xfrm>
+            <a:off x="7089277" y="4112745"/>
+            <a:ext cx="1083328" cy="307777"/>
+          </a:xfrm>
+          <a:prstGeom prst="rect">
+            <a:avLst/>
+          </a:prstGeom>
+        </p:spPr>
+        <p:style>
+          <a:lnRef idx="2">
+            <a:schemeClr val="dk1"/>
+          </a:lnRef>
+          <a:fillRef idx="1">
+            <a:schemeClr val="lt1"/>
+          </a:fillRef>
+          <a:effectRef idx="0">
+            <a:schemeClr val="dk1"/>
+          </a:effectRef>
+          <a:fontRef idx="minor">
+            <a:schemeClr val="dk1"/>
+          </a:fontRef>
+        </p:style>
+        <p:txBody>
+          <a:bodyPr wrap="square" rtlCol="0">
+            <a:spAutoFit/>
+          </a:bodyPr>
+          <a:lstStyle/>
+          <a:p>
+            <a:pPr algn="ctr"/>
+            <a:r>
+              <a:rPr lang="pt-BR" sz="1400" dirty="0" smtClean="0"/>
+              <a:t>Plus</a:t>
+            </a:r>
+            <a:endParaRPr lang="pt-BR" sz="1400" dirty="0"/>
+          </a:p>
+        </p:txBody>
+      </p:sp>
+      <p:sp>
+        <p:nvSpPr>
+          <p:cNvPr id="64" name="CaixaDeTexto 63"/>
+          <p:cNvSpPr txBox="1"/>
+          <p:nvPr/>
+        </p:nvSpPr>
+        <p:spPr>
+          <a:xfrm>
+            <a:off x="6606563" y="6324600"/>
+            <a:ext cx="1083328" cy="307777"/>
+          </a:xfrm>
+          <a:prstGeom prst="rect">
+            <a:avLst/>
+          </a:prstGeom>
+        </p:spPr>
+        <p:style>
+          <a:lnRef idx="2">
+            <a:schemeClr val="dk1"/>
+          </a:lnRef>
+          <a:fillRef idx="1">
+            <a:schemeClr val="lt1"/>
+          </a:fillRef>
+          <a:effectRef idx="0">
+            <a:schemeClr val="dk1"/>
+          </a:effectRef>
+          <a:fontRef idx="minor">
+            <a:schemeClr val="dk1"/>
+          </a:fontRef>
+        </p:style>
+        <p:txBody>
+          <a:bodyPr wrap="square" rtlCol="0">
+            <a:spAutoFit/>
+          </a:bodyPr>
+          <a:lstStyle/>
+          <a:p>
+            <a:pPr algn="ctr"/>
+            <a:r>
+              <a:rPr lang="pt-BR" sz="1400" dirty="0" smtClean="0"/>
+              <a:t>Jogador 2</a:t>
+            </a:r>
+            <a:endParaRPr lang="pt-BR" sz="1400" dirty="0"/>
+          </a:p>
+        </p:txBody>
+      </p:sp>
+      <p:sp>
+        <p:nvSpPr>
+          <p:cNvPr id="65" name="CaixaDeTexto 64"/>
+          <p:cNvSpPr txBox="1"/>
+          <p:nvPr/>
+        </p:nvSpPr>
+        <p:spPr>
+          <a:xfrm>
+            <a:off x="1187948" y="6183142"/>
+            <a:ext cx="1083328" cy="307777"/>
+          </a:xfrm>
+          <a:prstGeom prst="rect">
+            <a:avLst/>
+          </a:prstGeom>
+        </p:spPr>
+        <p:style>
+          <a:lnRef idx="2">
+            <a:schemeClr val="dk1"/>
+          </a:lnRef>
+          <a:fillRef idx="1">
+            <a:schemeClr val="lt1"/>
+          </a:fillRef>
+          <a:effectRef idx="0">
+            <a:schemeClr val="dk1"/>
+          </a:effectRef>
+          <a:fontRef idx="minor">
+            <a:schemeClr val="dk1"/>
+          </a:fontRef>
+        </p:style>
+        <p:txBody>
+          <a:bodyPr wrap="square" rtlCol="0">
+            <a:spAutoFit/>
+          </a:bodyPr>
+          <a:lstStyle/>
+          <a:p>
+            <a:pPr algn="ctr"/>
+            <a:r>
+              <a:rPr lang="pt-BR" sz="1400" dirty="0" err="1" smtClean="0"/>
+              <a:t>Less</a:t>
+            </a:r>
+            <a:endParaRPr lang="pt-BR" sz="1400" dirty="0"/>
+          </a:p>
+        </p:txBody>
+      </p:sp>
+      <p:sp>
+        <p:nvSpPr>
+          <p:cNvPr id="66" name="CaixaDeTexto 65"/>
+          <p:cNvSpPr txBox="1"/>
+          <p:nvPr/>
+        </p:nvSpPr>
+        <p:spPr>
+          <a:xfrm>
+            <a:off x="258578" y="5366413"/>
+            <a:ext cx="1083328" cy="307777"/>
+          </a:xfrm>
+          <a:prstGeom prst="rect">
+            <a:avLst/>
+          </a:prstGeom>
+        </p:spPr>
+        <p:style>
+          <a:lnRef idx="2">
+            <a:schemeClr val="dk1"/>
+          </a:lnRef>
+          <a:fillRef idx="1">
+            <a:schemeClr val="lt1"/>
+          </a:fillRef>
+          <a:effectRef idx="0">
+            <a:schemeClr val="dk1"/>
+          </a:effectRef>
+          <a:fontRef idx="minor">
+            <a:schemeClr val="dk1"/>
+          </a:fontRef>
+        </p:style>
+        <p:txBody>
+          <a:bodyPr wrap="square" rtlCol="0">
+            <a:spAutoFit/>
+          </a:bodyPr>
+          <a:lstStyle/>
+          <a:p>
+            <a:pPr algn="ctr"/>
+            <a:r>
+              <a:rPr lang="pt-BR" sz="1400" dirty="0" smtClean="0"/>
+              <a:t>Disco</a:t>
+            </a:r>
+            <a:endParaRPr lang="pt-BR" sz="1400" dirty="0"/>
+          </a:p>
+        </p:txBody>
+      </p:sp>
+      <p:cxnSp>
+        <p:nvCxnSpPr>
+          <p:cNvPr id="69" name="Conector angulado 68"/>
+          <p:cNvCxnSpPr>
+            <a:stCxn id="7" idx="3"/>
+          </p:cNvCxnSpPr>
+          <p:nvPr/>
+        </p:nvCxnSpPr>
+        <p:spPr>
+          <a:xfrm>
+            <a:off x="5976753" y="4927417"/>
+            <a:ext cx="1374394" cy="583697"/>
+          </a:xfrm>
+          <a:prstGeom prst="bentConnector3">
+            <a:avLst/>
+          </a:prstGeom>
+          <a:ln>
+            <a:solidFill>
+              <a:srgbClr val="FF0000"/>
+            </a:solidFill>
+            <a:tailEnd type="triangle"/>
+          </a:ln>
+        </p:spPr>
+        <p:style>
+          <a:lnRef idx="1">
+            <a:schemeClr val="accent1"/>
+          </a:lnRef>
+          <a:fillRef idx="0">
+            <a:schemeClr val="accent1"/>
+          </a:fillRef>
+          <a:effectRef idx="0">
+            <a:schemeClr val="accent1"/>
+          </a:effectRef>
+          <a:fontRef idx="minor">
+            <a:schemeClr val="tx1"/>
+          </a:fontRef>
+        </p:style>
+      </p:cxnSp>
+      <p:sp>
+        <p:nvSpPr>
+          <p:cNvPr id="70" name="CaixaDeTexto 69"/>
+          <p:cNvSpPr txBox="1"/>
+          <p:nvPr/>
+        </p:nvSpPr>
+        <p:spPr>
+          <a:xfrm>
+            <a:off x="7377673" y="5366413"/>
+            <a:ext cx="1083328" cy="307777"/>
+          </a:xfrm>
+          <a:prstGeom prst="rect">
+            <a:avLst/>
+          </a:prstGeom>
+        </p:spPr>
+        <p:style>
+          <a:lnRef idx="2">
+            <a:schemeClr val="dk1"/>
+          </a:lnRef>
+          <a:fillRef idx="1">
+            <a:schemeClr val="lt1"/>
+          </a:fillRef>
+          <a:effectRef idx="0">
+            <a:schemeClr val="dk1"/>
+          </a:effectRef>
+          <a:fontRef idx="minor">
+            <a:schemeClr val="dk1"/>
+          </a:fontRef>
+        </p:style>
+        <p:txBody>
+          <a:bodyPr wrap="square" rtlCol="0">
+            <a:spAutoFit/>
+          </a:bodyPr>
+          <a:lstStyle/>
+          <a:p>
+            <a:pPr algn="ctr"/>
+            <a:r>
+              <a:rPr lang="pt-BR" sz="1400" dirty="0" smtClean="0"/>
+              <a:t>Gol</a:t>
+            </a:r>
+            <a:endParaRPr lang="pt-BR" sz="1400" dirty="0"/>
+          </a:p>
+        </p:txBody>
+      </p:sp>
+      <p:cxnSp>
+        <p:nvCxnSpPr>
+          <p:cNvPr id="72" name="Conector angulado 71"/>
+          <p:cNvCxnSpPr/>
+          <p:nvPr/>
+        </p:nvCxnSpPr>
+        <p:spPr>
+          <a:xfrm rot="10800000">
+            <a:off x="680297" y="3872618"/>
+            <a:ext cx="1860065" cy="511731"/>
+          </a:xfrm>
+          <a:prstGeom prst="bentConnector3">
+            <a:avLst/>
+          </a:prstGeom>
+          <a:ln>
+            <a:solidFill>
+              <a:srgbClr val="FF0000"/>
+            </a:solidFill>
+            <a:tailEnd type="triangle"/>
+          </a:ln>
+        </p:spPr>
+        <p:style>
+          <a:lnRef idx="1">
+            <a:schemeClr val="accent1"/>
+          </a:lnRef>
+          <a:fillRef idx="0">
+            <a:schemeClr val="accent1"/>
+          </a:fillRef>
+          <a:effectRef idx="0">
+            <a:schemeClr val="accent1"/>
+          </a:effectRef>
+          <a:fontRef idx="minor">
+            <a:schemeClr val="tx1"/>
+          </a:fontRef>
+        </p:style>
+      </p:cxnSp>
+      <p:sp>
+        <p:nvSpPr>
+          <p:cNvPr id="76" name="CaixaDeTexto 75"/>
+          <p:cNvSpPr txBox="1"/>
+          <p:nvPr/>
+        </p:nvSpPr>
+        <p:spPr>
+          <a:xfrm>
+            <a:off x="-446775" y="3728917"/>
+            <a:ext cx="1083328" cy="307777"/>
+          </a:xfrm>
+          <a:prstGeom prst="rect">
+            <a:avLst/>
+          </a:prstGeom>
+        </p:spPr>
+        <p:style>
+          <a:lnRef idx="2">
+            <a:schemeClr val="dk1"/>
+          </a:lnRef>
+          <a:fillRef idx="1">
+            <a:schemeClr val="lt1"/>
+          </a:fillRef>
+          <a:effectRef idx="0">
+            <a:schemeClr val="dk1"/>
+          </a:effectRef>
+          <a:fontRef idx="minor">
+            <a:schemeClr val="dk1"/>
+          </a:fontRef>
+        </p:style>
+        <p:txBody>
+          <a:bodyPr wrap="square" rtlCol="0">
+            <a:spAutoFit/>
+          </a:bodyPr>
+          <a:lstStyle/>
+          <a:p>
+            <a:pPr algn="ctr"/>
+            <a:r>
+              <a:rPr lang="pt-BR" sz="1400" dirty="0" smtClean="0"/>
+              <a:t>Campo</a:t>
+            </a:r>
+            <a:endParaRPr lang="pt-BR" sz="1400" dirty="0"/>
+          </a:p>
+        </p:txBody>
+      </p:sp>
     </p:spTree>
     <p:extLst>
       <p:ext uri="{BB962C8B-B14F-4D97-AF65-F5344CB8AC3E}">
@@ -5074,7 +5044,7 @@
         </p:blipFill>
         <p:spPr>
           <a:xfrm>
-            <a:off x="6814661" y="1160056"/>
+            <a:off x="8427811" y="1160056"/>
             <a:ext cx="2103302" cy="3706689"/>
           </a:xfrm>
           <a:prstGeom prst="rect">
@@ -5098,9 +5068,19 @@
               <a:gd name="adj1" fmla="val 725"/>
             </a:avLst>
           </a:prstGeom>
-          <a:solidFill>
-            <a:schemeClr val="accent2"/>
-          </a:solidFill>
+          <a:blipFill dpi="0" rotWithShape="1">
+            <a:blip r:embed="rId3">
+              <a:extLst>
+                <a:ext uri="{28A0092B-C50C-407E-A947-70E740481C1C}">
+                  <a14:useLocalDpi xmlns:a14="http://schemas.microsoft.com/office/drawing/2010/main" val="0"/>
+                </a:ext>
+              </a:extLst>
+            </a:blip>
+            <a:srcRect/>
+            <a:stretch>
+              <a:fillRect/>
+            </a:stretch>
+          </a:blipFill>
           <a:ln/>
         </p:spPr>
         <p:style>
@@ -5185,7 +5165,7 @@
             <a:avLst/>
           </a:prstGeom>
           <a:blipFill dpi="0" rotWithShape="1">
-            <a:blip r:embed="rId3">
+            <a:blip r:embed="rId4">
               <a:extLst>
                 <a:ext uri="{28A0092B-C50C-407E-A947-70E740481C1C}">
                   <a14:useLocalDpi xmlns:a14="http://schemas.microsoft.com/office/drawing/2010/main" val="0"/>
@@ -5235,7 +5215,7 @@
           <p:nvPr/>
         </p:nvPicPr>
         <p:blipFill rotWithShape="1">
-          <a:blip r:embed="rId4">
+          <a:blip r:embed="rId5">
             <a:extLst>
               <a:ext uri="{28A0092B-C50C-407E-A947-70E740481C1C}">
                 <a14:useLocalDpi xmlns:a14="http://schemas.microsoft.com/office/drawing/2010/main" val="0"/>
@@ -5745,25 +5725,962 @@
           </a:p>
         </p:txBody>
       </p:sp>
-      <p:sp>
-        <p:nvSpPr>
-          <p:cNvPr id="21" name="Elipse 20"/>
+      <p:pic>
+        <p:nvPicPr>
+          <p:cNvPr id="18" name="Imagem 17"/>
+          <p:cNvPicPr>
+            <a:picLocks noChangeAspect="1"/>
+          </p:cNvPicPr>
+          <p:nvPr/>
+        </p:nvPicPr>
+        <p:blipFill rotWithShape="1">
+          <a:blip r:embed="rId5">
+            <a:extLst>
+              <a:ext uri="{28A0092B-C50C-407E-A947-70E740481C1C}">
+                <a14:useLocalDpi xmlns:a14="http://schemas.microsoft.com/office/drawing/2010/main" val="0"/>
+              </a:ext>
+            </a:extLst>
+          </a:blip>
+          <a:srcRect l="75584" t="37944" r="17074" b="49208"/>
+          <a:stretch/>
+        </p:blipFill>
+        <p:spPr>
+          <a:xfrm>
+            <a:off x="6252152" y="4331989"/>
+            <a:ext cx="263867" cy="307846"/>
+          </a:xfrm>
+          <a:prstGeom prst="rect">
+            <a:avLst/>
+          </a:prstGeom>
+        </p:spPr>
+      </p:pic>
+      <p:pic>
+        <p:nvPicPr>
+          <p:cNvPr id="25" name="Imagem 24"/>
+          <p:cNvPicPr>
+            <a:picLocks noChangeAspect="1"/>
+          </p:cNvPicPr>
+          <p:nvPr/>
+        </p:nvPicPr>
+        <p:blipFill rotWithShape="1">
+          <a:blip r:embed="rId6">
+            <a:extLst>
+              <a:ext uri="{28A0092B-C50C-407E-A947-70E740481C1C}">
+                <a14:useLocalDpi xmlns:a14="http://schemas.microsoft.com/office/drawing/2010/main" val="0"/>
+              </a:ext>
+            </a:extLst>
+          </a:blip>
+          <a:srcRect t="87428" r="91543" b="-1"/>
+          <a:stretch/>
+        </p:blipFill>
+        <p:spPr>
+          <a:xfrm>
+            <a:off x="7929518" y="2453860"/>
+            <a:ext cx="363225" cy="360000"/>
+          </a:xfrm>
+          <a:prstGeom prst="rect">
+            <a:avLst/>
+          </a:prstGeom>
+        </p:spPr>
+      </p:pic>
+      <p:pic>
+        <p:nvPicPr>
+          <p:cNvPr id="27" name="Imagem 26"/>
+          <p:cNvPicPr>
+            <a:picLocks noChangeAspect="1"/>
+          </p:cNvPicPr>
+          <p:nvPr/>
+        </p:nvPicPr>
+        <p:blipFill rotWithShape="1">
+          <a:blip r:embed="rId5">
+            <a:extLst>
+              <a:ext uri="{28A0092B-C50C-407E-A947-70E740481C1C}">
+                <a14:useLocalDpi xmlns:a14="http://schemas.microsoft.com/office/drawing/2010/main" val="0"/>
+              </a:ext>
+            </a:extLst>
+          </a:blip>
+          <a:srcRect l="74952" t="24920" r="16651" b="62154"/>
+          <a:stretch/>
+        </p:blipFill>
+        <p:spPr>
+          <a:xfrm>
+            <a:off x="6932308" y="4314068"/>
+            <a:ext cx="344515" cy="353571"/>
+          </a:xfrm>
+          <a:prstGeom prst="rect">
+            <a:avLst/>
+          </a:prstGeom>
+        </p:spPr>
+      </p:pic>
+      <p:pic>
+        <p:nvPicPr>
+          <p:cNvPr id="23" name="Imagem 22"/>
+          <p:cNvPicPr>
+            <a:picLocks noChangeAspect="1"/>
+          </p:cNvPicPr>
+          <p:nvPr/>
+        </p:nvPicPr>
+        <p:blipFill rotWithShape="1">
+          <a:blip r:embed="rId4" cstate="print">
+            <a:extLst>
+              <a:ext uri="{28A0092B-C50C-407E-A947-70E740481C1C}">
+                <a14:useLocalDpi xmlns:a14="http://schemas.microsoft.com/office/drawing/2010/main" val="0"/>
+              </a:ext>
+            </a:extLst>
+          </a:blip>
+          <a:srcRect l="84740" r="9755" b="86363"/>
+          <a:stretch/>
+        </p:blipFill>
+        <p:spPr>
+          <a:xfrm>
+            <a:off x="5184019" y="2809975"/>
+            <a:ext cx="261578" cy="432000"/>
+          </a:xfrm>
+          <a:prstGeom prst="rect">
+            <a:avLst/>
+          </a:prstGeom>
+        </p:spPr>
+      </p:pic>
+      <p:pic>
+        <p:nvPicPr>
+          <p:cNvPr id="28" name="Imagem 27"/>
+          <p:cNvPicPr>
+            <a:picLocks noChangeAspect="1"/>
+          </p:cNvPicPr>
+          <p:nvPr/>
+        </p:nvPicPr>
+        <p:blipFill rotWithShape="1">
+          <a:blip r:embed="rId3">
+            <a:extLst>
+              <a:ext uri="{28A0092B-C50C-407E-A947-70E740481C1C}">
+                <a14:useLocalDpi xmlns:a14="http://schemas.microsoft.com/office/drawing/2010/main" val="0"/>
+              </a:ext>
+            </a:extLst>
+          </a:blip>
+          <a:srcRect l="34024" t="1" r="50240" b="79579"/>
+          <a:stretch/>
+        </p:blipFill>
+        <p:spPr>
+          <a:xfrm>
+            <a:off x="4462914" y="2539719"/>
+            <a:ext cx="554823" cy="720000"/>
+          </a:xfrm>
+          <a:prstGeom prst="rect">
+            <a:avLst/>
+          </a:prstGeom>
+        </p:spPr>
+      </p:pic>
+      <p:pic>
+        <p:nvPicPr>
+          <p:cNvPr id="29" name="Imagem 28"/>
+          <p:cNvPicPr>
+            <a:picLocks noChangeAspect="1"/>
+          </p:cNvPicPr>
+          <p:nvPr/>
+        </p:nvPicPr>
+        <p:blipFill rotWithShape="1">
+          <a:blip r:embed="rId3">
+            <a:extLst>
+              <a:ext uri="{28A0092B-C50C-407E-A947-70E740481C1C}">
+                <a14:useLocalDpi xmlns:a14="http://schemas.microsoft.com/office/drawing/2010/main" val="0"/>
+              </a:ext>
+            </a:extLst>
+          </a:blip>
+          <a:srcRect l="49880" t="241" r="33062" b="79098"/>
+          <a:stretch/>
+        </p:blipFill>
+        <p:spPr>
+          <a:xfrm>
+            <a:off x="6149598" y="1947196"/>
+            <a:ext cx="891628" cy="1080000"/>
+          </a:xfrm>
+          <a:prstGeom prst="rect">
+            <a:avLst/>
+          </a:prstGeom>
+        </p:spPr>
+      </p:pic>
+      <p:pic>
+        <p:nvPicPr>
+          <p:cNvPr id="30" name="Imagem 29"/>
+          <p:cNvPicPr>
+            <a:picLocks noChangeAspect="1"/>
+          </p:cNvPicPr>
+          <p:nvPr/>
+        </p:nvPicPr>
+        <p:blipFill rotWithShape="1">
+          <a:blip r:embed="rId3">
+            <a:extLst>
+              <a:ext uri="{28A0092B-C50C-407E-A947-70E740481C1C}">
+                <a14:useLocalDpi xmlns:a14="http://schemas.microsoft.com/office/drawing/2010/main" val="0"/>
+              </a:ext>
+            </a:extLst>
+          </a:blip>
+          <a:srcRect l="34024" t="1" r="50240" b="79579"/>
+          <a:stretch/>
+        </p:blipFill>
+        <p:spPr>
+          <a:xfrm>
+            <a:off x="4677424" y="4107991"/>
+            <a:ext cx="554823" cy="720000"/>
+          </a:xfrm>
+          <a:prstGeom prst="rect">
+            <a:avLst/>
+          </a:prstGeom>
+        </p:spPr>
+      </p:pic>
+      <p:pic>
+        <p:nvPicPr>
+          <p:cNvPr id="31" name="Imagem 30"/>
+          <p:cNvPicPr>
+            <a:picLocks noChangeAspect="1"/>
+          </p:cNvPicPr>
+          <p:nvPr/>
+        </p:nvPicPr>
+        <p:blipFill rotWithShape="1">
+          <a:blip r:embed="rId3">
+            <a:extLst>
+              <a:ext uri="{28A0092B-C50C-407E-A947-70E740481C1C}">
+                <a14:useLocalDpi xmlns:a14="http://schemas.microsoft.com/office/drawing/2010/main" val="0"/>
+              </a:ext>
+            </a:extLst>
+          </a:blip>
+          <a:srcRect l="34024" t="1" r="50240" b="79579"/>
+          <a:stretch/>
+        </p:blipFill>
+        <p:spPr>
+          <a:xfrm>
+            <a:off x="7652106" y="2939450"/>
+            <a:ext cx="554823" cy="720000"/>
+          </a:xfrm>
+          <a:prstGeom prst="rect">
+            <a:avLst/>
+          </a:prstGeom>
+        </p:spPr>
+      </p:pic>
+      <p:pic>
+        <p:nvPicPr>
+          <p:cNvPr id="32" name="Imagem 31"/>
+          <p:cNvPicPr>
+            <a:picLocks noChangeAspect="1"/>
+          </p:cNvPicPr>
+          <p:nvPr/>
+        </p:nvPicPr>
+        <p:blipFill rotWithShape="1">
+          <a:blip r:embed="rId3">
+            <a:extLst>
+              <a:ext uri="{28A0092B-C50C-407E-A947-70E740481C1C}">
+                <a14:useLocalDpi xmlns:a14="http://schemas.microsoft.com/office/drawing/2010/main" val="0"/>
+              </a:ext>
+            </a:extLst>
+          </a:blip>
+          <a:srcRect l="34024" t="1" r="50240" b="79579"/>
+          <a:stretch/>
+        </p:blipFill>
+        <p:spPr>
+          <a:xfrm>
+            <a:off x="7360343" y="3027196"/>
+            <a:ext cx="554823" cy="720000"/>
+          </a:xfrm>
+          <a:prstGeom prst="rect">
+            <a:avLst/>
+          </a:prstGeom>
+        </p:spPr>
+      </p:pic>
+      <p:pic>
+        <p:nvPicPr>
+          <p:cNvPr id="33" name="Imagem 32"/>
+          <p:cNvPicPr>
+            <a:picLocks noChangeAspect="1"/>
+          </p:cNvPicPr>
+          <p:nvPr/>
+        </p:nvPicPr>
+        <p:blipFill rotWithShape="1">
+          <a:blip r:embed="rId3">
+            <a:extLst>
+              <a:ext uri="{28A0092B-C50C-407E-A947-70E740481C1C}">
+                <a14:useLocalDpi xmlns:a14="http://schemas.microsoft.com/office/drawing/2010/main" val="0"/>
+              </a:ext>
+            </a:extLst>
+          </a:blip>
+          <a:srcRect l="34024" t="1" r="50240" b="79579"/>
+          <a:stretch/>
+        </p:blipFill>
+        <p:spPr>
+          <a:xfrm>
+            <a:off x="7598859" y="3250428"/>
+            <a:ext cx="554823" cy="720000"/>
+          </a:xfrm>
+          <a:prstGeom prst="rect">
+            <a:avLst/>
+          </a:prstGeom>
+        </p:spPr>
+      </p:pic>
+      <p:pic>
+        <p:nvPicPr>
+          <p:cNvPr id="35" name="Imagem 34"/>
+          <p:cNvPicPr>
+            <a:picLocks noChangeAspect="1"/>
+          </p:cNvPicPr>
+          <p:nvPr/>
+        </p:nvPicPr>
+        <p:blipFill rotWithShape="1">
+          <a:blip r:embed="rId3">
+            <a:extLst>
+              <a:ext uri="{28A0092B-C50C-407E-A947-70E740481C1C}">
+                <a14:useLocalDpi xmlns:a14="http://schemas.microsoft.com/office/drawing/2010/main" val="0"/>
+              </a:ext>
+            </a:extLst>
+          </a:blip>
+          <a:srcRect l="34024" t="1" r="50240" b="79579"/>
+          <a:stretch/>
+        </p:blipFill>
+        <p:spPr>
+          <a:xfrm>
+            <a:off x="5441011" y="3164759"/>
+            <a:ext cx="554823" cy="720000"/>
+          </a:xfrm>
+          <a:prstGeom prst="rect">
+            <a:avLst/>
+          </a:prstGeom>
+        </p:spPr>
+      </p:pic>
+      <p:pic>
+        <p:nvPicPr>
+          <p:cNvPr id="36" name="Imagem 35"/>
+          <p:cNvPicPr>
+            <a:picLocks noChangeAspect="1"/>
+          </p:cNvPicPr>
+          <p:nvPr/>
+        </p:nvPicPr>
+        <p:blipFill rotWithShape="1">
+          <a:blip r:embed="rId3">
+            <a:extLst>
+              <a:ext uri="{28A0092B-C50C-407E-A947-70E740481C1C}">
+                <a14:useLocalDpi xmlns:a14="http://schemas.microsoft.com/office/drawing/2010/main" val="0"/>
+              </a:ext>
+            </a:extLst>
+          </a:blip>
+          <a:srcRect l="34024" t="1" r="50240" b="79579"/>
+          <a:stretch/>
+        </p:blipFill>
+        <p:spPr>
+          <a:xfrm>
+            <a:off x="5677467" y="3347027"/>
+            <a:ext cx="554823" cy="720000"/>
+          </a:xfrm>
+          <a:prstGeom prst="rect">
+            <a:avLst/>
+          </a:prstGeom>
+        </p:spPr>
+      </p:pic>
+      <p:pic>
+        <p:nvPicPr>
+          <p:cNvPr id="37" name="Imagem 36"/>
+          <p:cNvPicPr>
+            <a:picLocks noChangeAspect="1"/>
+          </p:cNvPicPr>
+          <p:nvPr/>
+        </p:nvPicPr>
+        <p:blipFill rotWithShape="1">
+          <a:blip r:embed="rId3">
+            <a:extLst>
+              <a:ext uri="{28A0092B-C50C-407E-A947-70E740481C1C}">
+                <a14:useLocalDpi xmlns:a14="http://schemas.microsoft.com/office/drawing/2010/main" val="0"/>
+              </a:ext>
+            </a:extLst>
+          </a:blip>
+          <a:srcRect l="34024" t="1" r="50240" b="79579"/>
+          <a:stretch/>
+        </p:blipFill>
+        <p:spPr>
+          <a:xfrm>
+            <a:off x="4615314" y="2692119"/>
+            <a:ext cx="554823" cy="720000"/>
+          </a:xfrm>
+          <a:prstGeom prst="rect">
+            <a:avLst/>
+          </a:prstGeom>
+        </p:spPr>
+      </p:pic>
+      <p:pic>
+        <p:nvPicPr>
+          <p:cNvPr id="39" name="Imagem 38"/>
+          <p:cNvPicPr>
+            <a:picLocks noChangeAspect="1"/>
+          </p:cNvPicPr>
+          <p:nvPr/>
+        </p:nvPicPr>
+        <p:blipFill rotWithShape="1">
+          <a:blip r:embed="rId3">
+            <a:extLst>
+              <a:ext uri="{28A0092B-C50C-407E-A947-70E740481C1C}">
+                <a14:useLocalDpi xmlns:a14="http://schemas.microsoft.com/office/drawing/2010/main" val="0"/>
+              </a:ext>
+            </a:extLst>
+          </a:blip>
+          <a:srcRect l="34024" t="1" r="50240" b="79579"/>
+          <a:stretch/>
+        </p:blipFill>
+        <p:spPr>
+          <a:xfrm>
+            <a:off x="7543755" y="4592263"/>
+            <a:ext cx="554823" cy="720000"/>
+          </a:xfrm>
+          <a:prstGeom prst="rect">
+            <a:avLst/>
+          </a:prstGeom>
+        </p:spPr>
+      </p:pic>
+      <p:pic>
+        <p:nvPicPr>
+          <p:cNvPr id="38" name="Imagem 37"/>
+          <p:cNvPicPr>
+            <a:picLocks noChangeAspect="1"/>
+          </p:cNvPicPr>
+          <p:nvPr/>
+        </p:nvPicPr>
+        <p:blipFill rotWithShape="1">
+          <a:blip r:embed="rId3">
+            <a:extLst>
+              <a:ext uri="{28A0092B-C50C-407E-A947-70E740481C1C}">
+                <a14:useLocalDpi xmlns:a14="http://schemas.microsoft.com/office/drawing/2010/main" val="0"/>
+              </a:ext>
+            </a:extLst>
+          </a:blip>
+          <a:srcRect l="34024" t="1" r="50240" b="79579"/>
+          <a:stretch/>
+        </p:blipFill>
+        <p:spPr>
+          <a:xfrm>
+            <a:off x="7323234" y="4680009"/>
+            <a:ext cx="554823" cy="720000"/>
+          </a:xfrm>
+          <a:prstGeom prst="rect">
+            <a:avLst/>
+          </a:prstGeom>
+        </p:spPr>
+      </p:pic>
+      <p:pic>
+        <p:nvPicPr>
+          <p:cNvPr id="41" name="Imagem 40"/>
+          <p:cNvPicPr>
+            <a:picLocks noChangeAspect="1"/>
+          </p:cNvPicPr>
+          <p:nvPr/>
+        </p:nvPicPr>
+        <p:blipFill rotWithShape="1">
+          <a:blip r:embed="rId7">
+            <a:extLst>
+              <a:ext uri="{28A0092B-C50C-407E-A947-70E740481C1C}">
+                <a14:useLocalDpi xmlns:a14="http://schemas.microsoft.com/office/drawing/2010/main" val="0"/>
+              </a:ext>
+            </a:extLst>
+          </a:blip>
+          <a:srcRect l="43556" t="14889" r="50123" b="78465"/>
+          <a:stretch/>
+        </p:blipFill>
+        <p:spPr>
+          <a:xfrm>
+            <a:off x="7218581" y="2019562"/>
+            <a:ext cx="433525" cy="455780"/>
+          </a:xfrm>
+          <a:prstGeom prst="rect">
+            <a:avLst/>
+          </a:prstGeom>
+        </p:spPr>
+      </p:pic>
+      <p:pic>
+        <p:nvPicPr>
+          <p:cNvPr id="42" name="Imagem 41"/>
+          <p:cNvPicPr>
+            <a:picLocks noChangeAspect="1"/>
+          </p:cNvPicPr>
+          <p:nvPr/>
+        </p:nvPicPr>
+        <p:blipFill rotWithShape="1">
+          <a:blip r:embed="rId7">
+            <a:extLst>
+              <a:ext uri="{28A0092B-C50C-407E-A947-70E740481C1C}">
+                <a14:useLocalDpi xmlns:a14="http://schemas.microsoft.com/office/drawing/2010/main" val="0"/>
+              </a:ext>
+            </a:extLst>
+          </a:blip>
+          <a:srcRect l="43556" t="14889" r="50123" b="78465"/>
+          <a:stretch/>
+        </p:blipFill>
+        <p:spPr>
+          <a:xfrm>
+            <a:off x="5119323" y="2160139"/>
+            <a:ext cx="433525" cy="455780"/>
+          </a:xfrm>
+          <a:prstGeom prst="rect">
+            <a:avLst/>
+          </a:prstGeom>
+        </p:spPr>
+      </p:pic>
+      <p:pic>
+        <p:nvPicPr>
+          <p:cNvPr id="43" name="Imagem 42"/>
+          <p:cNvPicPr>
+            <a:picLocks noChangeAspect="1"/>
+          </p:cNvPicPr>
+          <p:nvPr/>
+        </p:nvPicPr>
+        <p:blipFill rotWithShape="1">
+          <a:blip r:embed="rId7">
+            <a:extLst>
+              <a:ext uri="{28A0092B-C50C-407E-A947-70E740481C1C}">
+                <a14:useLocalDpi xmlns:a14="http://schemas.microsoft.com/office/drawing/2010/main" val="0"/>
+              </a:ext>
+            </a:extLst>
+          </a:blip>
+          <a:srcRect l="43556" t="14889" r="50123" b="78465"/>
+          <a:stretch/>
+        </p:blipFill>
+        <p:spPr>
+          <a:xfrm>
+            <a:off x="5262516" y="2259306"/>
+            <a:ext cx="433525" cy="455780"/>
+          </a:xfrm>
+          <a:prstGeom prst="rect">
+            <a:avLst/>
+          </a:prstGeom>
+        </p:spPr>
+      </p:pic>
+      <p:pic>
+        <p:nvPicPr>
+          <p:cNvPr id="44" name="Imagem 43"/>
+          <p:cNvPicPr>
+            <a:picLocks noChangeAspect="1"/>
+          </p:cNvPicPr>
+          <p:nvPr/>
+        </p:nvPicPr>
+        <p:blipFill rotWithShape="1">
+          <a:blip r:embed="rId7">
+            <a:extLst>
+              <a:ext uri="{28A0092B-C50C-407E-A947-70E740481C1C}">
+                <a14:useLocalDpi xmlns:a14="http://schemas.microsoft.com/office/drawing/2010/main" val="0"/>
+              </a:ext>
+            </a:extLst>
+          </a:blip>
+          <a:srcRect l="43556" t="14889" r="50123" b="78465"/>
+          <a:stretch/>
+        </p:blipFill>
+        <p:spPr>
+          <a:xfrm>
+            <a:off x="6573948" y="3611247"/>
+            <a:ext cx="433525" cy="455780"/>
+          </a:xfrm>
+          <a:prstGeom prst="rect">
+            <a:avLst/>
+          </a:prstGeom>
+        </p:spPr>
+      </p:pic>
+      <p:pic>
+        <p:nvPicPr>
+          <p:cNvPr id="45" name="Imagem 44"/>
+          <p:cNvPicPr>
+            <a:picLocks noChangeAspect="1"/>
+          </p:cNvPicPr>
+          <p:nvPr/>
+        </p:nvPicPr>
+        <p:blipFill rotWithShape="1">
+          <a:blip r:embed="rId7">
+            <a:extLst>
+              <a:ext uri="{28A0092B-C50C-407E-A947-70E740481C1C}">
+                <a14:useLocalDpi xmlns:a14="http://schemas.microsoft.com/office/drawing/2010/main" val="0"/>
+              </a:ext>
+            </a:extLst>
+          </a:blip>
+          <a:srcRect l="43556" t="14889" r="50123" b="78465"/>
+          <a:stretch/>
+        </p:blipFill>
+        <p:spPr>
+          <a:xfrm>
+            <a:off x="7186530" y="2418486"/>
+            <a:ext cx="433525" cy="455780"/>
+          </a:xfrm>
+          <a:prstGeom prst="rect">
+            <a:avLst/>
+          </a:prstGeom>
+        </p:spPr>
+      </p:pic>
+      <p:pic>
+        <p:nvPicPr>
+          <p:cNvPr id="46" name="Imagem 45"/>
+          <p:cNvPicPr>
+            <a:picLocks noChangeAspect="1"/>
+          </p:cNvPicPr>
+          <p:nvPr/>
+        </p:nvPicPr>
+        <p:blipFill rotWithShape="1">
+          <a:blip r:embed="rId8">
+            <a:extLst>
+              <a:ext uri="{28A0092B-C50C-407E-A947-70E740481C1C}">
+                <a14:useLocalDpi xmlns:a14="http://schemas.microsoft.com/office/drawing/2010/main" val="0"/>
+              </a:ext>
+            </a:extLst>
+          </a:blip>
+          <a:srcRect l="33233" t="62653" r="58227" b="24225"/>
+          <a:stretch/>
+        </p:blipFill>
+        <p:spPr>
+          <a:xfrm>
+            <a:off x="4498196" y="3653680"/>
+            <a:ext cx="351429" cy="360000"/>
+          </a:xfrm>
+          <a:prstGeom prst="rect">
+            <a:avLst/>
+          </a:prstGeom>
+        </p:spPr>
+      </p:pic>
+      <p:pic>
+        <p:nvPicPr>
+          <p:cNvPr id="40" name="Imagem 39"/>
+          <p:cNvPicPr>
+            <a:picLocks noChangeAspect="1"/>
+          </p:cNvPicPr>
+          <p:nvPr/>
+        </p:nvPicPr>
+        <p:blipFill rotWithShape="1">
+          <a:blip r:embed="rId9">
+            <a:extLst>
+              <a:ext uri="{28A0092B-C50C-407E-A947-70E740481C1C}">
+                <a14:useLocalDpi xmlns:a14="http://schemas.microsoft.com/office/drawing/2010/main" val="0"/>
+              </a:ext>
+            </a:extLst>
+          </a:blip>
+          <a:srcRect l="27741" t="15015" r="24343" b="15796"/>
+          <a:stretch/>
+        </p:blipFill>
+        <p:spPr>
+          <a:xfrm>
+            <a:off x="9023018" y="792262"/>
+            <a:ext cx="2323071" cy="4744994"/>
+          </a:xfrm>
+          <a:prstGeom prst="rect">
+            <a:avLst/>
+          </a:prstGeom>
+          <a:noFill/>
+          <a:ln w="9525">
+            <a:noFill/>
+          </a:ln>
+        </p:spPr>
+      </p:pic>
+      <p:grpSp>
+        <p:nvGrpSpPr>
+          <p:cNvPr id="3" name="Grupo 2"/>
+          <p:cNvGrpSpPr/>
+          <p:nvPr/>
+        </p:nvGrpSpPr>
+        <p:grpSpPr>
+          <a:xfrm>
+            <a:off x="7398325" y="121762"/>
+            <a:ext cx="720000" cy="720000"/>
+            <a:chOff x="7323234" y="396691"/>
+            <a:chExt cx="720000" cy="720000"/>
+          </a:xfrm>
+        </p:grpSpPr>
+        <p:sp>
+          <p:nvSpPr>
+            <p:cNvPr id="21" name="Elipse 20"/>
+            <p:cNvSpPr/>
+            <p:nvPr/>
+          </p:nvSpPr>
+          <p:spPr>
+            <a:xfrm>
+              <a:off x="7323234" y="396691"/>
+              <a:ext cx="720000" cy="720000"/>
+            </a:xfrm>
+            <a:prstGeom prst="ellipse">
+              <a:avLst/>
+            </a:prstGeom>
+            <a:solidFill>
+              <a:schemeClr val="accent6">
+                <a:lumMod val="50000"/>
+              </a:schemeClr>
+            </a:solidFill>
+            <a:ln>
+              <a:noFill/>
+            </a:ln>
+            <a:effectLst/>
+            <a:scene3d>
+              <a:camera prst="orthographicFront">
+                <a:rot lat="0" lon="0" rev="0"/>
+              </a:camera>
+              <a:lightRig rig="chilly" dir="t">
+                <a:rot lat="0" lon="0" rev="18480000"/>
+              </a:lightRig>
+            </a:scene3d>
+            <a:sp3d prstMaterial="clear">
+              <a:bevelT h="63500"/>
+            </a:sp3d>
+          </p:spPr>
+          <p:style>
+            <a:lnRef idx="2">
+              <a:schemeClr val="accent1">
+                <a:shade val="50000"/>
+              </a:schemeClr>
+            </a:lnRef>
+            <a:fillRef idx="1">
+              <a:schemeClr val="accent1"/>
+            </a:fillRef>
+            <a:effectRef idx="0">
+              <a:schemeClr val="accent1"/>
+            </a:effectRef>
+            <a:fontRef idx="minor">
+              <a:schemeClr val="lt1"/>
+            </a:fontRef>
+          </p:style>
+          <p:txBody>
+            <a:bodyPr rtlCol="0" anchor="ctr"/>
+            <a:lstStyle/>
+            <a:p>
+              <a:pPr algn="ctr"/>
+              <a:endParaRPr lang="pt-BR"/>
+            </a:p>
+          </p:txBody>
+        </p:sp>
+        <p:sp>
+          <p:nvSpPr>
+            <p:cNvPr id="2" name="Seta para cima 1"/>
+            <p:cNvSpPr/>
+            <p:nvPr/>
+          </p:nvSpPr>
+          <p:spPr>
+            <a:xfrm>
+              <a:off x="7575234" y="439672"/>
+              <a:ext cx="216000" cy="216000"/>
+            </a:xfrm>
+            <a:prstGeom prst="upArrow">
+              <a:avLst/>
+            </a:prstGeom>
+            <a:noFill/>
+            <a:ln>
+              <a:noFill/>
+            </a:ln>
+            <a:effectLst/>
+            <a:scene3d>
+              <a:camera prst="orthographicFront">
+                <a:rot lat="0" lon="0" rev="0"/>
+              </a:camera>
+              <a:lightRig rig="chilly" dir="t">
+                <a:rot lat="0" lon="0" rev="18480000"/>
+              </a:lightRig>
+            </a:scene3d>
+            <a:sp3d prstMaterial="clear">
+              <a:bevelT h="63500"/>
+            </a:sp3d>
+          </p:spPr>
+          <p:style>
+            <a:lnRef idx="2">
+              <a:schemeClr val="accent1">
+                <a:shade val="50000"/>
+              </a:schemeClr>
+            </a:lnRef>
+            <a:fillRef idx="1">
+              <a:schemeClr val="accent1"/>
+            </a:fillRef>
+            <a:effectRef idx="0">
+              <a:schemeClr val="accent1"/>
+            </a:effectRef>
+            <a:fontRef idx="minor">
+              <a:schemeClr val="lt1"/>
+            </a:fontRef>
+          </p:style>
+          <p:txBody>
+            <a:bodyPr rtlCol="0" anchor="ctr"/>
+            <a:lstStyle/>
+            <a:p>
+              <a:pPr algn="ctr"/>
+              <a:endParaRPr lang="pt-BR"/>
+            </a:p>
+          </p:txBody>
+        </p:sp>
+        <p:sp>
+          <p:nvSpPr>
+            <p:cNvPr id="47" name="Seta para cima 46"/>
+            <p:cNvSpPr/>
+            <p:nvPr/>
+          </p:nvSpPr>
+          <p:spPr>
+            <a:xfrm flipV="1">
+              <a:off x="7575234" y="858650"/>
+              <a:ext cx="216000" cy="216000"/>
+            </a:xfrm>
+            <a:prstGeom prst="upArrow">
+              <a:avLst/>
+            </a:prstGeom>
+            <a:noFill/>
+            <a:ln>
+              <a:noFill/>
+            </a:ln>
+            <a:effectLst/>
+            <a:scene3d>
+              <a:camera prst="orthographicFront">
+                <a:rot lat="0" lon="0" rev="0"/>
+              </a:camera>
+              <a:lightRig rig="chilly" dir="t">
+                <a:rot lat="0" lon="0" rev="18480000"/>
+              </a:lightRig>
+            </a:scene3d>
+            <a:sp3d prstMaterial="clear">
+              <a:bevelT h="63500"/>
+            </a:sp3d>
+          </p:spPr>
+          <p:style>
+            <a:lnRef idx="2">
+              <a:schemeClr val="accent1">
+                <a:shade val="50000"/>
+              </a:schemeClr>
+            </a:lnRef>
+            <a:fillRef idx="1">
+              <a:schemeClr val="accent1"/>
+            </a:fillRef>
+            <a:effectRef idx="0">
+              <a:schemeClr val="accent1"/>
+            </a:effectRef>
+            <a:fontRef idx="minor">
+              <a:schemeClr val="lt1"/>
+            </a:fontRef>
+          </p:style>
+          <p:txBody>
+            <a:bodyPr rtlCol="0" anchor="ctr"/>
+            <a:lstStyle/>
+            <a:p>
+              <a:pPr algn="ctr"/>
+              <a:endParaRPr lang="pt-BR"/>
+            </a:p>
+          </p:txBody>
+        </p:sp>
+        <p:sp>
+          <p:nvSpPr>
+            <p:cNvPr id="48" name="Seta para cima 47"/>
+            <p:cNvSpPr/>
+            <p:nvPr/>
+          </p:nvSpPr>
+          <p:spPr>
+            <a:xfrm rot="16200000">
+              <a:off x="7358678" y="649161"/>
+              <a:ext cx="216000" cy="216000"/>
+            </a:xfrm>
+            <a:prstGeom prst="upArrow">
+              <a:avLst/>
+            </a:prstGeom>
+            <a:noFill/>
+            <a:ln>
+              <a:noFill/>
+            </a:ln>
+            <a:effectLst/>
+            <a:scene3d>
+              <a:camera prst="orthographicFront">
+                <a:rot lat="0" lon="0" rev="0"/>
+              </a:camera>
+              <a:lightRig rig="chilly" dir="t">
+                <a:rot lat="0" lon="0" rev="18480000"/>
+              </a:lightRig>
+            </a:scene3d>
+            <a:sp3d prstMaterial="clear">
+              <a:bevelT h="63500"/>
+            </a:sp3d>
+          </p:spPr>
+          <p:style>
+            <a:lnRef idx="2">
+              <a:schemeClr val="accent1">
+                <a:shade val="50000"/>
+              </a:schemeClr>
+            </a:lnRef>
+            <a:fillRef idx="1">
+              <a:schemeClr val="accent1"/>
+            </a:fillRef>
+            <a:effectRef idx="0">
+              <a:schemeClr val="accent1"/>
+            </a:effectRef>
+            <a:fontRef idx="minor">
+              <a:schemeClr val="lt1"/>
+            </a:fontRef>
+          </p:style>
+          <p:txBody>
+            <a:bodyPr rtlCol="0" anchor="ctr"/>
+            <a:lstStyle/>
+            <a:p>
+              <a:pPr algn="ctr"/>
+              <a:endParaRPr lang="pt-BR"/>
+            </a:p>
+          </p:txBody>
+        </p:sp>
+        <p:sp>
+          <p:nvSpPr>
+            <p:cNvPr id="49" name="Seta para cima 48"/>
+            <p:cNvSpPr/>
+            <p:nvPr/>
+          </p:nvSpPr>
+          <p:spPr>
+            <a:xfrm rot="5400000" flipH="1">
+              <a:off x="7768270" y="644655"/>
+              <a:ext cx="216000" cy="216000"/>
+            </a:xfrm>
+            <a:prstGeom prst="upArrow">
+              <a:avLst/>
+            </a:prstGeom>
+            <a:noFill/>
+            <a:ln>
+              <a:noFill/>
+            </a:ln>
+            <a:effectLst/>
+            <a:scene3d>
+              <a:camera prst="orthographicFront">
+                <a:rot lat="0" lon="0" rev="0"/>
+              </a:camera>
+              <a:lightRig rig="chilly" dir="t">
+                <a:rot lat="0" lon="0" rev="18480000"/>
+              </a:lightRig>
+            </a:scene3d>
+            <a:sp3d prstMaterial="clear">
+              <a:bevelT h="63500"/>
+            </a:sp3d>
+          </p:spPr>
+          <p:style>
+            <a:lnRef idx="2">
+              <a:schemeClr val="accent1">
+                <a:shade val="50000"/>
+              </a:schemeClr>
+            </a:lnRef>
+            <a:fillRef idx="1">
+              <a:schemeClr val="accent1"/>
+            </a:fillRef>
+            <a:effectRef idx="0">
+              <a:schemeClr val="accent1"/>
+            </a:effectRef>
+            <a:fontRef idx="minor">
+              <a:schemeClr val="lt1"/>
+            </a:fontRef>
+          </p:style>
+          <p:txBody>
+            <a:bodyPr rtlCol="0" anchor="ctr"/>
+            <a:lstStyle/>
+            <a:p>
+              <a:pPr algn="ctr"/>
+              <a:endParaRPr lang="pt-BR"/>
+            </a:p>
+          </p:txBody>
+        </p:sp>
+      </p:grpSp>
+      <p:sp>
+        <p:nvSpPr>
+          <p:cNvPr id="4" name="Elipse 3"/>
           <p:cNvSpPr/>
           <p:nvPr/>
         </p:nvSpPr>
         <p:spPr>
           <a:xfrm>
-            <a:off x="9539795" y="442444"/>
-            <a:ext cx="2946506" cy="2738076"/>
+            <a:off x="8587453" y="294471"/>
+            <a:ext cx="360000" cy="360000"/>
           </a:xfrm>
           <a:prstGeom prst="ellipse">
             <a:avLst/>
           </a:prstGeom>
-          <a:solidFill>
-            <a:schemeClr val="accent6">
-              <a:lumMod val="50000"/>
-            </a:schemeClr>
-          </a:solidFill>
+          <a:noFill/>
           <a:ln>
             <a:noFill/>
           </a:ln>
@@ -5805,615 +6722,6 @@
           </a:p>
         </p:txBody>
       </p:sp>
-      <p:pic>
-        <p:nvPicPr>
-          <p:cNvPr id="18" name="Imagem 17"/>
-          <p:cNvPicPr>
-            <a:picLocks noChangeAspect="1"/>
-          </p:cNvPicPr>
-          <p:nvPr/>
-        </p:nvPicPr>
-        <p:blipFill rotWithShape="1">
-          <a:blip r:embed="rId5">
-            <a:extLst>
-              <a:ext uri="{28A0092B-C50C-407E-A947-70E740481C1C}">
-                <a14:useLocalDpi xmlns:a14="http://schemas.microsoft.com/office/drawing/2010/main" val="0"/>
-              </a:ext>
-            </a:extLst>
-          </a:blip>
-          <a:srcRect l="75584" t="37944" r="17074" b="49208"/>
-          <a:stretch/>
-        </p:blipFill>
-        <p:spPr>
-          <a:xfrm>
-            <a:off x="6252152" y="4331989"/>
-            <a:ext cx="263867" cy="307846"/>
-          </a:xfrm>
-          <a:prstGeom prst="rect">
-            <a:avLst/>
-          </a:prstGeom>
-        </p:spPr>
-      </p:pic>
-      <p:pic>
-        <p:nvPicPr>
-          <p:cNvPr id="25" name="Imagem 24"/>
-          <p:cNvPicPr>
-            <a:picLocks noChangeAspect="1"/>
-          </p:cNvPicPr>
-          <p:nvPr/>
-        </p:nvPicPr>
-        <p:blipFill rotWithShape="1">
-          <a:blip r:embed="rId6">
-            <a:extLst>
-              <a:ext uri="{28A0092B-C50C-407E-A947-70E740481C1C}">
-                <a14:useLocalDpi xmlns:a14="http://schemas.microsoft.com/office/drawing/2010/main" val="0"/>
-              </a:ext>
-            </a:extLst>
-          </a:blip>
-          <a:srcRect t="87428" r="91543" b="-1"/>
-          <a:stretch/>
-        </p:blipFill>
-        <p:spPr>
-          <a:xfrm>
-            <a:off x="7929518" y="2453860"/>
-            <a:ext cx="363225" cy="360000"/>
-          </a:xfrm>
-          <a:prstGeom prst="rect">
-            <a:avLst/>
-          </a:prstGeom>
-        </p:spPr>
-      </p:pic>
-      <p:pic>
-        <p:nvPicPr>
-          <p:cNvPr id="27" name="Imagem 26"/>
-          <p:cNvPicPr>
-            <a:picLocks noChangeAspect="1"/>
-          </p:cNvPicPr>
-          <p:nvPr/>
-        </p:nvPicPr>
-        <p:blipFill rotWithShape="1">
-          <a:blip r:embed="rId5">
-            <a:extLst>
-              <a:ext uri="{28A0092B-C50C-407E-A947-70E740481C1C}">
-                <a14:useLocalDpi xmlns:a14="http://schemas.microsoft.com/office/drawing/2010/main" val="0"/>
-              </a:ext>
-            </a:extLst>
-          </a:blip>
-          <a:srcRect l="74952" t="24920" r="16651" b="62154"/>
-          <a:stretch/>
-        </p:blipFill>
-        <p:spPr>
-          <a:xfrm>
-            <a:off x="6932308" y="4314068"/>
-            <a:ext cx="344515" cy="353571"/>
-          </a:xfrm>
-          <a:prstGeom prst="rect">
-            <a:avLst/>
-          </a:prstGeom>
-        </p:spPr>
-      </p:pic>
-      <p:pic>
-        <p:nvPicPr>
-          <p:cNvPr id="23" name="Imagem 22"/>
-          <p:cNvPicPr>
-            <a:picLocks noChangeAspect="1"/>
-          </p:cNvPicPr>
-          <p:nvPr/>
-        </p:nvPicPr>
-        <p:blipFill rotWithShape="1">
-          <a:blip r:embed="rId4" cstate="print">
-            <a:extLst>
-              <a:ext uri="{28A0092B-C50C-407E-A947-70E740481C1C}">
-                <a14:useLocalDpi xmlns:a14="http://schemas.microsoft.com/office/drawing/2010/main" val="0"/>
-              </a:ext>
-            </a:extLst>
-          </a:blip>
-          <a:srcRect l="84740" r="9755" b="86363"/>
-          <a:stretch/>
-        </p:blipFill>
-        <p:spPr>
-          <a:xfrm>
-            <a:off x="5184019" y="2809975"/>
-            <a:ext cx="261578" cy="432000"/>
-          </a:xfrm>
-          <a:prstGeom prst="rect">
-            <a:avLst/>
-          </a:prstGeom>
-        </p:spPr>
-      </p:pic>
-      <p:pic>
-        <p:nvPicPr>
-          <p:cNvPr id="28" name="Imagem 27"/>
-          <p:cNvPicPr>
-            <a:picLocks noChangeAspect="1"/>
-          </p:cNvPicPr>
-          <p:nvPr/>
-        </p:nvPicPr>
-        <p:blipFill rotWithShape="1">
-          <a:blip r:embed="rId3">
-            <a:extLst>
-              <a:ext uri="{28A0092B-C50C-407E-A947-70E740481C1C}">
-                <a14:useLocalDpi xmlns:a14="http://schemas.microsoft.com/office/drawing/2010/main" val="0"/>
-              </a:ext>
-            </a:extLst>
-          </a:blip>
-          <a:srcRect l="34024" t="1" r="50240" b="79579"/>
-          <a:stretch/>
-        </p:blipFill>
-        <p:spPr>
-          <a:xfrm>
-            <a:off x="4462914" y="2539719"/>
-            <a:ext cx="554823" cy="720000"/>
-          </a:xfrm>
-          <a:prstGeom prst="rect">
-            <a:avLst/>
-          </a:prstGeom>
-        </p:spPr>
-      </p:pic>
-      <p:pic>
-        <p:nvPicPr>
-          <p:cNvPr id="29" name="Imagem 28"/>
-          <p:cNvPicPr>
-            <a:picLocks noChangeAspect="1"/>
-          </p:cNvPicPr>
-          <p:nvPr/>
-        </p:nvPicPr>
-        <p:blipFill rotWithShape="1">
-          <a:blip r:embed="rId3">
-            <a:extLst>
-              <a:ext uri="{28A0092B-C50C-407E-A947-70E740481C1C}">
-                <a14:useLocalDpi xmlns:a14="http://schemas.microsoft.com/office/drawing/2010/main" val="0"/>
-              </a:ext>
-            </a:extLst>
-          </a:blip>
-          <a:srcRect l="49880" t="241" r="33062" b="79098"/>
-          <a:stretch/>
-        </p:blipFill>
-        <p:spPr>
-          <a:xfrm>
-            <a:off x="6149598" y="1947196"/>
-            <a:ext cx="891628" cy="1080000"/>
-          </a:xfrm>
-          <a:prstGeom prst="rect">
-            <a:avLst/>
-          </a:prstGeom>
-        </p:spPr>
-      </p:pic>
-      <p:pic>
-        <p:nvPicPr>
-          <p:cNvPr id="30" name="Imagem 29"/>
-          <p:cNvPicPr>
-            <a:picLocks noChangeAspect="1"/>
-          </p:cNvPicPr>
-          <p:nvPr/>
-        </p:nvPicPr>
-        <p:blipFill rotWithShape="1">
-          <a:blip r:embed="rId3">
-            <a:extLst>
-              <a:ext uri="{28A0092B-C50C-407E-A947-70E740481C1C}">
-                <a14:useLocalDpi xmlns:a14="http://schemas.microsoft.com/office/drawing/2010/main" val="0"/>
-              </a:ext>
-            </a:extLst>
-          </a:blip>
-          <a:srcRect l="34024" t="1" r="50240" b="79579"/>
-          <a:stretch/>
-        </p:blipFill>
-        <p:spPr>
-          <a:xfrm>
-            <a:off x="4677424" y="4107991"/>
-            <a:ext cx="554823" cy="720000"/>
-          </a:xfrm>
-          <a:prstGeom prst="rect">
-            <a:avLst/>
-          </a:prstGeom>
-        </p:spPr>
-      </p:pic>
-      <p:pic>
-        <p:nvPicPr>
-          <p:cNvPr id="31" name="Imagem 30"/>
-          <p:cNvPicPr>
-            <a:picLocks noChangeAspect="1"/>
-          </p:cNvPicPr>
-          <p:nvPr/>
-        </p:nvPicPr>
-        <p:blipFill rotWithShape="1">
-          <a:blip r:embed="rId3">
-            <a:extLst>
-              <a:ext uri="{28A0092B-C50C-407E-A947-70E740481C1C}">
-                <a14:useLocalDpi xmlns:a14="http://schemas.microsoft.com/office/drawing/2010/main" val="0"/>
-              </a:ext>
-            </a:extLst>
-          </a:blip>
-          <a:srcRect l="34024" t="1" r="50240" b="79579"/>
-          <a:stretch/>
-        </p:blipFill>
-        <p:spPr>
-          <a:xfrm>
-            <a:off x="7652106" y="2939450"/>
-            <a:ext cx="554823" cy="720000"/>
-          </a:xfrm>
-          <a:prstGeom prst="rect">
-            <a:avLst/>
-          </a:prstGeom>
-        </p:spPr>
-      </p:pic>
-      <p:pic>
-        <p:nvPicPr>
-          <p:cNvPr id="32" name="Imagem 31"/>
-          <p:cNvPicPr>
-            <a:picLocks noChangeAspect="1"/>
-          </p:cNvPicPr>
-          <p:nvPr/>
-        </p:nvPicPr>
-        <p:blipFill rotWithShape="1">
-          <a:blip r:embed="rId3">
-            <a:extLst>
-              <a:ext uri="{28A0092B-C50C-407E-A947-70E740481C1C}">
-                <a14:useLocalDpi xmlns:a14="http://schemas.microsoft.com/office/drawing/2010/main" val="0"/>
-              </a:ext>
-            </a:extLst>
-          </a:blip>
-          <a:srcRect l="34024" t="1" r="50240" b="79579"/>
-          <a:stretch/>
-        </p:blipFill>
-        <p:spPr>
-          <a:xfrm>
-            <a:off x="7360343" y="3027196"/>
-            <a:ext cx="554823" cy="720000"/>
-          </a:xfrm>
-          <a:prstGeom prst="rect">
-            <a:avLst/>
-          </a:prstGeom>
-        </p:spPr>
-      </p:pic>
-      <p:pic>
-        <p:nvPicPr>
-          <p:cNvPr id="33" name="Imagem 32"/>
-          <p:cNvPicPr>
-            <a:picLocks noChangeAspect="1"/>
-          </p:cNvPicPr>
-          <p:nvPr/>
-        </p:nvPicPr>
-        <p:blipFill rotWithShape="1">
-          <a:blip r:embed="rId3">
-            <a:extLst>
-              <a:ext uri="{28A0092B-C50C-407E-A947-70E740481C1C}">
-                <a14:useLocalDpi xmlns:a14="http://schemas.microsoft.com/office/drawing/2010/main" val="0"/>
-              </a:ext>
-            </a:extLst>
-          </a:blip>
-          <a:srcRect l="34024" t="1" r="50240" b="79579"/>
-          <a:stretch/>
-        </p:blipFill>
-        <p:spPr>
-          <a:xfrm>
-            <a:off x="7598859" y="3250428"/>
-            <a:ext cx="554823" cy="720000"/>
-          </a:xfrm>
-          <a:prstGeom prst="rect">
-            <a:avLst/>
-          </a:prstGeom>
-        </p:spPr>
-      </p:pic>
-      <p:pic>
-        <p:nvPicPr>
-          <p:cNvPr id="35" name="Imagem 34"/>
-          <p:cNvPicPr>
-            <a:picLocks noChangeAspect="1"/>
-          </p:cNvPicPr>
-          <p:nvPr/>
-        </p:nvPicPr>
-        <p:blipFill rotWithShape="1">
-          <a:blip r:embed="rId3">
-            <a:extLst>
-              <a:ext uri="{28A0092B-C50C-407E-A947-70E740481C1C}">
-                <a14:useLocalDpi xmlns:a14="http://schemas.microsoft.com/office/drawing/2010/main" val="0"/>
-              </a:ext>
-            </a:extLst>
-          </a:blip>
-          <a:srcRect l="34024" t="1" r="50240" b="79579"/>
-          <a:stretch/>
-        </p:blipFill>
-        <p:spPr>
-          <a:xfrm>
-            <a:off x="5441011" y="3164759"/>
-            <a:ext cx="554823" cy="720000"/>
-          </a:xfrm>
-          <a:prstGeom prst="rect">
-            <a:avLst/>
-          </a:prstGeom>
-        </p:spPr>
-      </p:pic>
-      <p:pic>
-        <p:nvPicPr>
-          <p:cNvPr id="36" name="Imagem 35"/>
-          <p:cNvPicPr>
-            <a:picLocks noChangeAspect="1"/>
-          </p:cNvPicPr>
-          <p:nvPr/>
-        </p:nvPicPr>
-        <p:blipFill rotWithShape="1">
-          <a:blip r:embed="rId3">
-            <a:extLst>
-              <a:ext uri="{28A0092B-C50C-407E-A947-70E740481C1C}">
-                <a14:useLocalDpi xmlns:a14="http://schemas.microsoft.com/office/drawing/2010/main" val="0"/>
-              </a:ext>
-            </a:extLst>
-          </a:blip>
-          <a:srcRect l="34024" t="1" r="50240" b="79579"/>
-          <a:stretch/>
-        </p:blipFill>
-        <p:spPr>
-          <a:xfrm>
-            <a:off x="5677467" y="3347027"/>
-            <a:ext cx="554823" cy="720000"/>
-          </a:xfrm>
-          <a:prstGeom prst="rect">
-            <a:avLst/>
-          </a:prstGeom>
-        </p:spPr>
-      </p:pic>
-      <p:pic>
-        <p:nvPicPr>
-          <p:cNvPr id="37" name="Imagem 36"/>
-          <p:cNvPicPr>
-            <a:picLocks noChangeAspect="1"/>
-          </p:cNvPicPr>
-          <p:nvPr/>
-        </p:nvPicPr>
-        <p:blipFill rotWithShape="1">
-          <a:blip r:embed="rId3">
-            <a:extLst>
-              <a:ext uri="{28A0092B-C50C-407E-A947-70E740481C1C}">
-                <a14:useLocalDpi xmlns:a14="http://schemas.microsoft.com/office/drawing/2010/main" val="0"/>
-              </a:ext>
-            </a:extLst>
-          </a:blip>
-          <a:srcRect l="34024" t="1" r="50240" b="79579"/>
-          <a:stretch/>
-        </p:blipFill>
-        <p:spPr>
-          <a:xfrm>
-            <a:off x="4615314" y="2692119"/>
-            <a:ext cx="554823" cy="720000"/>
-          </a:xfrm>
-          <a:prstGeom prst="rect">
-            <a:avLst/>
-          </a:prstGeom>
-        </p:spPr>
-      </p:pic>
-      <p:pic>
-        <p:nvPicPr>
-          <p:cNvPr id="39" name="Imagem 38"/>
-          <p:cNvPicPr>
-            <a:picLocks noChangeAspect="1"/>
-          </p:cNvPicPr>
-          <p:nvPr/>
-        </p:nvPicPr>
-        <p:blipFill rotWithShape="1">
-          <a:blip r:embed="rId3">
-            <a:extLst>
-              <a:ext uri="{28A0092B-C50C-407E-A947-70E740481C1C}">
-                <a14:useLocalDpi xmlns:a14="http://schemas.microsoft.com/office/drawing/2010/main" val="0"/>
-              </a:ext>
-            </a:extLst>
-          </a:blip>
-          <a:srcRect l="34024" t="1" r="50240" b="79579"/>
-          <a:stretch/>
-        </p:blipFill>
-        <p:spPr>
-          <a:xfrm>
-            <a:off x="7543755" y="4592263"/>
-            <a:ext cx="554823" cy="720000"/>
-          </a:xfrm>
-          <a:prstGeom prst="rect">
-            <a:avLst/>
-          </a:prstGeom>
-        </p:spPr>
-      </p:pic>
-      <p:pic>
-        <p:nvPicPr>
-          <p:cNvPr id="38" name="Imagem 37"/>
-          <p:cNvPicPr>
-            <a:picLocks noChangeAspect="1"/>
-          </p:cNvPicPr>
-          <p:nvPr/>
-        </p:nvPicPr>
-        <p:blipFill rotWithShape="1">
-          <a:blip r:embed="rId3">
-            <a:extLst>
-              <a:ext uri="{28A0092B-C50C-407E-A947-70E740481C1C}">
-                <a14:useLocalDpi xmlns:a14="http://schemas.microsoft.com/office/drawing/2010/main" val="0"/>
-              </a:ext>
-            </a:extLst>
-          </a:blip>
-          <a:srcRect l="34024" t="1" r="50240" b="79579"/>
-          <a:stretch/>
-        </p:blipFill>
-        <p:spPr>
-          <a:xfrm>
-            <a:off x="7323234" y="4680009"/>
-            <a:ext cx="554823" cy="720000"/>
-          </a:xfrm>
-          <a:prstGeom prst="rect">
-            <a:avLst/>
-          </a:prstGeom>
-        </p:spPr>
-      </p:pic>
-      <p:pic>
-        <p:nvPicPr>
-          <p:cNvPr id="41" name="Imagem 40"/>
-          <p:cNvPicPr>
-            <a:picLocks noChangeAspect="1"/>
-          </p:cNvPicPr>
-          <p:nvPr/>
-        </p:nvPicPr>
-        <p:blipFill rotWithShape="1">
-          <a:blip r:embed="rId7">
-            <a:extLst>
-              <a:ext uri="{28A0092B-C50C-407E-A947-70E740481C1C}">
-                <a14:useLocalDpi xmlns:a14="http://schemas.microsoft.com/office/drawing/2010/main" val="0"/>
-              </a:ext>
-            </a:extLst>
-          </a:blip>
-          <a:srcRect l="43556" t="14889" r="50123" b="78465"/>
-          <a:stretch/>
-        </p:blipFill>
-        <p:spPr>
-          <a:xfrm>
-            <a:off x="7218581" y="2019562"/>
-            <a:ext cx="433525" cy="455780"/>
-          </a:xfrm>
-          <a:prstGeom prst="rect">
-            <a:avLst/>
-          </a:prstGeom>
-        </p:spPr>
-      </p:pic>
-      <p:pic>
-        <p:nvPicPr>
-          <p:cNvPr id="42" name="Imagem 41"/>
-          <p:cNvPicPr>
-            <a:picLocks noChangeAspect="1"/>
-          </p:cNvPicPr>
-          <p:nvPr/>
-        </p:nvPicPr>
-        <p:blipFill rotWithShape="1">
-          <a:blip r:embed="rId7">
-            <a:extLst>
-              <a:ext uri="{28A0092B-C50C-407E-A947-70E740481C1C}">
-                <a14:useLocalDpi xmlns:a14="http://schemas.microsoft.com/office/drawing/2010/main" val="0"/>
-              </a:ext>
-            </a:extLst>
-          </a:blip>
-          <a:srcRect l="43556" t="14889" r="50123" b="78465"/>
-          <a:stretch/>
-        </p:blipFill>
-        <p:spPr>
-          <a:xfrm>
-            <a:off x="5119323" y="2160139"/>
-            <a:ext cx="433525" cy="455780"/>
-          </a:xfrm>
-          <a:prstGeom prst="rect">
-            <a:avLst/>
-          </a:prstGeom>
-        </p:spPr>
-      </p:pic>
-      <p:pic>
-        <p:nvPicPr>
-          <p:cNvPr id="43" name="Imagem 42"/>
-          <p:cNvPicPr>
-            <a:picLocks noChangeAspect="1"/>
-          </p:cNvPicPr>
-          <p:nvPr/>
-        </p:nvPicPr>
-        <p:blipFill rotWithShape="1">
-          <a:blip r:embed="rId7">
-            <a:extLst>
-              <a:ext uri="{28A0092B-C50C-407E-A947-70E740481C1C}">
-                <a14:useLocalDpi xmlns:a14="http://schemas.microsoft.com/office/drawing/2010/main" val="0"/>
-              </a:ext>
-            </a:extLst>
-          </a:blip>
-          <a:srcRect l="43556" t="14889" r="50123" b="78465"/>
-          <a:stretch/>
-        </p:blipFill>
-        <p:spPr>
-          <a:xfrm>
-            <a:off x="5262516" y="2259306"/>
-            <a:ext cx="433525" cy="455780"/>
-          </a:xfrm>
-          <a:prstGeom prst="rect">
-            <a:avLst/>
-          </a:prstGeom>
-        </p:spPr>
-      </p:pic>
-      <p:pic>
-        <p:nvPicPr>
-          <p:cNvPr id="44" name="Imagem 43"/>
-          <p:cNvPicPr>
-            <a:picLocks noChangeAspect="1"/>
-          </p:cNvPicPr>
-          <p:nvPr/>
-        </p:nvPicPr>
-        <p:blipFill rotWithShape="1">
-          <a:blip r:embed="rId7">
-            <a:extLst>
-              <a:ext uri="{28A0092B-C50C-407E-A947-70E740481C1C}">
-                <a14:useLocalDpi xmlns:a14="http://schemas.microsoft.com/office/drawing/2010/main" val="0"/>
-              </a:ext>
-            </a:extLst>
-          </a:blip>
-          <a:srcRect l="43556" t="14889" r="50123" b="78465"/>
-          <a:stretch/>
-        </p:blipFill>
-        <p:spPr>
-          <a:xfrm>
-            <a:off x="6573948" y="3611247"/>
-            <a:ext cx="433525" cy="455780"/>
-          </a:xfrm>
-          <a:prstGeom prst="rect">
-            <a:avLst/>
-          </a:prstGeom>
-        </p:spPr>
-      </p:pic>
-      <p:pic>
-        <p:nvPicPr>
-          <p:cNvPr id="45" name="Imagem 44"/>
-          <p:cNvPicPr>
-            <a:picLocks noChangeAspect="1"/>
-          </p:cNvPicPr>
-          <p:nvPr/>
-        </p:nvPicPr>
-        <p:blipFill rotWithShape="1">
-          <a:blip r:embed="rId7">
-            <a:extLst>
-              <a:ext uri="{28A0092B-C50C-407E-A947-70E740481C1C}">
-                <a14:useLocalDpi xmlns:a14="http://schemas.microsoft.com/office/drawing/2010/main" val="0"/>
-              </a:ext>
-            </a:extLst>
-          </a:blip>
-          <a:srcRect l="43556" t="14889" r="50123" b="78465"/>
-          <a:stretch/>
-        </p:blipFill>
-        <p:spPr>
-          <a:xfrm>
-            <a:off x="7186530" y="2418486"/>
-            <a:ext cx="433525" cy="455780"/>
-          </a:xfrm>
-          <a:prstGeom prst="rect">
-            <a:avLst/>
-          </a:prstGeom>
-        </p:spPr>
-      </p:pic>
-      <p:pic>
-        <p:nvPicPr>
-          <p:cNvPr id="46" name="Imagem 45"/>
-          <p:cNvPicPr>
-            <a:picLocks noChangeAspect="1"/>
-          </p:cNvPicPr>
-          <p:nvPr/>
-        </p:nvPicPr>
-        <p:blipFill rotWithShape="1">
-          <a:blip r:embed="rId8">
-            <a:extLst>
-              <a:ext uri="{28A0092B-C50C-407E-A947-70E740481C1C}">
-                <a14:useLocalDpi xmlns:a14="http://schemas.microsoft.com/office/drawing/2010/main" val="0"/>
-              </a:ext>
-            </a:extLst>
-          </a:blip>
-          <a:srcRect l="33233" t="62653" r="58227" b="24225"/>
-          <a:stretch/>
-        </p:blipFill>
-        <p:spPr>
-          <a:xfrm>
-            <a:off x="4498196" y="3653680"/>
-            <a:ext cx="351429" cy="360000"/>
-          </a:xfrm>
-          <a:prstGeom prst="rect">
-            <a:avLst/>
-          </a:prstGeom>
-        </p:spPr>
-      </p:pic>
     </p:spTree>
     <p:extLst>
       <p:ext uri="{BB962C8B-B14F-4D97-AF65-F5344CB8AC3E}">

</xml_diff>

<commit_message>
Ajuste na posição dos botões
</commit_message>
<xml_diff>
--- a/Modelagem do Game.pptx
+++ b/Modelagem do Game.pptx
@@ -8,6 +8,7 @@
     <p:sldId id="256" r:id="rId2"/>
     <p:sldId id="257" r:id="rId3"/>
     <p:sldId id="258" r:id="rId4"/>
+    <p:sldId id="259" r:id="rId5"/>
   </p:sldIdLst>
   <p:sldSz cx="12192000" cy="6858000"/>
   <p:notesSz cx="6858000" cy="9144000"/>
@@ -5065,22 +5066,12 @@
           </a:xfrm>
           <a:prstGeom prst="frame">
             <a:avLst>
-              <a:gd name="adj1" fmla="val 725"/>
+              <a:gd name="adj1" fmla="val 14532"/>
             </a:avLst>
           </a:prstGeom>
-          <a:blipFill dpi="0" rotWithShape="1">
-            <a:blip r:embed="rId3">
-              <a:extLst>
-                <a:ext uri="{28A0092B-C50C-407E-A947-70E740481C1C}">
-                  <a14:useLocalDpi xmlns:a14="http://schemas.microsoft.com/office/drawing/2010/main" val="0"/>
-                </a:ext>
-              </a:extLst>
-            </a:blip>
-            <a:srcRect/>
-            <a:stretch>
-              <a:fillRect/>
-            </a:stretch>
-          </a:blipFill>
+          <a:solidFill>
+            <a:schemeClr val="tx1"/>
+          </a:solidFill>
           <a:ln/>
         </p:spPr>
         <p:style>
@@ -5165,7 +5156,7 @@
             <a:avLst/>
           </a:prstGeom>
           <a:blipFill dpi="0" rotWithShape="1">
-            <a:blip r:embed="rId4">
+            <a:blip r:embed="rId3">
               <a:extLst>
                 <a:ext uri="{28A0092B-C50C-407E-A947-70E740481C1C}">
                   <a14:useLocalDpi xmlns:a14="http://schemas.microsoft.com/office/drawing/2010/main" val="0"/>
@@ -5215,7 +5206,7 @@
           <p:nvPr/>
         </p:nvPicPr>
         <p:blipFill rotWithShape="1">
-          <a:blip r:embed="rId5">
+          <a:blip r:embed="rId4">
             <a:extLst>
               <a:ext uri="{28A0092B-C50C-407E-A947-70E740481C1C}">
                 <a14:useLocalDpi xmlns:a14="http://schemas.microsoft.com/office/drawing/2010/main" val="0"/>
@@ -5669,752 +5660,50 @@
           </a:prstGeom>
         </p:spPr>
       </p:pic>
-      <p:sp>
-        <p:nvSpPr>
-          <p:cNvPr id="26" name="Retângulo 25"/>
-          <p:cNvSpPr/>
-          <p:nvPr/>
-        </p:nvSpPr>
-        <p:spPr>
+      <p:grpSp>
+        <p:nvGrpSpPr>
+          <p:cNvPr id="8" name="Grupo 7"/>
+          <p:cNvGrpSpPr/>
+          <p:nvPr/>
+        </p:nvGrpSpPr>
+        <p:grpSpPr>
           <a:xfrm>
             <a:off x="4051022" y="1773145"/>
             <a:ext cx="4461037" cy="3948758"/>
-          </a:xfrm>
-          <a:prstGeom prst="rect">
-            <a:avLst/>
-          </a:prstGeom>
-          <a:blipFill dpi="0" rotWithShape="1">
-            <a:blip r:embed="rId2">
-              <a:extLst>
-                <a:ext uri="{28A0092B-C50C-407E-A947-70E740481C1C}">
-                  <a14:useLocalDpi xmlns:a14="http://schemas.microsoft.com/office/drawing/2010/main" val="0"/>
-                </a:ext>
-              </a:extLst>
-            </a:blip>
-            <a:srcRect/>
-            <a:stretch>
-              <a:fillRect/>
-            </a:stretch>
-          </a:blipFill>
-          <a:ln w="12700">
-            <a:noFill/>
-          </a:ln>
-        </p:spPr>
-        <p:style>
-          <a:lnRef idx="2">
-            <a:schemeClr val="accent1">
-              <a:shade val="50000"/>
-            </a:schemeClr>
-          </a:lnRef>
-          <a:fillRef idx="1">
-            <a:schemeClr val="accent1"/>
-          </a:fillRef>
-          <a:effectRef idx="0">
-            <a:schemeClr val="accent1"/>
-          </a:effectRef>
-          <a:fontRef idx="minor">
-            <a:schemeClr val="lt1"/>
-          </a:fontRef>
-        </p:style>
-        <p:txBody>
-          <a:bodyPr rtlCol="0" anchor="ctr"/>
-          <a:lstStyle/>
-          <a:p>
-            <a:pPr algn="ctr"/>
-            <a:endParaRPr lang="pt-BR"/>
-          </a:p>
-        </p:txBody>
-      </p:sp>
-      <p:pic>
-        <p:nvPicPr>
-          <p:cNvPr id="18" name="Imagem 17"/>
-          <p:cNvPicPr>
-            <a:picLocks noChangeAspect="1"/>
-          </p:cNvPicPr>
-          <p:nvPr/>
-        </p:nvPicPr>
-        <p:blipFill rotWithShape="1">
-          <a:blip r:embed="rId5">
-            <a:extLst>
-              <a:ext uri="{28A0092B-C50C-407E-A947-70E740481C1C}">
-                <a14:useLocalDpi xmlns:a14="http://schemas.microsoft.com/office/drawing/2010/main" val="0"/>
-              </a:ext>
-            </a:extLst>
-          </a:blip>
-          <a:srcRect l="75584" t="37944" r="17074" b="49208"/>
-          <a:stretch/>
-        </p:blipFill>
-        <p:spPr>
-          <a:xfrm>
-            <a:off x="6252152" y="4331989"/>
-            <a:ext cx="263867" cy="307846"/>
-          </a:xfrm>
-          <a:prstGeom prst="rect">
-            <a:avLst/>
-          </a:prstGeom>
-        </p:spPr>
-      </p:pic>
-      <p:pic>
-        <p:nvPicPr>
-          <p:cNvPr id="25" name="Imagem 24"/>
-          <p:cNvPicPr>
-            <a:picLocks noChangeAspect="1"/>
-          </p:cNvPicPr>
-          <p:nvPr/>
-        </p:nvPicPr>
-        <p:blipFill rotWithShape="1">
-          <a:blip r:embed="rId6">
-            <a:extLst>
-              <a:ext uri="{28A0092B-C50C-407E-A947-70E740481C1C}">
-                <a14:useLocalDpi xmlns:a14="http://schemas.microsoft.com/office/drawing/2010/main" val="0"/>
-              </a:ext>
-            </a:extLst>
-          </a:blip>
-          <a:srcRect t="87428" r="91543" b="-1"/>
-          <a:stretch/>
-        </p:blipFill>
-        <p:spPr>
-          <a:xfrm>
-            <a:off x="7929518" y="2453860"/>
-            <a:ext cx="363225" cy="360000"/>
-          </a:xfrm>
-          <a:prstGeom prst="rect">
-            <a:avLst/>
-          </a:prstGeom>
-        </p:spPr>
-      </p:pic>
-      <p:pic>
-        <p:nvPicPr>
-          <p:cNvPr id="27" name="Imagem 26"/>
-          <p:cNvPicPr>
-            <a:picLocks noChangeAspect="1"/>
-          </p:cNvPicPr>
-          <p:nvPr/>
-        </p:nvPicPr>
-        <p:blipFill rotWithShape="1">
-          <a:blip r:embed="rId5">
-            <a:extLst>
-              <a:ext uri="{28A0092B-C50C-407E-A947-70E740481C1C}">
-                <a14:useLocalDpi xmlns:a14="http://schemas.microsoft.com/office/drawing/2010/main" val="0"/>
-              </a:ext>
-            </a:extLst>
-          </a:blip>
-          <a:srcRect l="74952" t="24920" r="16651" b="62154"/>
-          <a:stretch/>
-        </p:blipFill>
-        <p:spPr>
-          <a:xfrm>
-            <a:off x="6932308" y="4314068"/>
-            <a:ext cx="344515" cy="353571"/>
-          </a:xfrm>
-          <a:prstGeom prst="rect">
-            <a:avLst/>
-          </a:prstGeom>
-        </p:spPr>
-      </p:pic>
-      <p:pic>
-        <p:nvPicPr>
-          <p:cNvPr id="23" name="Imagem 22"/>
-          <p:cNvPicPr>
-            <a:picLocks noChangeAspect="1"/>
-          </p:cNvPicPr>
-          <p:nvPr/>
-        </p:nvPicPr>
-        <p:blipFill rotWithShape="1">
-          <a:blip r:embed="rId4" cstate="print">
-            <a:extLst>
-              <a:ext uri="{28A0092B-C50C-407E-A947-70E740481C1C}">
-                <a14:useLocalDpi xmlns:a14="http://schemas.microsoft.com/office/drawing/2010/main" val="0"/>
-              </a:ext>
-            </a:extLst>
-          </a:blip>
-          <a:srcRect l="84740" r="9755" b="86363"/>
-          <a:stretch/>
-        </p:blipFill>
-        <p:spPr>
-          <a:xfrm>
-            <a:off x="5184019" y="2809975"/>
-            <a:ext cx="261578" cy="432000"/>
-          </a:xfrm>
-          <a:prstGeom prst="rect">
-            <a:avLst/>
-          </a:prstGeom>
-        </p:spPr>
-      </p:pic>
-      <p:pic>
-        <p:nvPicPr>
-          <p:cNvPr id="28" name="Imagem 27"/>
-          <p:cNvPicPr>
-            <a:picLocks noChangeAspect="1"/>
-          </p:cNvPicPr>
-          <p:nvPr/>
-        </p:nvPicPr>
-        <p:blipFill rotWithShape="1">
-          <a:blip r:embed="rId3">
-            <a:extLst>
-              <a:ext uri="{28A0092B-C50C-407E-A947-70E740481C1C}">
-                <a14:useLocalDpi xmlns:a14="http://schemas.microsoft.com/office/drawing/2010/main" val="0"/>
-              </a:ext>
-            </a:extLst>
-          </a:blip>
-          <a:srcRect l="34024" t="1" r="50240" b="79579"/>
-          <a:stretch/>
-        </p:blipFill>
-        <p:spPr>
-          <a:xfrm>
-            <a:off x="4462914" y="2539719"/>
-            <a:ext cx="554823" cy="720000"/>
-          </a:xfrm>
-          <a:prstGeom prst="rect">
-            <a:avLst/>
-          </a:prstGeom>
-        </p:spPr>
-      </p:pic>
-      <p:pic>
-        <p:nvPicPr>
-          <p:cNvPr id="29" name="Imagem 28"/>
-          <p:cNvPicPr>
-            <a:picLocks noChangeAspect="1"/>
-          </p:cNvPicPr>
-          <p:nvPr/>
-        </p:nvPicPr>
-        <p:blipFill rotWithShape="1">
-          <a:blip r:embed="rId3">
-            <a:extLst>
-              <a:ext uri="{28A0092B-C50C-407E-A947-70E740481C1C}">
-                <a14:useLocalDpi xmlns:a14="http://schemas.microsoft.com/office/drawing/2010/main" val="0"/>
-              </a:ext>
-            </a:extLst>
-          </a:blip>
-          <a:srcRect l="49880" t="241" r="33062" b="79098"/>
-          <a:stretch/>
-        </p:blipFill>
-        <p:spPr>
-          <a:xfrm>
-            <a:off x="6149598" y="1947196"/>
-            <a:ext cx="891628" cy="1080000"/>
-          </a:xfrm>
-          <a:prstGeom prst="rect">
-            <a:avLst/>
-          </a:prstGeom>
-        </p:spPr>
-      </p:pic>
-      <p:pic>
-        <p:nvPicPr>
-          <p:cNvPr id="30" name="Imagem 29"/>
-          <p:cNvPicPr>
-            <a:picLocks noChangeAspect="1"/>
-          </p:cNvPicPr>
-          <p:nvPr/>
-        </p:nvPicPr>
-        <p:blipFill rotWithShape="1">
-          <a:blip r:embed="rId3">
-            <a:extLst>
-              <a:ext uri="{28A0092B-C50C-407E-A947-70E740481C1C}">
-                <a14:useLocalDpi xmlns:a14="http://schemas.microsoft.com/office/drawing/2010/main" val="0"/>
-              </a:ext>
-            </a:extLst>
-          </a:blip>
-          <a:srcRect l="34024" t="1" r="50240" b="79579"/>
-          <a:stretch/>
-        </p:blipFill>
-        <p:spPr>
-          <a:xfrm>
-            <a:off x="4677424" y="4107991"/>
-            <a:ext cx="554823" cy="720000"/>
-          </a:xfrm>
-          <a:prstGeom prst="rect">
-            <a:avLst/>
-          </a:prstGeom>
-        </p:spPr>
-      </p:pic>
-      <p:pic>
-        <p:nvPicPr>
-          <p:cNvPr id="31" name="Imagem 30"/>
-          <p:cNvPicPr>
-            <a:picLocks noChangeAspect="1"/>
-          </p:cNvPicPr>
-          <p:nvPr/>
-        </p:nvPicPr>
-        <p:blipFill rotWithShape="1">
-          <a:blip r:embed="rId3">
-            <a:extLst>
-              <a:ext uri="{28A0092B-C50C-407E-A947-70E740481C1C}">
-                <a14:useLocalDpi xmlns:a14="http://schemas.microsoft.com/office/drawing/2010/main" val="0"/>
-              </a:ext>
-            </a:extLst>
-          </a:blip>
-          <a:srcRect l="34024" t="1" r="50240" b="79579"/>
-          <a:stretch/>
-        </p:blipFill>
-        <p:spPr>
-          <a:xfrm>
-            <a:off x="7652106" y="2939450"/>
-            <a:ext cx="554823" cy="720000"/>
-          </a:xfrm>
-          <a:prstGeom prst="rect">
-            <a:avLst/>
-          </a:prstGeom>
-        </p:spPr>
-      </p:pic>
-      <p:pic>
-        <p:nvPicPr>
-          <p:cNvPr id="32" name="Imagem 31"/>
-          <p:cNvPicPr>
-            <a:picLocks noChangeAspect="1"/>
-          </p:cNvPicPr>
-          <p:nvPr/>
-        </p:nvPicPr>
-        <p:blipFill rotWithShape="1">
-          <a:blip r:embed="rId3">
-            <a:extLst>
-              <a:ext uri="{28A0092B-C50C-407E-A947-70E740481C1C}">
-                <a14:useLocalDpi xmlns:a14="http://schemas.microsoft.com/office/drawing/2010/main" val="0"/>
-              </a:ext>
-            </a:extLst>
-          </a:blip>
-          <a:srcRect l="34024" t="1" r="50240" b="79579"/>
-          <a:stretch/>
-        </p:blipFill>
-        <p:spPr>
-          <a:xfrm>
-            <a:off x="7360343" y="3027196"/>
-            <a:ext cx="554823" cy="720000"/>
-          </a:xfrm>
-          <a:prstGeom prst="rect">
-            <a:avLst/>
-          </a:prstGeom>
-        </p:spPr>
-      </p:pic>
-      <p:pic>
-        <p:nvPicPr>
-          <p:cNvPr id="33" name="Imagem 32"/>
-          <p:cNvPicPr>
-            <a:picLocks noChangeAspect="1"/>
-          </p:cNvPicPr>
-          <p:nvPr/>
-        </p:nvPicPr>
-        <p:blipFill rotWithShape="1">
-          <a:blip r:embed="rId3">
-            <a:extLst>
-              <a:ext uri="{28A0092B-C50C-407E-A947-70E740481C1C}">
-                <a14:useLocalDpi xmlns:a14="http://schemas.microsoft.com/office/drawing/2010/main" val="0"/>
-              </a:ext>
-            </a:extLst>
-          </a:blip>
-          <a:srcRect l="34024" t="1" r="50240" b="79579"/>
-          <a:stretch/>
-        </p:blipFill>
-        <p:spPr>
-          <a:xfrm>
-            <a:off x="7598859" y="3250428"/>
-            <a:ext cx="554823" cy="720000"/>
-          </a:xfrm>
-          <a:prstGeom prst="rect">
-            <a:avLst/>
-          </a:prstGeom>
-        </p:spPr>
-      </p:pic>
-      <p:pic>
-        <p:nvPicPr>
-          <p:cNvPr id="35" name="Imagem 34"/>
-          <p:cNvPicPr>
-            <a:picLocks noChangeAspect="1"/>
-          </p:cNvPicPr>
-          <p:nvPr/>
-        </p:nvPicPr>
-        <p:blipFill rotWithShape="1">
-          <a:blip r:embed="rId3">
-            <a:extLst>
-              <a:ext uri="{28A0092B-C50C-407E-A947-70E740481C1C}">
-                <a14:useLocalDpi xmlns:a14="http://schemas.microsoft.com/office/drawing/2010/main" val="0"/>
-              </a:ext>
-            </a:extLst>
-          </a:blip>
-          <a:srcRect l="34024" t="1" r="50240" b="79579"/>
-          <a:stretch/>
-        </p:blipFill>
-        <p:spPr>
-          <a:xfrm>
-            <a:off x="5441011" y="3164759"/>
-            <a:ext cx="554823" cy="720000"/>
-          </a:xfrm>
-          <a:prstGeom prst="rect">
-            <a:avLst/>
-          </a:prstGeom>
-        </p:spPr>
-      </p:pic>
-      <p:pic>
-        <p:nvPicPr>
-          <p:cNvPr id="36" name="Imagem 35"/>
-          <p:cNvPicPr>
-            <a:picLocks noChangeAspect="1"/>
-          </p:cNvPicPr>
-          <p:nvPr/>
-        </p:nvPicPr>
-        <p:blipFill rotWithShape="1">
-          <a:blip r:embed="rId3">
-            <a:extLst>
-              <a:ext uri="{28A0092B-C50C-407E-A947-70E740481C1C}">
-                <a14:useLocalDpi xmlns:a14="http://schemas.microsoft.com/office/drawing/2010/main" val="0"/>
-              </a:ext>
-            </a:extLst>
-          </a:blip>
-          <a:srcRect l="34024" t="1" r="50240" b="79579"/>
-          <a:stretch/>
-        </p:blipFill>
-        <p:spPr>
-          <a:xfrm>
-            <a:off x="5677467" y="3347027"/>
-            <a:ext cx="554823" cy="720000"/>
-          </a:xfrm>
-          <a:prstGeom prst="rect">
-            <a:avLst/>
-          </a:prstGeom>
-        </p:spPr>
-      </p:pic>
-      <p:pic>
-        <p:nvPicPr>
-          <p:cNvPr id="37" name="Imagem 36"/>
-          <p:cNvPicPr>
-            <a:picLocks noChangeAspect="1"/>
-          </p:cNvPicPr>
-          <p:nvPr/>
-        </p:nvPicPr>
-        <p:blipFill rotWithShape="1">
-          <a:blip r:embed="rId3">
-            <a:extLst>
-              <a:ext uri="{28A0092B-C50C-407E-A947-70E740481C1C}">
-                <a14:useLocalDpi xmlns:a14="http://schemas.microsoft.com/office/drawing/2010/main" val="0"/>
-              </a:ext>
-            </a:extLst>
-          </a:blip>
-          <a:srcRect l="34024" t="1" r="50240" b="79579"/>
-          <a:stretch/>
-        </p:blipFill>
-        <p:spPr>
-          <a:xfrm>
-            <a:off x="4615314" y="2692119"/>
-            <a:ext cx="554823" cy="720000"/>
-          </a:xfrm>
-          <a:prstGeom prst="rect">
-            <a:avLst/>
-          </a:prstGeom>
-        </p:spPr>
-      </p:pic>
-      <p:pic>
-        <p:nvPicPr>
-          <p:cNvPr id="39" name="Imagem 38"/>
-          <p:cNvPicPr>
-            <a:picLocks noChangeAspect="1"/>
-          </p:cNvPicPr>
-          <p:nvPr/>
-        </p:nvPicPr>
-        <p:blipFill rotWithShape="1">
-          <a:blip r:embed="rId3">
-            <a:extLst>
-              <a:ext uri="{28A0092B-C50C-407E-A947-70E740481C1C}">
-                <a14:useLocalDpi xmlns:a14="http://schemas.microsoft.com/office/drawing/2010/main" val="0"/>
-              </a:ext>
-            </a:extLst>
-          </a:blip>
-          <a:srcRect l="34024" t="1" r="50240" b="79579"/>
-          <a:stretch/>
-        </p:blipFill>
-        <p:spPr>
-          <a:xfrm>
-            <a:off x="7543755" y="4592263"/>
-            <a:ext cx="554823" cy="720000"/>
-          </a:xfrm>
-          <a:prstGeom prst="rect">
-            <a:avLst/>
-          </a:prstGeom>
-        </p:spPr>
-      </p:pic>
-      <p:pic>
-        <p:nvPicPr>
-          <p:cNvPr id="38" name="Imagem 37"/>
-          <p:cNvPicPr>
-            <a:picLocks noChangeAspect="1"/>
-          </p:cNvPicPr>
-          <p:nvPr/>
-        </p:nvPicPr>
-        <p:blipFill rotWithShape="1">
-          <a:blip r:embed="rId3">
-            <a:extLst>
-              <a:ext uri="{28A0092B-C50C-407E-A947-70E740481C1C}">
-                <a14:useLocalDpi xmlns:a14="http://schemas.microsoft.com/office/drawing/2010/main" val="0"/>
-              </a:ext>
-            </a:extLst>
-          </a:blip>
-          <a:srcRect l="34024" t="1" r="50240" b="79579"/>
-          <a:stretch/>
-        </p:blipFill>
-        <p:spPr>
-          <a:xfrm>
-            <a:off x="7323234" y="4680009"/>
-            <a:ext cx="554823" cy="720000"/>
-          </a:xfrm>
-          <a:prstGeom prst="rect">
-            <a:avLst/>
-          </a:prstGeom>
-        </p:spPr>
-      </p:pic>
-      <p:pic>
-        <p:nvPicPr>
-          <p:cNvPr id="41" name="Imagem 40"/>
-          <p:cNvPicPr>
-            <a:picLocks noChangeAspect="1"/>
-          </p:cNvPicPr>
-          <p:nvPr/>
-        </p:nvPicPr>
-        <p:blipFill rotWithShape="1">
-          <a:blip r:embed="rId7">
-            <a:extLst>
-              <a:ext uri="{28A0092B-C50C-407E-A947-70E740481C1C}">
-                <a14:useLocalDpi xmlns:a14="http://schemas.microsoft.com/office/drawing/2010/main" val="0"/>
-              </a:ext>
-            </a:extLst>
-          </a:blip>
-          <a:srcRect l="43556" t="14889" r="50123" b="78465"/>
-          <a:stretch/>
-        </p:blipFill>
-        <p:spPr>
-          <a:xfrm>
-            <a:off x="7218581" y="2019562"/>
-            <a:ext cx="433525" cy="455780"/>
-          </a:xfrm>
-          <a:prstGeom prst="rect">
-            <a:avLst/>
-          </a:prstGeom>
-        </p:spPr>
-      </p:pic>
-      <p:pic>
-        <p:nvPicPr>
-          <p:cNvPr id="42" name="Imagem 41"/>
-          <p:cNvPicPr>
-            <a:picLocks noChangeAspect="1"/>
-          </p:cNvPicPr>
-          <p:nvPr/>
-        </p:nvPicPr>
-        <p:blipFill rotWithShape="1">
-          <a:blip r:embed="rId7">
-            <a:extLst>
-              <a:ext uri="{28A0092B-C50C-407E-A947-70E740481C1C}">
-                <a14:useLocalDpi xmlns:a14="http://schemas.microsoft.com/office/drawing/2010/main" val="0"/>
-              </a:ext>
-            </a:extLst>
-          </a:blip>
-          <a:srcRect l="43556" t="14889" r="50123" b="78465"/>
-          <a:stretch/>
-        </p:blipFill>
-        <p:spPr>
-          <a:xfrm>
-            <a:off x="5119323" y="2160139"/>
-            <a:ext cx="433525" cy="455780"/>
-          </a:xfrm>
-          <a:prstGeom prst="rect">
-            <a:avLst/>
-          </a:prstGeom>
-        </p:spPr>
-      </p:pic>
-      <p:pic>
-        <p:nvPicPr>
-          <p:cNvPr id="43" name="Imagem 42"/>
-          <p:cNvPicPr>
-            <a:picLocks noChangeAspect="1"/>
-          </p:cNvPicPr>
-          <p:nvPr/>
-        </p:nvPicPr>
-        <p:blipFill rotWithShape="1">
-          <a:blip r:embed="rId7">
-            <a:extLst>
-              <a:ext uri="{28A0092B-C50C-407E-A947-70E740481C1C}">
-                <a14:useLocalDpi xmlns:a14="http://schemas.microsoft.com/office/drawing/2010/main" val="0"/>
-              </a:ext>
-            </a:extLst>
-          </a:blip>
-          <a:srcRect l="43556" t="14889" r="50123" b="78465"/>
-          <a:stretch/>
-        </p:blipFill>
-        <p:spPr>
-          <a:xfrm>
-            <a:off x="5262516" y="2259306"/>
-            <a:ext cx="433525" cy="455780"/>
-          </a:xfrm>
-          <a:prstGeom prst="rect">
-            <a:avLst/>
-          </a:prstGeom>
-        </p:spPr>
-      </p:pic>
-      <p:pic>
-        <p:nvPicPr>
-          <p:cNvPr id="44" name="Imagem 43"/>
-          <p:cNvPicPr>
-            <a:picLocks noChangeAspect="1"/>
-          </p:cNvPicPr>
-          <p:nvPr/>
-        </p:nvPicPr>
-        <p:blipFill rotWithShape="1">
-          <a:blip r:embed="rId7">
-            <a:extLst>
-              <a:ext uri="{28A0092B-C50C-407E-A947-70E740481C1C}">
-                <a14:useLocalDpi xmlns:a14="http://schemas.microsoft.com/office/drawing/2010/main" val="0"/>
-              </a:ext>
-            </a:extLst>
-          </a:blip>
-          <a:srcRect l="43556" t="14889" r="50123" b="78465"/>
-          <a:stretch/>
-        </p:blipFill>
-        <p:spPr>
-          <a:xfrm>
-            <a:off x="6573948" y="3611247"/>
-            <a:ext cx="433525" cy="455780"/>
-          </a:xfrm>
-          <a:prstGeom prst="rect">
-            <a:avLst/>
-          </a:prstGeom>
-        </p:spPr>
-      </p:pic>
-      <p:pic>
-        <p:nvPicPr>
-          <p:cNvPr id="45" name="Imagem 44"/>
-          <p:cNvPicPr>
-            <a:picLocks noChangeAspect="1"/>
-          </p:cNvPicPr>
-          <p:nvPr/>
-        </p:nvPicPr>
-        <p:blipFill rotWithShape="1">
-          <a:blip r:embed="rId7">
-            <a:extLst>
-              <a:ext uri="{28A0092B-C50C-407E-A947-70E740481C1C}">
-                <a14:useLocalDpi xmlns:a14="http://schemas.microsoft.com/office/drawing/2010/main" val="0"/>
-              </a:ext>
-            </a:extLst>
-          </a:blip>
-          <a:srcRect l="43556" t="14889" r="50123" b="78465"/>
-          <a:stretch/>
-        </p:blipFill>
-        <p:spPr>
-          <a:xfrm>
-            <a:off x="7186530" y="2418486"/>
-            <a:ext cx="433525" cy="455780"/>
-          </a:xfrm>
-          <a:prstGeom prst="rect">
-            <a:avLst/>
-          </a:prstGeom>
-        </p:spPr>
-      </p:pic>
-      <p:pic>
-        <p:nvPicPr>
-          <p:cNvPr id="46" name="Imagem 45"/>
-          <p:cNvPicPr>
-            <a:picLocks noChangeAspect="1"/>
-          </p:cNvPicPr>
-          <p:nvPr/>
-        </p:nvPicPr>
-        <p:blipFill rotWithShape="1">
-          <a:blip r:embed="rId8">
-            <a:extLst>
-              <a:ext uri="{28A0092B-C50C-407E-A947-70E740481C1C}">
-                <a14:useLocalDpi xmlns:a14="http://schemas.microsoft.com/office/drawing/2010/main" val="0"/>
-              </a:ext>
-            </a:extLst>
-          </a:blip>
-          <a:srcRect l="33233" t="62653" r="58227" b="24225"/>
-          <a:stretch/>
-        </p:blipFill>
-        <p:spPr>
-          <a:xfrm>
-            <a:off x="4498196" y="3653680"/>
-            <a:ext cx="351429" cy="360000"/>
-          </a:xfrm>
-          <a:prstGeom prst="rect">
-            <a:avLst/>
-          </a:prstGeom>
-        </p:spPr>
-      </p:pic>
-      <p:pic>
-        <p:nvPicPr>
-          <p:cNvPr id="40" name="Imagem 39"/>
-          <p:cNvPicPr>
-            <a:picLocks noChangeAspect="1"/>
-          </p:cNvPicPr>
-          <p:nvPr/>
-        </p:nvPicPr>
-        <p:blipFill rotWithShape="1">
-          <a:blip r:embed="rId9">
-            <a:extLst>
-              <a:ext uri="{28A0092B-C50C-407E-A947-70E740481C1C}">
-                <a14:useLocalDpi xmlns:a14="http://schemas.microsoft.com/office/drawing/2010/main" val="0"/>
-              </a:ext>
-            </a:extLst>
-          </a:blip>
-          <a:srcRect l="27741" t="15015" r="24343" b="15796"/>
-          <a:stretch/>
-        </p:blipFill>
-        <p:spPr>
-          <a:xfrm>
-            <a:off x="9023018" y="792262"/>
-            <a:ext cx="2323071" cy="4744994"/>
-          </a:xfrm>
-          <a:prstGeom prst="rect">
-            <a:avLst/>
-          </a:prstGeom>
-          <a:noFill/>
-          <a:ln w="9525">
-            <a:noFill/>
-          </a:ln>
-        </p:spPr>
-      </p:pic>
-      <p:grpSp>
-        <p:nvGrpSpPr>
-          <p:cNvPr id="3" name="Grupo 2"/>
-          <p:cNvGrpSpPr/>
-          <p:nvPr/>
-        </p:nvGrpSpPr>
-        <p:grpSpPr>
-          <a:xfrm>
-            <a:off x="7398325" y="121762"/>
-            <a:ext cx="720000" cy="720000"/>
-            <a:chOff x="7323234" y="396691"/>
-            <a:chExt cx="720000" cy="720000"/>
+            <a:chOff x="4051022" y="1773145"/>
+            <a:chExt cx="4461037" cy="3948758"/>
           </a:xfrm>
         </p:grpSpPr>
         <p:sp>
           <p:nvSpPr>
-            <p:cNvPr id="21" name="Elipse 20"/>
+            <p:cNvPr id="26" name="Retângulo 25"/>
             <p:cNvSpPr/>
             <p:nvPr/>
           </p:nvSpPr>
           <p:spPr>
             <a:xfrm>
-              <a:off x="7323234" y="396691"/>
-              <a:ext cx="720000" cy="720000"/>
+              <a:off x="4051022" y="1773145"/>
+              <a:ext cx="4461037" cy="3948758"/>
             </a:xfrm>
-            <a:prstGeom prst="ellipse">
+            <a:prstGeom prst="rect">
               <a:avLst/>
             </a:prstGeom>
-            <a:solidFill>
-              <a:schemeClr val="accent6">
-                <a:lumMod val="50000"/>
-              </a:schemeClr>
-            </a:solidFill>
-            <a:ln>
+            <a:blipFill dpi="0" rotWithShape="1">
+              <a:blip r:embed="rId2">
+                <a:extLst>
+                  <a:ext uri="{28A0092B-C50C-407E-A947-70E740481C1C}">
+                    <a14:useLocalDpi xmlns:a14="http://schemas.microsoft.com/office/drawing/2010/main" val="0"/>
+                  </a:ext>
+                </a:extLst>
+              </a:blip>
+              <a:srcRect/>
+              <a:stretch>
+                <a:fillRect/>
+              </a:stretch>
+            </a:blipFill>
+            <a:ln w="12700">
               <a:noFill/>
             </a:ln>
-            <a:effectLst/>
-            <a:scene3d>
-              <a:camera prst="orthographicFront">
-                <a:rot lat="0" lon="0" rev="0"/>
-              </a:camera>
-              <a:lightRig rig="chilly" dir="t">
-                <a:rot lat="0" lon="0" rev="18480000"/>
-              </a:lightRig>
-            </a:scene3d>
-            <a:sp3d prstMaterial="clear">
-              <a:bevelT h="63500"/>
-            </a:sp3d>
           </p:spPr>
           <p:style>
             <a:lnRef idx="2">
@@ -6441,246 +5730,666 @@
             </a:p>
           </p:txBody>
         </p:sp>
-        <p:sp>
-          <p:nvSpPr>
-            <p:cNvPr id="2" name="Seta para cima 1"/>
-            <p:cNvSpPr/>
+        <p:pic>
+          <p:nvPicPr>
+            <p:cNvPr id="18" name="Imagem 17"/>
+            <p:cNvPicPr>
+              <a:picLocks noChangeAspect="1"/>
+            </p:cNvPicPr>
             <p:nvPr/>
-          </p:nvSpPr>
+          </p:nvPicPr>
+          <p:blipFill rotWithShape="1">
+            <a:blip r:embed="rId5">
+              <a:extLst>
+                <a:ext uri="{28A0092B-C50C-407E-A947-70E740481C1C}">
+                  <a14:useLocalDpi xmlns:a14="http://schemas.microsoft.com/office/drawing/2010/main" val="0"/>
+                </a:ext>
+              </a:extLst>
+            </a:blip>
+            <a:srcRect l="75584" t="37944" r="17074" b="49208"/>
+            <a:stretch/>
+          </p:blipFill>
           <p:spPr>
             <a:xfrm>
-              <a:off x="7575234" y="439672"/>
-              <a:ext cx="216000" cy="216000"/>
+              <a:off x="6252152" y="4331989"/>
+              <a:ext cx="263867" cy="307846"/>
             </a:xfrm>
-            <a:prstGeom prst="upArrow">
+            <a:prstGeom prst="rect">
               <a:avLst/>
             </a:prstGeom>
-            <a:noFill/>
-            <a:ln>
-              <a:noFill/>
-            </a:ln>
-            <a:effectLst/>
-            <a:scene3d>
-              <a:camera prst="orthographicFront">
-                <a:rot lat="0" lon="0" rev="0"/>
-              </a:camera>
-              <a:lightRig rig="chilly" dir="t">
-                <a:rot lat="0" lon="0" rev="18480000"/>
-              </a:lightRig>
-            </a:scene3d>
-            <a:sp3d prstMaterial="clear">
-              <a:bevelT h="63500"/>
-            </a:sp3d>
           </p:spPr>
-          <p:style>
-            <a:lnRef idx="2">
-              <a:schemeClr val="accent1">
-                <a:shade val="50000"/>
-              </a:schemeClr>
-            </a:lnRef>
-            <a:fillRef idx="1">
-              <a:schemeClr val="accent1"/>
-            </a:fillRef>
-            <a:effectRef idx="0">
-              <a:schemeClr val="accent1"/>
-            </a:effectRef>
-            <a:fontRef idx="minor">
-              <a:schemeClr val="lt1"/>
-            </a:fontRef>
-          </p:style>
-          <p:txBody>
-            <a:bodyPr rtlCol="0" anchor="ctr"/>
-            <a:lstStyle/>
-            <a:p>
-              <a:pPr algn="ctr"/>
-              <a:endParaRPr lang="pt-BR"/>
-            </a:p>
-          </p:txBody>
-        </p:sp>
-        <p:sp>
-          <p:nvSpPr>
-            <p:cNvPr id="47" name="Seta para cima 46"/>
-            <p:cNvSpPr/>
+        </p:pic>
+        <p:pic>
+          <p:nvPicPr>
+            <p:cNvPr id="25" name="Imagem 24"/>
+            <p:cNvPicPr>
+              <a:picLocks noChangeAspect="1"/>
+            </p:cNvPicPr>
             <p:nvPr/>
-          </p:nvSpPr>
+          </p:nvPicPr>
+          <p:blipFill rotWithShape="1">
+            <a:blip r:embed="rId6">
+              <a:extLst>
+                <a:ext uri="{28A0092B-C50C-407E-A947-70E740481C1C}">
+                  <a14:useLocalDpi xmlns:a14="http://schemas.microsoft.com/office/drawing/2010/main" val="0"/>
+                </a:ext>
+              </a:extLst>
+            </a:blip>
+            <a:srcRect t="87428" r="91543" b="-1"/>
+            <a:stretch/>
+          </p:blipFill>
           <p:spPr>
-            <a:xfrm flipV="1">
-              <a:off x="7575234" y="858650"/>
-              <a:ext cx="216000" cy="216000"/>
+            <a:xfrm>
+              <a:off x="7929518" y="2453860"/>
+              <a:ext cx="363225" cy="360000"/>
             </a:xfrm>
-            <a:prstGeom prst="upArrow">
+            <a:prstGeom prst="rect">
               <a:avLst/>
             </a:prstGeom>
-            <a:noFill/>
-            <a:ln>
-              <a:noFill/>
-            </a:ln>
-            <a:effectLst/>
-            <a:scene3d>
-              <a:camera prst="orthographicFront">
-                <a:rot lat="0" lon="0" rev="0"/>
-              </a:camera>
-              <a:lightRig rig="chilly" dir="t">
-                <a:rot lat="0" lon="0" rev="18480000"/>
-              </a:lightRig>
-            </a:scene3d>
-            <a:sp3d prstMaterial="clear">
-              <a:bevelT h="63500"/>
-            </a:sp3d>
           </p:spPr>
-          <p:style>
-            <a:lnRef idx="2">
-              <a:schemeClr val="accent1">
-                <a:shade val="50000"/>
-              </a:schemeClr>
-            </a:lnRef>
-            <a:fillRef idx="1">
-              <a:schemeClr val="accent1"/>
-            </a:fillRef>
-            <a:effectRef idx="0">
-              <a:schemeClr val="accent1"/>
-            </a:effectRef>
-            <a:fontRef idx="minor">
-              <a:schemeClr val="lt1"/>
-            </a:fontRef>
-          </p:style>
-          <p:txBody>
-            <a:bodyPr rtlCol="0" anchor="ctr"/>
-            <a:lstStyle/>
-            <a:p>
-              <a:pPr algn="ctr"/>
-              <a:endParaRPr lang="pt-BR"/>
-            </a:p>
-          </p:txBody>
-        </p:sp>
-        <p:sp>
-          <p:nvSpPr>
-            <p:cNvPr id="48" name="Seta para cima 47"/>
-            <p:cNvSpPr/>
+        </p:pic>
+        <p:pic>
+          <p:nvPicPr>
+            <p:cNvPr id="27" name="Imagem 26"/>
+            <p:cNvPicPr>
+              <a:picLocks noChangeAspect="1"/>
+            </p:cNvPicPr>
             <p:nvPr/>
-          </p:nvSpPr>
+          </p:nvPicPr>
+          <p:blipFill rotWithShape="1">
+            <a:blip r:embed="rId5">
+              <a:extLst>
+                <a:ext uri="{28A0092B-C50C-407E-A947-70E740481C1C}">
+                  <a14:useLocalDpi xmlns:a14="http://schemas.microsoft.com/office/drawing/2010/main" val="0"/>
+                </a:ext>
+              </a:extLst>
+            </a:blip>
+            <a:srcRect l="74952" t="24920" r="16651" b="62154"/>
+            <a:stretch/>
+          </p:blipFill>
           <p:spPr>
-            <a:xfrm rot="16200000">
-              <a:off x="7358678" y="649161"/>
-              <a:ext cx="216000" cy="216000"/>
+            <a:xfrm>
+              <a:off x="6932308" y="4314068"/>
+              <a:ext cx="344515" cy="353571"/>
             </a:xfrm>
-            <a:prstGeom prst="upArrow">
+            <a:prstGeom prst="rect">
               <a:avLst/>
             </a:prstGeom>
-            <a:noFill/>
-            <a:ln>
-              <a:noFill/>
-            </a:ln>
-            <a:effectLst/>
-            <a:scene3d>
-              <a:camera prst="orthographicFront">
-                <a:rot lat="0" lon="0" rev="0"/>
-              </a:camera>
-              <a:lightRig rig="chilly" dir="t">
-                <a:rot lat="0" lon="0" rev="18480000"/>
-              </a:lightRig>
-            </a:scene3d>
-            <a:sp3d prstMaterial="clear">
-              <a:bevelT h="63500"/>
-            </a:sp3d>
           </p:spPr>
-          <p:style>
-            <a:lnRef idx="2">
-              <a:schemeClr val="accent1">
-                <a:shade val="50000"/>
-              </a:schemeClr>
-            </a:lnRef>
-            <a:fillRef idx="1">
-              <a:schemeClr val="accent1"/>
-            </a:fillRef>
-            <a:effectRef idx="0">
-              <a:schemeClr val="accent1"/>
-            </a:effectRef>
-            <a:fontRef idx="minor">
-              <a:schemeClr val="lt1"/>
-            </a:fontRef>
-          </p:style>
-          <p:txBody>
-            <a:bodyPr rtlCol="0" anchor="ctr"/>
-            <a:lstStyle/>
-            <a:p>
-              <a:pPr algn="ctr"/>
-              <a:endParaRPr lang="pt-BR"/>
-            </a:p>
-          </p:txBody>
-        </p:sp>
-        <p:sp>
-          <p:nvSpPr>
-            <p:cNvPr id="49" name="Seta para cima 48"/>
-            <p:cNvSpPr/>
+        </p:pic>
+        <p:pic>
+          <p:nvPicPr>
+            <p:cNvPr id="23" name="Imagem 22"/>
+            <p:cNvPicPr>
+              <a:picLocks noChangeAspect="1"/>
+            </p:cNvPicPr>
             <p:nvPr/>
-          </p:nvSpPr>
+          </p:nvPicPr>
+          <p:blipFill rotWithShape="1">
+            <a:blip r:embed="rId4" cstate="print">
+              <a:extLst>
+                <a:ext uri="{28A0092B-C50C-407E-A947-70E740481C1C}">
+                  <a14:useLocalDpi xmlns:a14="http://schemas.microsoft.com/office/drawing/2010/main" val="0"/>
+                </a:ext>
+              </a:extLst>
+            </a:blip>
+            <a:srcRect l="84740" r="9755" b="86363"/>
+            <a:stretch/>
+          </p:blipFill>
           <p:spPr>
-            <a:xfrm rot="5400000" flipH="1">
-              <a:off x="7768270" y="644655"/>
-              <a:ext cx="216000" cy="216000"/>
+            <a:xfrm>
+              <a:off x="5184019" y="2809975"/>
+              <a:ext cx="261578" cy="432000"/>
             </a:xfrm>
-            <a:prstGeom prst="upArrow">
+            <a:prstGeom prst="rect">
               <a:avLst/>
             </a:prstGeom>
+          </p:spPr>
+        </p:pic>
+        <p:pic>
+          <p:nvPicPr>
+            <p:cNvPr id="28" name="Imagem 27"/>
+            <p:cNvPicPr>
+              <a:picLocks noChangeAspect="1"/>
+            </p:cNvPicPr>
+            <p:nvPr/>
+          </p:nvPicPr>
+          <p:blipFill rotWithShape="1">
+            <a:blip r:embed="rId3">
+              <a:extLst>
+                <a:ext uri="{28A0092B-C50C-407E-A947-70E740481C1C}">
+                  <a14:useLocalDpi xmlns:a14="http://schemas.microsoft.com/office/drawing/2010/main" val="0"/>
+                </a:ext>
+              </a:extLst>
+            </a:blip>
+            <a:srcRect l="34024" t="1" r="50240" b="79579"/>
+            <a:stretch/>
+          </p:blipFill>
+          <p:spPr>
+            <a:xfrm>
+              <a:off x="4462914" y="2539719"/>
+              <a:ext cx="554823" cy="720000"/>
+            </a:xfrm>
+            <a:prstGeom prst="rect">
+              <a:avLst/>
+            </a:prstGeom>
+          </p:spPr>
+        </p:pic>
+        <p:pic>
+          <p:nvPicPr>
+            <p:cNvPr id="29" name="Imagem 28"/>
+            <p:cNvPicPr>
+              <a:picLocks noChangeAspect="1"/>
+            </p:cNvPicPr>
+            <p:nvPr/>
+          </p:nvPicPr>
+          <p:blipFill rotWithShape="1">
+            <a:blip r:embed="rId3">
+              <a:extLst>
+                <a:ext uri="{28A0092B-C50C-407E-A947-70E740481C1C}">
+                  <a14:useLocalDpi xmlns:a14="http://schemas.microsoft.com/office/drawing/2010/main" val="0"/>
+                </a:ext>
+              </a:extLst>
+            </a:blip>
+            <a:srcRect l="49880" t="241" r="33062" b="79098"/>
+            <a:stretch/>
+          </p:blipFill>
+          <p:spPr>
+            <a:xfrm>
+              <a:off x="6149598" y="1947196"/>
+              <a:ext cx="891628" cy="1080000"/>
+            </a:xfrm>
+            <a:prstGeom prst="rect">
+              <a:avLst/>
+            </a:prstGeom>
+          </p:spPr>
+        </p:pic>
+        <p:pic>
+          <p:nvPicPr>
+            <p:cNvPr id="30" name="Imagem 29"/>
+            <p:cNvPicPr>
+              <a:picLocks noChangeAspect="1"/>
+            </p:cNvPicPr>
+            <p:nvPr/>
+          </p:nvPicPr>
+          <p:blipFill rotWithShape="1">
+            <a:blip r:embed="rId3">
+              <a:extLst>
+                <a:ext uri="{28A0092B-C50C-407E-A947-70E740481C1C}">
+                  <a14:useLocalDpi xmlns:a14="http://schemas.microsoft.com/office/drawing/2010/main" val="0"/>
+                </a:ext>
+              </a:extLst>
+            </a:blip>
+            <a:srcRect l="34024" t="1" r="50240" b="79579"/>
+            <a:stretch/>
+          </p:blipFill>
+          <p:spPr>
+            <a:xfrm>
+              <a:off x="4677424" y="4107991"/>
+              <a:ext cx="554823" cy="720000"/>
+            </a:xfrm>
+            <a:prstGeom prst="rect">
+              <a:avLst/>
+            </a:prstGeom>
+          </p:spPr>
+        </p:pic>
+        <p:pic>
+          <p:nvPicPr>
+            <p:cNvPr id="31" name="Imagem 30"/>
+            <p:cNvPicPr>
+              <a:picLocks noChangeAspect="1"/>
+            </p:cNvPicPr>
+            <p:nvPr/>
+          </p:nvPicPr>
+          <p:blipFill rotWithShape="1">
+            <a:blip r:embed="rId3">
+              <a:extLst>
+                <a:ext uri="{28A0092B-C50C-407E-A947-70E740481C1C}">
+                  <a14:useLocalDpi xmlns:a14="http://schemas.microsoft.com/office/drawing/2010/main" val="0"/>
+                </a:ext>
+              </a:extLst>
+            </a:blip>
+            <a:srcRect l="34024" t="1" r="50240" b="79579"/>
+            <a:stretch/>
+          </p:blipFill>
+          <p:spPr>
+            <a:xfrm>
+              <a:off x="7652106" y="2939450"/>
+              <a:ext cx="554823" cy="720000"/>
+            </a:xfrm>
+            <a:prstGeom prst="rect">
+              <a:avLst/>
+            </a:prstGeom>
+          </p:spPr>
+        </p:pic>
+        <p:pic>
+          <p:nvPicPr>
+            <p:cNvPr id="32" name="Imagem 31"/>
+            <p:cNvPicPr>
+              <a:picLocks noChangeAspect="1"/>
+            </p:cNvPicPr>
+            <p:nvPr/>
+          </p:nvPicPr>
+          <p:blipFill rotWithShape="1">
+            <a:blip r:embed="rId3">
+              <a:extLst>
+                <a:ext uri="{28A0092B-C50C-407E-A947-70E740481C1C}">
+                  <a14:useLocalDpi xmlns:a14="http://schemas.microsoft.com/office/drawing/2010/main" val="0"/>
+                </a:ext>
+              </a:extLst>
+            </a:blip>
+            <a:srcRect l="34024" t="1" r="50240" b="79579"/>
+            <a:stretch/>
+          </p:blipFill>
+          <p:spPr>
+            <a:xfrm>
+              <a:off x="7360343" y="3027196"/>
+              <a:ext cx="554823" cy="720000"/>
+            </a:xfrm>
+            <a:prstGeom prst="rect">
+              <a:avLst/>
+            </a:prstGeom>
+          </p:spPr>
+        </p:pic>
+        <p:pic>
+          <p:nvPicPr>
+            <p:cNvPr id="33" name="Imagem 32"/>
+            <p:cNvPicPr>
+              <a:picLocks noChangeAspect="1"/>
+            </p:cNvPicPr>
+            <p:nvPr/>
+          </p:nvPicPr>
+          <p:blipFill rotWithShape="1">
+            <a:blip r:embed="rId3">
+              <a:extLst>
+                <a:ext uri="{28A0092B-C50C-407E-A947-70E740481C1C}">
+                  <a14:useLocalDpi xmlns:a14="http://schemas.microsoft.com/office/drawing/2010/main" val="0"/>
+                </a:ext>
+              </a:extLst>
+            </a:blip>
+            <a:srcRect l="34024" t="1" r="50240" b="79579"/>
+            <a:stretch/>
+          </p:blipFill>
+          <p:spPr>
+            <a:xfrm>
+              <a:off x="7598859" y="3250428"/>
+              <a:ext cx="554823" cy="720000"/>
+            </a:xfrm>
+            <a:prstGeom prst="rect">
+              <a:avLst/>
+            </a:prstGeom>
+          </p:spPr>
+        </p:pic>
+        <p:pic>
+          <p:nvPicPr>
+            <p:cNvPr id="35" name="Imagem 34"/>
+            <p:cNvPicPr>
+              <a:picLocks noChangeAspect="1"/>
+            </p:cNvPicPr>
+            <p:nvPr/>
+          </p:nvPicPr>
+          <p:blipFill rotWithShape="1">
+            <a:blip r:embed="rId3">
+              <a:extLst>
+                <a:ext uri="{28A0092B-C50C-407E-A947-70E740481C1C}">
+                  <a14:useLocalDpi xmlns:a14="http://schemas.microsoft.com/office/drawing/2010/main" val="0"/>
+                </a:ext>
+              </a:extLst>
+            </a:blip>
+            <a:srcRect l="34024" t="1" r="50240" b="79579"/>
+            <a:stretch/>
+          </p:blipFill>
+          <p:spPr>
+            <a:xfrm>
+              <a:off x="5441011" y="3164759"/>
+              <a:ext cx="554823" cy="720000"/>
+            </a:xfrm>
+            <a:prstGeom prst="rect">
+              <a:avLst/>
+            </a:prstGeom>
+          </p:spPr>
+        </p:pic>
+        <p:pic>
+          <p:nvPicPr>
+            <p:cNvPr id="36" name="Imagem 35"/>
+            <p:cNvPicPr>
+              <a:picLocks noChangeAspect="1"/>
+            </p:cNvPicPr>
+            <p:nvPr/>
+          </p:nvPicPr>
+          <p:blipFill rotWithShape="1">
+            <a:blip r:embed="rId3">
+              <a:extLst>
+                <a:ext uri="{28A0092B-C50C-407E-A947-70E740481C1C}">
+                  <a14:useLocalDpi xmlns:a14="http://schemas.microsoft.com/office/drawing/2010/main" val="0"/>
+                </a:ext>
+              </a:extLst>
+            </a:blip>
+            <a:srcRect l="34024" t="1" r="50240" b="79579"/>
+            <a:stretch/>
+          </p:blipFill>
+          <p:spPr>
+            <a:xfrm>
+              <a:off x="5677467" y="3347027"/>
+              <a:ext cx="554823" cy="720000"/>
+            </a:xfrm>
+            <a:prstGeom prst="rect">
+              <a:avLst/>
+            </a:prstGeom>
+          </p:spPr>
+        </p:pic>
+        <p:pic>
+          <p:nvPicPr>
+            <p:cNvPr id="37" name="Imagem 36"/>
+            <p:cNvPicPr>
+              <a:picLocks noChangeAspect="1"/>
+            </p:cNvPicPr>
+            <p:nvPr/>
+          </p:nvPicPr>
+          <p:blipFill rotWithShape="1">
+            <a:blip r:embed="rId3">
+              <a:extLst>
+                <a:ext uri="{28A0092B-C50C-407E-A947-70E740481C1C}">
+                  <a14:useLocalDpi xmlns:a14="http://schemas.microsoft.com/office/drawing/2010/main" val="0"/>
+                </a:ext>
+              </a:extLst>
+            </a:blip>
+            <a:srcRect l="34024" t="1" r="50240" b="79579"/>
+            <a:stretch/>
+          </p:blipFill>
+          <p:spPr>
+            <a:xfrm>
+              <a:off x="4615314" y="2692119"/>
+              <a:ext cx="554823" cy="720000"/>
+            </a:xfrm>
+            <a:prstGeom prst="rect">
+              <a:avLst/>
+            </a:prstGeom>
+          </p:spPr>
+        </p:pic>
+        <p:pic>
+          <p:nvPicPr>
+            <p:cNvPr id="39" name="Imagem 38"/>
+            <p:cNvPicPr>
+              <a:picLocks noChangeAspect="1"/>
+            </p:cNvPicPr>
+            <p:nvPr/>
+          </p:nvPicPr>
+          <p:blipFill rotWithShape="1">
+            <a:blip r:embed="rId3">
+              <a:extLst>
+                <a:ext uri="{28A0092B-C50C-407E-A947-70E740481C1C}">
+                  <a14:useLocalDpi xmlns:a14="http://schemas.microsoft.com/office/drawing/2010/main" val="0"/>
+                </a:ext>
+              </a:extLst>
+            </a:blip>
+            <a:srcRect l="34024" t="1" r="50240" b="79579"/>
+            <a:stretch/>
+          </p:blipFill>
+          <p:spPr>
+            <a:xfrm>
+              <a:off x="7543755" y="4592263"/>
+              <a:ext cx="554823" cy="720000"/>
+            </a:xfrm>
+            <a:prstGeom prst="rect">
+              <a:avLst/>
+            </a:prstGeom>
+          </p:spPr>
+        </p:pic>
+        <p:pic>
+          <p:nvPicPr>
+            <p:cNvPr id="38" name="Imagem 37"/>
+            <p:cNvPicPr>
+              <a:picLocks noChangeAspect="1"/>
+            </p:cNvPicPr>
+            <p:nvPr/>
+          </p:nvPicPr>
+          <p:blipFill rotWithShape="1">
+            <a:blip r:embed="rId3">
+              <a:extLst>
+                <a:ext uri="{28A0092B-C50C-407E-A947-70E740481C1C}">
+                  <a14:useLocalDpi xmlns:a14="http://schemas.microsoft.com/office/drawing/2010/main" val="0"/>
+                </a:ext>
+              </a:extLst>
+            </a:blip>
+            <a:srcRect l="34024" t="1" r="50240" b="79579"/>
+            <a:stretch/>
+          </p:blipFill>
+          <p:spPr>
+            <a:xfrm>
+              <a:off x="7323234" y="4680009"/>
+              <a:ext cx="554823" cy="720000"/>
+            </a:xfrm>
+            <a:prstGeom prst="rect">
+              <a:avLst/>
+            </a:prstGeom>
+          </p:spPr>
+        </p:pic>
+        <p:pic>
+          <p:nvPicPr>
+            <p:cNvPr id="41" name="Imagem 40"/>
+            <p:cNvPicPr>
+              <a:picLocks noChangeAspect="1"/>
+            </p:cNvPicPr>
+            <p:nvPr/>
+          </p:nvPicPr>
+          <p:blipFill rotWithShape="1">
+            <a:blip r:embed="rId7">
+              <a:extLst>
+                <a:ext uri="{28A0092B-C50C-407E-A947-70E740481C1C}">
+                  <a14:useLocalDpi xmlns:a14="http://schemas.microsoft.com/office/drawing/2010/main" val="0"/>
+                </a:ext>
+              </a:extLst>
+            </a:blip>
+            <a:srcRect l="43556" t="14889" r="50123" b="78465"/>
+            <a:stretch/>
+          </p:blipFill>
+          <p:spPr>
+            <a:xfrm>
+              <a:off x="7218581" y="2019562"/>
+              <a:ext cx="433525" cy="455780"/>
+            </a:xfrm>
+            <a:prstGeom prst="rect">
+              <a:avLst/>
+            </a:prstGeom>
+          </p:spPr>
+        </p:pic>
+        <p:pic>
+          <p:nvPicPr>
+            <p:cNvPr id="42" name="Imagem 41"/>
+            <p:cNvPicPr>
+              <a:picLocks noChangeAspect="1"/>
+            </p:cNvPicPr>
+            <p:nvPr/>
+          </p:nvPicPr>
+          <p:blipFill rotWithShape="1">
+            <a:blip r:embed="rId7">
+              <a:extLst>
+                <a:ext uri="{28A0092B-C50C-407E-A947-70E740481C1C}">
+                  <a14:useLocalDpi xmlns:a14="http://schemas.microsoft.com/office/drawing/2010/main" val="0"/>
+                </a:ext>
+              </a:extLst>
+            </a:blip>
+            <a:srcRect l="43556" t="14889" r="50123" b="78465"/>
+            <a:stretch/>
+          </p:blipFill>
+          <p:spPr>
+            <a:xfrm>
+              <a:off x="5119323" y="2160139"/>
+              <a:ext cx="433525" cy="455780"/>
+            </a:xfrm>
+            <a:prstGeom prst="rect">
+              <a:avLst/>
+            </a:prstGeom>
+          </p:spPr>
+        </p:pic>
+        <p:pic>
+          <p:nvPicPr>
+            <p:cNvPr id="43" name="Imagem 42"/>
+            <p:cNvPicPr>
+              <a:picLocks noChangeAspect="1"/>
+            </p:cNvPicPr>
+            <p:nvPr/>
+          </p:nvPicPr>
+          <p:blipFill rotWithShape="1">
+            <a:blip r:embed="rId7">
+              <a:extLst>
+                <a:ext uri="{28A0092B-C50C-407E-A947-70E740481C1C}">
+                  <a14:useLocalDpi xmlns:a14="http://schemas.microsoft.com/office/drawing/2010/main" val="0"/>
+                </a:ext>
+              </a:extLst>
+            </a:blip>
+            <a:srcRect l="43556" t="14889" r="50123" b="78465"/>
+            <a:stretch/>
+          </p:blipFill>
+          <p:spPr>
+            <a:xfrm>
+              <a:off x="5262516" y="2259306"/>
+              <a:ext cx="433525" cy="455780"/>
+            </a:xfrm>
+            <a:prstGeom prst="rect">
+              <a:avLst/>
+            </a:prstGeom>
+          </p:spPr>
+        </p:pic>
+        <p:pic>
+          <p:nvPicPr>
+            <p:cNvPr id="44" name="Imagem 43"/>
+            <p:cNvPicPr>
+              <a:picLocks noChangeAspect="1"/>
+            </p:cNvPicPr>
+            <p:nvPr/>
+          </p:nvPicPr>
+          <p:blipFill rotWithShape="1">
+            <a:blip r:embed="rId7">
+              <a:extLst>
+                <a:ext uri="{28A0092B-C50C-407E-A947-70E740481C1C}">
+                  <a14:useLocalDpi xmlns:a14="http://schemas.microsoft.com/office/drawing/2010/main" val="0"/>
+                </a:ext>
+              </a:extLst>
+            </a:blip>
+            <a:srcRect l="43556" t="14889" r="50123" b="78465"/>
+            <a:stretch/>
+          </p:blipFill>
+          <p:spPr>
+            <a:xfrm>
+              <a:off x="6573948" y="3611247"/>
+              <a:ext cx="433525" cy="455780"/>
+            </a:xfrm>
+            <a:prstGeom prst="rect">
+              <a:avLst/>
+            </a:prstGeom>
+          </p:spPr>
+        </p:pic>
+        <p:pic>
+          <p:nvPicPr>
+            <p:cNvPr id="45" name="Imagem 44"/>
+            <p:cNvPicPr>
+              <a:picLocks noChangeAspect="1"/>
+            </p:cNvPicPr>
+            <p:nvPr/>
+          </p:nvPicPr>
+          <p:blipFill rotWithShape="1">
+            <a:blip r:embed="rId7">
+              <a:extLst>
+                <a:ext uri="{28A0092B-C50C-407E-A947-70E740481C1C}">
+                  <a14:useLocalDpi xmlns:a14="http://schemas.microsoft.com/office/drawing/2010/main" val="0"/>
+                </a:ext>
+              </a:extLst>
+            </a:blip>
+            <a:srcRect l="43556" t="14889" r="50123" b="78465"/>
+            <a:stretch/>
+          </p:blipFill>
+          <p:spPr>
+            <a:xfrm>
+              <a:off x="7186530" y="2418486"/>
+              <a:ext cx="433525" cy="455780"/>
+            </a:xfrm>
+            <a:prstGeom prst="rect">
+              <a:avLst/>
+            </a:prstGeom>
+          </p:spPr>
+        </p:pic>
+        <p:pic>
+          <p:nvPicPr>
+            <p:cNvPr id="46" name="Imagem 45"/>
+            <p:cNvPicPr>
+              <a:picLocks noChangeAspect="1"/>
+            </p:cNvPicPr>
+            <p:nvPr/>
+          </p:nvPicPr>
+          <p:blipFill rotWithShape="1">
+            <a:blip r:embed="rId8">
+              <a:extLst>
+                <a:ext uri="{28A0092B-C50C-407E-A947-70E740481C1C}">
+                  <a14:useLocalDpi xmlns:a14="http://schemas.microsoft.com/office/drawing/2010/main" val="0"/>
+                </a:ext>
+              </a:extLst>
+            </a:blip>
+            <a:srcRect l="33233" t="62653" r="58227" b="24225"/>
+            <a:stretch/>
+          </p:blipFill>
+          <p:spPr>
+            <a:xfrm>
+              <a:off x="4498196" y="3653680"/>
+              <a:ext cx="351429" cy="360000"/>
+            </a:xfrm>
+            <a:prstGeom prst="rect">
+              <a:avLst/>
+            </a:prstGeom>
+          </p:spPr>
+        </p:pic>
+      </p:grpSp>
+      <p:pic>
+        <p:nvPicPr>
+          <p:cNvPr id="40" name="Imagem 39"/>
+          <p:cNvPicPr>
+            <a:picLocks noChangeAspect="1"/>
+          </p:cNvPicPr>
+          <p:nvPr/>
+        </p:nvPicPr>
+        <p:blipFill rotWithShape="1">
+          <a:blip r:embed="rId9">
+            <a:extLst>
+              <a:ext uri="{28A0092B-C50C-407E-A947-70E740481C1C}">
+                <a14:useLocalDpi xmlns:a14="http://schemas.microsoft.com/office/drawing/2010/main" val="0"/>
+              </a:ext>
+            </a:extLst>
+          </a:blip>
+          <a:srcRect l="27741" t="15015" r="24343" b="15796"/>
+          <a:stretch/>
+        </p:blipFill>
+        <p:spPr>
+          <a:xfrm rot="16200000">
+            <a:off x="9417890" y="-1267416"/>
+            <a:ext cx="2323071" cy="4744994"/>
+          </a:xfrm>
+          <a:prstGeom prst="rect">
+            <a:avLst/>
+          </a:prstGeom>
+          <a:noFill/>
+          <a:ln w="9525">
             <a:noFill/>
-            <a:ln>
-              <a:noFill/>
-            </a:ln>
-            <a:effectLst/>
-            <a:scene3d>
-              <a:camera prst="orthographicFront">
-                <a:rot lat="0" lon="0" rev="0"/>
-              </a:camera>
-              <a:lightRig rig="chilly" dir="t">
-                <a:rot lat="0" lon="0" rev="18480000"/>
-              </a:lightRig>
-            </a:scene3d>
-            <a:sp3d prstMaterial="clear">
-              <a:bevelT h="63500"/>
-            </a:sp3d>
-          </p:spPr>
-          <p:style>
-            <a:lnRef idx="2">
-              <a:schemeClr val="accent1">
-                <a:shade val="50000"/>
-              </a:schemeClr>
-            </a:lnRef>
-            <a:fillRef idx="1">
-              <a:schemeClr val="accent1"/>
-            </a:fillRef>
-            <a:effectRef idx="0">
-              <a:schemeClr val="accent1"/>
-            </a:effectRef>
-            <a:fontRef idx="minor">
-              <a:schemeClr val="lt1"/>
-            </a:fontRef>
-          </p:style>
-          <p:txBody>
-            <a:bodyPr rtlCol="0" anchor="ctr"/>
-            <a:lstStyle/>
-            <a:p>
-              <a:pPr algn="ctr"/>
-              <a:endParaRPr lang="pt-BR"/>
-            </a:p>
-          </p:txBody>
-        </p:sp>
-      </p:grpSp>
-      <p:sp>
-        <p:nvSpPr>
-          <p:cNvPr id="4" name="Elipse 3"/>
+          </a:ln>
+        </p:spPr>
+      </p:pic>
+      <p:sp>
+        <p:nvSpPr>
+          <p:cNvPr id="21" name="Elipse 20"/>
           <p:cNvSpPr/>
           <p:nvPr/>
         </p:nvSpPr>
         <p:spPr>
           <a:xfrm>
-            <a:off x="8587453" y="294471"/>
-            <a:ext cx="360000" cy="360000"/>
+            <a:off x="9065677" y="1287950"/>
+            <a:ext cx="720000" cy="720000"/>
           </a:xfrm>
           <a:prstGeom prst="ellipse">
             <a:avLst/>
           </a:prstGeom>
-          <a:noFill/>
+          <a:solidFill>
+            <a:schemeClr val="bg1"/>
+          </a:solidFill>
           <a:ln>
             <a:noFill/>
           </a:ln>
@@ -6722,10 +6431,1069 @@
           </a:p>
         </p:txBody>
       </p:sp>
+      <p:sp>
+        <p:nvSpPr>
+          <p:cNvPr id="2" name="Seta para cima 1"/>
+          <p:cNvSpPr/>
+          <p:nvPr/>
+        </p:nvSpPr>
+        <p:spPr>
+          <a:xfrm>
+            <a:off x="9317677" y="1330931"/>
+            <a:ext cx="216000" cy="216000"/>
+          </a:xfrm>
+          <a:prstGeom prst="upArrow">
+            <a:avLst/>
+          </a:prstGeom>
+          <a:solidFill>
+            <a:schemeClr val="accent6"/>
+          </a:solidFill>
+          <a:ln>
+            <a:noFill/>
+          </a:ln>
+          <a:effectLst/>
+          <a:scene3d>
+            <a:camera prst="orthographicFront">
+              <a:rot lat="0" lon="0" rev="0"/>
+            </a:camera>
+            <a:lightRig rig="chilly" dir="t">
+              <a:rot lat="0" lon="0" rev="18480000"/>
+            </a:lightRig>
+          </a:scene3d>
+          <a:sp3d prstMaterial="clear">
+            <a:bevelT h="63500"/>
+          </a:sp3d>
+        </p:spPr>
+        <p:style>
+          <a:lnRef idx="2">
+            <a:schemeClr val="accent1">
+              <a:shade val="50000"/>
+            </a:schemeClr>
+          </a:lnRef>
+          <a:fillRef idx="1">
+            <a:schemeClr val="accent1"/>
+          </a:fillRef>
+          <a:effectRef idx="0">
+            <a:schemeClr val="accent1"/>
+          </a:effectRef>
+          <a:fontRef idx="minor">
+            <a:schemeClr val="lt1"/>
+          </a:fontRef>
+        </p:style>
+        <p:txBody>
+          <a:bodyPr rtlCol="0" anchor="ctr"/>
+          <a:lstStyle/>
+          <a:p>
+            <a:pPr algn="ctr"/>
+            <a:endParaRPr lang="pt-BR"/>
+          </a:p>
+        </p:txBody>
+      </p:sp>
+      <p:sp>
+        <p:nvSpPr>
+          <p:cNvPr id="47" name="Seta para cima 46"/>
+          <p:cNvSpPr/>
+          <p:nvPr/>
+        </p:nvSpPr>
+        <p:spPr>
+          <a:xfrm flipV="1">
+            <a:off x="9317677" y="1749909"/>
+            <a:ext cx="216000" cy="216000"/>
+          </a:xfrm>
+          <a:prstGeom prst="upArrow">
+            <a:avLst/>
+          </a:prstGeom>
+          <a:solidFill>
+            <a:schemeClr val="accent6"/>
+          </a:solidFill>
+          <a:ln>
+            <a:noFill/>
+          </a:ln>
+          <a:effectLst/>
+          <a:scene3d>
+            <a:camera prst="orthographicFront">
+              <a:rot lat="0" lon="0" rev="0"/>
+            </a:camera>
+            <a:lightRig rig="chilly" dir="t">
+              <a:rot lat="0" lon="0" rev="18480000"/>
+            </a:lightRig>
+          </a:scene3d>
+          <a:sp3d prstMaterial="clear">
+            <a:bevelT h="63500"/>
+          </a:sp3d>
+        </p:spPr>
+        <p:style>
+          <a:lnRef idx="2">
+            <a:schemeClr val="accent1">
+              <a:shade val="50000"/>
+            </a:schemeClr>
+          </a:lnRef>
+          <a:fillRef idx="1">
+            <a:schemeClr val="accent1"/>
+          </a:fillRef>
+          <a:effectRef idx="0">
+            <a:schemeClr val="accent1"/>
+          </a:effectRef>
+          <a:fontRef idx="minor">
+            <a:schemeClr val="lt1"/>
+          </a:fontRef>
+        </p:style>
+        <p:txBody>
+          <a:bodyPr rtlCol="0" anchor="ctr"/>
+          <a:lstStyle/>
+          <a:p>
+            <a:pPr algn="ctr"/>
+            <a:endParaRPr lang="pt-BR"/>
+          </a:p>
+        </p:txBody>
+      </p:sp>
+      <p:sp>
+        <p:nvSpPr>
+          <p:cNvPr id="48" name="Seta para cima 47"/>
+          <p:cNvSpPr/>
+          <p:nvPr/>
+        </p:nvSpPr>
+        <p:spPr>
+          <a:xfrm rot="16200000">
+            <a:off x="9101121" y="1540420"/>
+            <a:ext cx="216000" cy="216000"/>
+          </a:xfrm>
+          <a:prstGeom prst="upArrow">
+            <a:avLst/>
+          </a:prstGeom>
+          <a:solidFill>
+            <a:schemeClr val="accent6"/>
+          </a:solidFill>
+          <a:ln>
+            <a:noFill/>
+          </a:ln>
+          <a:effectLst/>
+          <a:scene3d>
+            <a:camera prst="orthographicFront">
+              <a:rot lat="0" lon="0" rev="0"/>
+            </a:camera>
+            <a:lightRig rig="chilly" dir="t">
+              <a:rot lat="0" lon="0" rev="18480000"/>
+            </a:lightRig>
+          </a:scene3d>
+          <a:sp3d prstMaterial="clear">
+            <a:bevelT h="63500"/>
+          </a:sp3d>
+        </p:spPr>
+        <p:style>
+          <a:lnRef idx="2">
+            <a:schemeClr val="accent1">
+              <a:shade val="50000"/>
+            </a:schemeClr>
+          </a:lnRef>
+          <a:fillRef idx="1">
+            <a:schemeClr val="accent1"/>
+          </a:fillRef>
+          <a:effectRef idx="0">
+            <a:schemeClr val="accent1"/>
+          </a:effectRef>
+          <a:fontRef idx="minor">
+            <a:schemeClr val="lt1"/>
+          </a:fontRef>
+        </p:style>
+        <p:txBody>
+          <a:bodyPr rtlCol="0" anchor="ctr"/>
+          <a:lstStyle/>
+          <a:p>
+            <a:pPr algn="ctr"/>
+            <a:endParaRPr lang="pt-BR"/>
+          </a:p>
+        </p:txBody>
+      </p:sp>
+      <p:sp>
+        <p:nvSpPr>
+          <p:cNvPr id="49" name="Seta para cima 48"/>
+          <p:cNvSpPr/>
+          <p:nvPr/>
+        </p:nvSpPr>
+        <p:spPr>
+          <a:xfrm rot="5400000" flipH="1">
+            <a:off x="9425677" y="3926671"/>
+            <a:ext cx="360000" cy="360000"/>
+          </a:xfrm>
+          <a:prstGeom prst="upArrow">
+            <a:avLst/>
+          </a:prstGeom>
+          <a:ln/>
+        </p:spPr>
+        <p:style>
+          <a:lnRef idx="2">
+            <a:schemeClr val="accent1">
+              <a:shade val="50000"/>
+            </a:schemeClr>
+          </a:lnRef>
+          <a:fillRef idx="1">
+            <a:schemeClr val="accent1"/>
+          </a:fillRef>
+          <a:effectRef idx="0">
+            <a:schemeClr val="accent1"/>
+          </a:effectRef>
+          <a:fontRef idx="minor">
+            <a:schemeClr val="lt1"/>
+          </a:fontRef>
+        </p:style>
+        <p:txBody>
+          <a:bodyPr rtlCol="0" anchor="ctr"/>
+          <a:lstStyle/>
+          <a:p>
+            <a:pPr algn="ctr"/>
+            <a:endParaRPr lang="pt-BR"/>
+          </a:p>
+        </p:txBody>
+      </p:sp>
+      <p:sp>
+        <p:nvSpPr>
+          <p:cNvPr id="4" name="Elipse 3"/>
+          <p:cNvSpPr/>
+          <p:nvPr/>
+        </p:nvSpPr>
+        <p:spPr>
+          <a:xfrm>
+            <a:off x="11891072" y="1533487"/>
+            <a:ext cx="360000" cy="360000"/>
+          </a:xfrm>
+          <a:prstGeom prst="ellipse">
+            <a:avLst/>
+          </a:prstGeom>
+          <a:solidFill>
+            <a:schemeClr val="bg1"/>
+          </a:solidFill>
+          <a:ln>
+            <a:noFill/>
+          </a:ln>
+          <a:effectLst/>
+          <a:scene3d>
+            <a:camera prst="orthographicFront">
+              <a:rot lat="0" lon="0" rev="0"/>
+            </a:camera>
+            <a:lightRig rig="chilly" dir="t">
+              <a:rot lat="0" lon="0" rev="18480000"/>
+            </a:lightRig>
+          </a:scene3d>
+          <a:sp3d prstMaterial="clear">
+            <a:bevelT h="63500"/>
+          </a:sp3d>
+        </p:spPr>
+        <p:style>
+          <a:lnRef idx="2">
+            <a:schemeClr val="accent1">
+              <a:shade val="50000"/>
+            </a:schemeClr>
+          </a:lnRef>
+          <a:fillRef idx="1">
+            <a:schemeClr val="accent1"/>
+          </a:fillRef>
+          <a:effectRef idx="0">
+            <a:schemeClr val="accent1"/>
+          </a:effectRef>
+          <a:fontRef idx="minor">
+            <a:schemeClr val="lt1"/>
+          </a:fontRef>
+        </p:style>
+        <p:txBody>
+          <a:bodyPr rtlCol="0" anchor="ctr"/>
+          <a:lstStyle/>
+          <a:p>
+            <a:pPr algn="ctr"/>
+            <a:endParaRPr lang="pt-BR"/>
+          </a:p>
+        </p:txBody>
+      </p:sp>
     </p:spTree>
     <p:extLst>
       <p:ext uri="{BB962C8B-B14F-4D97-AF65-F5344CB8AC3E}">
         <p14:creationId xmlns:p14="http://schemas.microsoft.com/office/powerpoint/2010/main" val="2190858128"/>
+      </p:ext>
+    </p:extLst>
+  </p:cSld>
+  <p:clrMapOvr>
+    <a:masterClrMapping/>
+  </p:clrMapOvr>
+</p:sld>
+</file>
+
+<file path=ppt/slides/slide4.xml><?xml version="1.0" encoding="utf-8"?>
+<p:sld xmlns:a="http://schemas.openxmlformats.org/drawingml/2006/main" xmlns:r="http://schemas.openxmlformats.org/officeDocument/2006/relationships" xmlns:p="http://schemas.openxmlformats.org/presentationml/2006/main">
+  <p:cSld>
+    <p:spTree>
+      <p:nvGrpSpPr>
+        <p:cNvPr id="1" name=""/>
+        <p:cNvGrpSpPr/>
+        <p:nvPr/>
+      </p:nvGrpSpPr>
+      <p:grpSpPr>
+        <a:xfrm>
+          <a:off x="0" y="0"/>
+          <a:ext cx="0" cy="0"/>
+          <a:chOff x="0" y="0"/>
+          <a:chExt cx="0" cy="0"/>
+        </a:xfrm>
+      </p:grpSpPr>
+      <p:pic>
+        <p:nvPicPr>
+          <p:cNvPr id="6" name="Imagem 5"/>
+          <p:cNvPicPr>
+            <a:picLocks noChangeAspect="1"/>
+          </p:cNvPicPr>
+          <p:nvPr/>
+        </p:nvPicPr>
+        <p:blipFill rotWithShape="1">
+          <a:blip r:embed="rId2">
+            <a:extLst>
+              <a:ext uri="{28A0092B-C50C-407E-A947-70E740481C1C}">
+                <a14:useLocalDpi xmlns:a14="http://schemas.microsoft.com/office/drawing/2010/main" val="0"/>
+              </a:ext>
+            </a:extLst>
+          </a:blip>
+          <a:srcRect l="75584" t="37944" r="17074" b="49208"/>
+          <a:stretch/>
+        </p:blipFill>
+        <p:spPr>
+          <a:xfrm>
+            <a:off x="6252152" y="4331989"/>
+            <a:ext cx="263867" cy="307846"/>
+          </a:xfrm>
+          <a:prstGeom prst="rect">
+            <a:avLst/>
+          </a:prstGeom>
+        </p:spPr>
+      </p:pic>
+      <p:pic>
+        <p:nvPicPr>
+          <p:cNvPr id="7" name="Imagem 6"/>
+          <p:cNvPicPr>
+            <a:picLocks noChangeAspect="1"/>
+          </p:cNvPicPr>
+          <p:nvPr/>
+        </p:nvPicPr>
+        <p:blipFill rotWithShape="1">
+          <a:blip r:embed="rId3">
+            <a:extLst>
+              <a:ext uri="{28A0092B-C50C-407E-A947-70E740481C1C}">
+                <a14:useLocalDpi xmlns:a14="http://schemas.microsoft.com/office/drawing/2010/main" val="0"/>
+              </a:ext>
+            </a:extLst>
+          </a:blip>
+          <a:srcRect t="87428" r="91543" b="-1"/>
+          <a:stretch/>
+        </p:blipFill>
+        <p:spPr>
+          <a:xfrm>
+            <a:off x="7929518" y="2453860"/>
+            <a:ext cx="363225" cy="360000"/>
+          </a:xfrm>
+          <a:prstGeom prst="rect">
+            <a:avLst/>
+          </a:prstGeom>
+        </p:spPr>
+      </p:pic>
+      <p:pic>
+        <p:nvPicPr>
+          <p:cNvPr id="8" name="Imagem 7"/>
+          <p:cNvPicPr>
+            <a:picLocks noChangeAspect="1"/>
+          </p:cNvPicPr>
+          <p:nvPr/>
+        </p:nvPicPr>
+        <p:blipFill rotWithShape="1">
+          <a:blip r:embed="rId2">
+            <a:extLst>
+              <a:ext uri="{28A0092B-C50C-407E-A947-70E740481C1C}">
+                <a14:useLocalDpi xmlns:a14="http://schemas.microsoft.com/office/drawing/2010/main" val="0"/>
+              </a:ext>
+            </a:extLst>
+          </a:blip>
+          <a:srcRect l="74952" t="24920" r="16651" b="62154"/>
+          <a:stretch/>
+        </p:blipFill>
+        <p:spPr>
+          <a:xfrm>
+            <a:off x="6932308" y="4314068"/>
+            <a:ext cx="344515" cy="353571"/>
+          </a:xfrm>
+          <a:prstGeom prst="rect">
+            <a:avLst/>
+          </a:prstGeom>
+        </p:spPr>
+      </p:pic>
+      <p:pic>
+        <p:nvPicPr>
+          <p:cNvPr id="9" name="Imagem 8"/>
+          <p:cNvPicPr>
+            <a:picLocks noChangeAspect="1"/>
+          </p:cNvPicPr>
+          <p:nvPr/>
+        </p:nvPicPr>
+        <p:blipFill rotWithShape="1">
+          <a:blip r:embed="rId4" cstate="print">
+            <a:extLst>
+              <a:ext uri="{28A0092B-C50C-407E-A947-70E740481C1C}">
+                <a14:useLocalDpi xmlns:a14="http://schemas.microsoft.com/office/drawing/2010/main" val="0"/>
+              </a:ext>
+            </a:extLst>
+          </a:blip>
+          <a:srcRect l="84740" r="9755" b="86363"/>
+          <a:stretch/>
+        </p:blipFill>
+        <p:spPr>
+          <a:xfrm>
+            <a:off x="5184019" y="2809975"/>
+            <a:ext cx="261578" cy="432000"/>
+          </a:xfrm>
+          <a:prstGeom prst="rect">
+            <a:avLst/>
+          </a:prstGeom>
+        </p:spPr>
+      </p:pic>
+      <p:pic>
+        <p:nvPicPr>
+          <p:cNvPr id="10" name="Imagem 9"/>
+          <p:cNvPicPr>
+            <a:picLocks noChangeAspect="1"/>
+          </p:cNvPicPr>
+          <p:nvPr/>
+        </p:nvPicPr>
+        <p:blipFill rotWithShape="1">
+          <a:blip r:embed="rId5">
+            <a:extLst>
+              <a:ext uri="{28A0092B-C50C-407E-A947-70E740481C1C}">
+                <a14:useLocalDpi xmlns:a14="http://schemas.microsoft.com/office/drawing/2010/main" val="0"/>
+              </a:ext>
+            </a:extLst>
+          </a:blip>
+          <a:srcRect l="34024" t="1" r="50240" b="79579"/>
+          <a:stretch/>
+        </p:blipFill>
+        <p:spPr>
+          <a:xfrm>
+            <a:off x="4462914" y="2539719"/>
+            <a:ext cx="554823" cy="720000"/>
+          </a:xfrm>
+          <a:prstGeom prst="rect">
+            <a:avLst/>
+          </a:prstGeom>
+        </p:spPr>
+      </p:pic>
+      <p:pic>
+        <p:nvPicPr>
+          <p:cNvPr id="11" name="Imagem 10"/>
+          <p:cNvPicPr>
+            <a:picLocks noChangeAspect="1"/>
+          </p:cNvPicPr>
+          <p:nvPr/>
+        </p:nvPicPr>
+        <p:blipFill rotWithShape="1">
+          <a:blip r:embed="rId5">
+            <a:extLst>
+              <a:ext uri="{28A0092B-C50C-407E-A947-70E740481C1C}">
+                <a14:useLocalDpi xmlns:a14="http://schemas.microsoft.com/office/drawing/2010/main" val="0"/>
+              </a:ext>
+            </a:extLst>
+          </a:blip>
+          <a:srcRect l="49880" t="241" r="33062" b="79098"/>
+          <a:stretch/>
+        </p:blipFill>
+        <p:spPr>
+          <a:xfrm>
+            <a:off x="6149598" y="1947196"/>
+            <a:ext cx="891628" cy="1080000"/>
+          </a:xfrm>
+          <a:prstGeom prst="rect">
+            <a:avLst/>
+          </a:prstGeom>
+        </p:spPr>
+      </p:pic>
+      <p:pic>
+        <p:nvPicPr>
+          <p:cNvPr id="12" name="Imagem 11"/>
+          <p:cNvPicPr>
+            <a:picLocks noChangeAspect="1"/>
+          </p:cNvPicPr>
+          <p:nvPr/>
+        </p:nvPicPr>
+        <p:blipFill rotWithShape="1">
+          <a:blip r:embed="rId5">
+            <a:extLst>
+              <a:ext uri="{28A0092B-C50C-407E-A947-70E740481C1C}">
+                <a14:useLocalDpi xmlns:a14="http://schemas.microsoft.com/office/drawing/2010/main" val="0"/>
+              </a:ext>
+            </a:extLst>
+          </a:blip>
+          <a:srcRect l="34024" t="1" r="50240" b="79579"/>
+          <a:stretch/>
+        </p:blipFill>
+        <p:spPr>
+          <a:xfrm>
+            <a:off x="4677424" y="4107991"/>
+            <a:ext cx="554823" cy="720000"/>
+          </a:xfrm>
+          <a:prstGeom prst="rect">
+            <a:avLst/>
+          </a:prstGeom>
+        </p:spPr>
+      </p:pic>
+      <p:grpSp>
+        <p:nvGrpSpPr>
+          <p:cNvPr id="30" name="Grupo 29"/>
+          <p:cNvGrpSpPr/>
+          <p:nvPr/>
+        </p:nvGrpSpPr>
+        <p:grpSpPr>
+          <a:xfrm>
+            <a:off x="7360343" y="2939450"/>
+            <a:ext cx="846586" cy="1030978"/>
+            <a:chOff x="7360343" y="2939450"/>
+            <a:chExt cx="846586" cy="1030978"/>
+          </a:xfrm>
+        </p:grpSpPr>
+        <p:pic>
+          <p:nvPicPr>
+            <p:cNvPr id="13" name="Imagem 12"/>
+            <p:cNvPicPr>
+              <a:picLocks noChangeAspect="1"/>
+            </p:cNvPicPr>
+            <p:nvPr/>
+          </p:nvPicPr>
+          <p:blipFill rotWithShape="1">
+            <a:blip r:embed="rId5">
+              <a:extLst>
+                <a:ext uri="{28A0092B-C50C-407E-A947-70E740481C1C}">
+                  <a14:useLocalDpi xmlns:a14="http://schemas.microsoft.com/office/drawing/2010/main" val="0"/>
+                </a:ext>
+              </a:extLst>
+            </a:blip>
+            <a:srcRect l="34024" t="1" r="50240" b="79579"/>
+            <a:stretch/>
+          </p:blipFill>
+          <p:spPr>
+            <a:xfrm>
+              <a:off x="7652106" y="2939450"/>
+              <a:ext cx="554823" cy="720000"/>
+            </a:xfrm>
+            <a:prstGeom prst="rect">
+              <a:avLst/>
+            </a:prstGeom>
+          </p:spPr>
+        </p:pic>
+        <p:pic>
+          <p:nvPicPr>
+            <p:cNvPr id="14" name="Imagem 13"/>
+            <p:cNvPicPr>
+              <a:picLocks noChangeAspect="1"/>
+            </p:cNvPicPr>
+            <p:nvPr/>
+          </p:nvPicPr>
+          <p:blipFill rotWithShape="1">
+            <a:blip r:embed="rId5">
+              <a:extLst>
+                <a:ext uri="{28A0092B-C50C-407E-A947-70E740481C1C}">
+                  <a14:useLocalDpi xmlns:a14="http://schemas.microsoft.com/office/drawing/2010/main" val="0"/>
+                </a:ext>
+              </a:extLst>
+            </a:blip>
+            <a:srcRect l="34024" t="1" r="50240" b="79579"/>
+            <a:stretch/>
+          </p:blipFill>
+          <p:spPr>
+            <a:xfrm>
+              <a:off x="7360343" y="3027196"/>
+              <a:ext cx="554823" cy="720000"/>
+            </a:xfrm>
+            <a:prstGeom prst="rect">
+              <a:avLst/>
+            </a:prstGeom>
+          </p:spPr>
+        </p:pic>
+        <p:pic>
+          <p:nvPicPr>
+            <p:cNvPr id="15" name="Imagem 14"/>
+            <p:cNvPicPr>
+              <a:picLocks noChangeAspect="1"/>
+            </p:cNvPicPr>
+            <p:nvPr/>
+          </p:nvPicPr>
+          <p:blipFill rotWithShape="1">
+            <a:blip r:embed="rId5">
+              <a:extLst>
+                <a:ext uri="{28A0092B-C50C-407E-A947-70E740481C1C}">
+                  <a14:useLocalDpi xmlns:a14="http://schemas.microsoft.com/office/drawing/2010/main" val="0"/>
+                </a:ext>
+              </a:extLst>
+            </a:blip>
+            <a:srcRect l="34024" t="1" r="50240" b="79579"/>
+            <a:stretch/>
+          </p:blipFill>
+          <p:spPr>
+            <a:xfrm>
+              <a:off x="7598859" y="3250428"/>
+              <a:ext cx="554823" cy="720000"/>
+            </a:xfrm>
+            <a:prstGeom prst="rect">
+              <a:avLst/>
+            </a:prstGeom>
+          </p:spPr>
+        </p:pic>
+      </p:grpSp>
+      <p:grpSp>
+        <p:nvGrpSpPr>
+          <p:cNvPr id="31" name="Grupo 30"/>
+          <p:cNvGrpSpPr/>
+          <p:nvPr/>
+        </p:nvGrpSpPr>
+        <p:grpSpPr>
+          <a:xfrm>
+            <a:off x="5441011" y="3164759"/>
+            <a:ext cx="791279" cy="902268"/>
+            <a:chOff x="5441011" y="3164759"/>
+            <a:chExt cx="791279" cy="902268"/>
+          </a:xfrm>
+        </p:grpSpPr>
+        <p:pic>
+          <p:nvPicPr>
+            <p:cNvPr id="16" name="Imagem 15"/>
+            <p:cNvPicPr>
+              <a:picLocks noChangeAspect="1"/>
+            </p:cNvPicPr>
+            <p:nvPr/>
+          </p:nvPicPr>
+          <p:blipFill rotWithShape="1">
+            <a:blip r:embed="rId5">
+              <a:extLst>
+                <a:ext uri="{28A0092B-C50C-407E-A947-70E740481C1C}">
+                  <a14:useLocalDpi xmlns:a14="http://schemas.microsoft.com/office/drawing/2010/main" val="0"/>
+                </a:ext>
+              </a:extLst>
+            </a:blip>
+            <a:srcRect l="34024" t="1" r="50240" b="79579"/>
+            <a:stretch/>
+          </p:blipFill>
+          <p:spPr>
+            <a:xfrm>
+              <a:off x="5441011" y="3164759"/>
+              <a:ext cx="554823" cy="720000"/>
+            </a:xfrm>
+            <a:prstGeom prst="rect">
+              <a:avLst/>
+            </a:prstGeom>
+          </p:spPr>
+        </p:pic>
+        <p:pic>
+          <p:nvPicPr>
+            <p:cNvPr id="17" name="Imagem 16"/>
+            <p:cNvPicPr>
+              <a:picLocks noChangeAspect="1"/>
+            </p:cNvPicPr>
+            <p:nvPr/>
+          </p:nvPicPr>
+          <p:blipFill rotWithShape="1">
+            <a:blip r:embed="rId5">
+              <a:extLst>
+                <a:ext uri="{28A0092B-C50C-407E-A947-70E740481C1C}">
+                  <a14:useLocalDpi xmlns:a14="http://schemas.microsoft.com/office/drawing/2010/main" val="0"/>
+                </a:ext>
+              </a:extLst>
+            </a:blip>
+            <a:srcRect l="34024" t="1" r="50240" b="79579"/>
+            <a:stretch/>
+          </p:blipFill>
+          <p:spPr>
+            <a:xfrm>
+              <a:off x="5677467" y="3347027"/>
+              <a:ext cx="554823" cy="720000"/>
+            </a:xfrm>
+            <a:prstGeom prst="rect">
+              <a:avLst/>
+            </a:prstGeom>
+          </p:spPr>
+        </p:pic>
+      </p:grpSp>
+      <p:pic>
+        <p:nvPicPr>
+          <p:cNvPr id="18" name="Imagem 17"/>
+          <p:cNvPicPr>
+            <a:picLocks noChangeAspect="1"/>
+          </p:cNvPicPr>
+          <p:nvPr/>
+        </p:nvPicPr>
+        <p:blipFill rotWithShape="1">
+          <a:blip r:embed="rId5">
+            <a:extLst>
+              <a:ext uri="{28A0092B-C50C-407E-A947-70E740481C1C}">
+                <a14:useLocalDpi xmlns:a14="http://schemas.microsoft.com/office/drawing/2010/main" val="0"/>
+              </a:ext>
+            </a:extLst>
+          </a:blip>
+          <a:srcRect l="34024" t="1" r="50240" b="79579"/>
+          <a:stretch/>
+        </p:blipFill>
+        <p:spPr>
+          <a:xfrm>
+            <a:off x="4615314" y="2692119"/>
+            <a:ext cx="554823" cy="720000"/>
+          </a:xfrm>
+          <a:prstGeom prst="rect">
+            <a:avLst/>
+          </a:prstGeom>
+        </p:spPr>
+      </p:pic>
+      <p:pic>
+        <p:nvPicPr>
+          <p:cNvPr id="19" name="Imagem 18"/>
+          <p:cNvPicPr>
+            <a:picLocks noChangeAspect="1"/>
+          </p:cNvPicPr>
+          <p:nvPr/>
+        </p:nvPicPr>
+        <p:blipFill rotWithShape="1">
+          <a:blip r:embed="rId5">
+            <a:extLst>
+              <a:ext uri="{28A0092B-C50C-407E-A947-70E740481C1C}">
+                <a14:useLocalDpi xmlns:a14="http://schemas.microsoft.com/office/drawing/2010/main" val="0"/>
+              </a:ext>
+            </a:extLst>
+          </a:blip>
+          <a:srcRect l="34024" t="1" r="50240" b="79579"/>
+          <a:stretch/>
+        </p:blipFill>
+        <p:spPr>
+          <a:xfrm>
+            <a:off x="7543755" y="4592263"/>
+            <a:ext cx="554823" cy="720000"/>
+          </a:xfrm>
+          <a:prstGeom prst="rect">
+            <a:avLst/>
+          </a:prstGeom>
+        </p:spPr>
+      </p:pic>
+      <p:pic>
+        <p:nvPicPr>
+          <p:cNvPr id="20" name="Imagem 19"/>
+          <p:cNvPicPr>
+            <a:picLocks noChangeAspect="1"/>
+          </p:cNvPicPr>
+          <p:nvPr/>
+        </p:nvPicPr>
+        <p:blipFill rotWithShape="1">
+          <a:blip r:embed="rId5">
+            <a:extLst>
+              <a:ext uri="{28A0092B-C50C-407E-A947-70E740481C1C}">
+                <a14:useLocalDpi xmlns:a14="http://schemas.microsoft.com/office/drawing/2010/main" val="0"/>
+              </a:ext>
+            </a:extLst>
+          </a:blip>
+          <a:srcRect l="34024" t="1" r="50240" b="79579"/>
+          <a:stretch/>
+        </p:blipFill>
+        <p:spPr>
+          <a:xfrm>
+            <a:off x="7323234" y="4680009"/>
+            <a:ext cx="554823" cy="720000"/>
+          </a:xfrm>
+          <a:prstGeom prst="rect">
+            <a:avLst/>
+          </a:prstGeom>
+        </p:spPr>
+      </p:pic>
+      <p:pic>
+        <p:nvPicPr>
+          <p:cNvPr id="21" name="Imagem 20"/>
+          <p:cNvPicPr>
+            <a:picLocks noChangeAspect="1"/>
+          </p:cNvPicPr>
+          <p:nvPr/>
+        </p:nvPicPr>
+        <p:blipFill rotWithShape="1">
+          <a:blip r:embed="rId6">
+            <a:extLst>
+              <a:ext uri="{28A0092B-C50C-407E-A947-70E740481C1C}">
+                <a14:useLocalDpi xmlns:a14="http://schemas.microsoft.com/office/drawing/2010/main" val="0"/>
+              </a:ext>
+            </a:extLst>
+          </a:blip>
+          <a:srcRect l="43556" t="14889" r="50123" b="78465"/>
+          <a:stretch/>
+        </p:blipFill>
+        <p:spPr>
+          <a:xfrm>
+            <a:off x="8938324" y="903826"/>
+            <a:ext cx="433525" cy="455780"/>
+          </a:xfrm>
+          <a:prstGeom prst="rect">
+            <a:avLst/>
+          </a:prstGeom>
+        </p:spPr>
+      </p:pic>
+      <p:pic>
+        <p:nvPicPr>
+          <p:cNvPr id="22" name="Imagem 21"/>
+          <p:cNvPicPr>
+            <a:picLocks noChangeAspect="1"/>
+          </p:cNvPicPr>
+          <p:nvPr/>
+        </p:nvPicPr>
+        <p:blipFill rotWithShape="1">
+          <a:blip r:embed="rId6">
+            <a:extLst>
+              <a:ext uri="{28A0092B-C50C-407E-A947-70E740481C1C}">
+                <a14:useLocalDpi xmlns:a14="http://schemas.microsoft.com/office/drawing/2010/main" val="0"/>
+              </a:ext>
+            </a:extLst>
+          </a:blip>
+          <a:srcRect l="43556" t="14889" r="50123" b="78465"/>
+          <a:stretch/>
+        </p:blipFill>
+        <p:spPr>
+          <a:xfrm>
+            <a:off x="7514565" y="810656"/>
+            <a:ext cx="433525" cy="455780"/>
+          </a:xfrm>
+          <a:prstGeom prst="rect">
+            <a:avLst/>
+          </a:prstGeom>
+        </p:spPr>
+      </p:pic>
+      <p:pic>
+        <p:nvPicPr>
+          <p:cNvPr id="23" name="Imagem 22"/>
+          <p:cNvPicPr>
+            <a:picLocks noChangeAspect="1"/>
+          </p:cNvPicPr>
+          <p:nvPr/>
+        </p:nvPicPr>
+        <p:blipFill rotWithShape="1">
+          <a:blip r:embed="rId6">
+            <a:extLst>
+              <a:ext uri="{28A0092B-C50C-407E-A947-70E740481C1C}">
+                <a14:useLocalDpi xmlns:a14="http://schemas.microsoft.com/office/drawing/2010/main" val="0"/>
+              </a:ext>
+            </a:extLst>
+          </a:blip>
+          <a:srcRect l="43556" t="14889" r="50123" b="78465"/>
+          <a:stretch/>
+        </p:blipFill>
+        <p:spPr>
+          <a:xfrm>
+            <a:off x="8206929" y="1049235"/>
+            <a:ext cx="433525" cy="455780"/>
+          </a:xfrm>
+          <a:prstGeom prst="rect">
+            <a:avLst/>
+          </a:prstGeom>
+        </p:spPr>
+      </p:pic>
+      <p:pic>
+        <p:nvPicPr>
+          <p:cNvPr id="24" name="Imagem 23"/>
+          <p:cNvPicPr>
+            <a:picLocks noChangeAspect="1"/>
+          </p:cNvPicPr>
+          <p:nvPr/>
+        </p:nvPicPr>
+        <p:blipFill rotWithShape="1">
+          <a:blip r:embed="rId6">
+            <a:extLst>
+              <a:ext uri="{28A0092B-C50C-407E-A947-70E740481C1C}">
+                <a14:useLocalDpi xmlns:a14="http://schemas.microsoft.com/office/drawing/2010/main" val="0"/>
+              </a:ext>
+            </a:extLst>
+          </a:blip>
+          <a:srcRect l="43556" t="14889" r="50123" b="78465"/>
+          <a:stretch/>
+        </p:blipFill>
+        <p:spPr>
+          <a:xfrm>
+            <a:off x="8911372" y="1649743"/>
+            <a:ext cx="433525" cy="455780"/>
+          </a:xfrm>
+          <a:prstGeom prst="rect">
+            <a:avLst/>
+          </a:prstGeom>
+        </p:spPr>
+      </p:pic>
+      <p:pic>
+        <p:nvPicPr>
+          <p:cNvPr id="25" name="Imagem 24"/>
+          <p:cNvPicPr>
+            <a:picLocks noChangeAspect="1"/>
+          </p:cNvPicPr>
+          <p:nvPr/>
+        </p:nvPicPr>
+        <p:blipFill rotWithShape="1">
+          <a:blip r:embed="rId6">
+            <a:extLst>
+              <a:ext uri="{28A0092B-C50C-407E-A947-70E740481C1C}">
+                <a14:useLocalDpi xmlns:a14="http://schemas.microsoft.com/office/drawing/2010/main" val="0"/>
+              </a:ext>
+            </a:extLst>
+          </a:blip>
+          <a:srcRect l="43556" t="14889" r="50123" b="78465"/>
+          <a:stretch/>
+        </p:blipFill>
+        <p:spPr>
+          <a:xfrm>
+            <a:off x="9155086" y="1235638"/>
+            <a:ext cx="433525" cy="455780"/>
+          </a:xfrm>
+          <a:prstGeom prst="rect">
+            <a:avLst/>
+          </a:prstGeom>
+        </p:spPr>
+      </p:pic>
+      <p:pic>
+        <p:nvPicPr>
+          <p:cNvPr id="26" name="Imagem 25"/>
+          <p:cNvPicPr>
+            <a:picLocks noChangeAspect="1"/>
+          </p:cNvPicPr>
+          <p:nvPr/>
+        </p:nvPicPr>
+        <p:blipFill rotWithShape="1">
+          <a:blip r:embed="rId7">
+            <a:extLst>
+              <a:ext uri="{28A0092B-C50C-407E-A947-70E740481C1C}">
+                <a14:useLocalDpi xmlns:a14="http://schemas.microsoft.com/office/drawing/2010/main" val="0"/>
+              </a:ext>
+            </a:extLst>
+          </a:blip>
+          <a:srcRect l="33233" t="62653" r="58227" b="24225"/>
+          <a:stretch/>
+        </p:blipFill>
+        <p:spPr>
+          <a:xfrm>
+            <a:off x="4498196" y="3653680"/>
+            <a:ext cx="351429" cy="360000"/>
+          </a:xfrm>
+          <a:prstGeom prst="rect">
+            <a:avLst/>
+          </a:prstGeom>
+        </p:spPr>
+      </p:pic>
+      <p:pic>
+        <p:nvPicPr>
+          <p:cNvPr id="28" name="Imagem 27"/>
+          <p:cNvPicPr>
+            <a:picLocks noChangeAspect="1"/>
+          </p:cNvPicPr>
+          <p:nvPr/>
+        </p:nvPicPr>
+        <p:blipFill>
+          <a:blip r:embed="rId8">
+            <a:extLst>
+              <a:ext uri="{28A0092B-C50C-407E-A947-70E740481C1C}">
+                <a14:useLocalDpi xmlns:a14="http://schemas.microsoft.com/office/drawing/2010/main" val="0"/>
+              </a:ext>
+            </a:extLst>
+          </a:blip>
+          <a:stretch>
+            <a:fillRect/>
+          </a:stretch>
+        </p:blipFill>
+        <p:spPr>
+          <a:xfrm>
+            <a:off x="-2532576" y="-376881"/>
+            <a:ext cx="6858000" cy="6858000"/>
+          </a:xfrm>
+          <a:prstGeom prst="rect">
+            <a:avLst/>
+          </a:prstGeom>
+        </p:spPr>
+      </p:pic>
+      <p:pic>
+        <p:nvPicPr>
+          <p:cNvPr id="33" name="Imagem 32"/>
+          <p:cNvPicPr>
+            <a:picLocks noChangeAspect="1"/>
+          </p:cNvPicPr>
+          <p:nvPr/>
+        </p:nvPicPr>
+        <p:blipFill rotWithShape="1">
+          <a:blip r:embed="rId9">
+            <a:extLst>
+              <a:ext uri="{28A0092B-C50C-407E-A947-70E740481C1C}">
+                <a14:useLocalDpi xmlns:a14="http://schemas.microsoft.com/office/drawing/2010/main" val="0"/>
+              </a:ext>
+            </a:extLst>
+          </a:blip>
+          <a:srcRect t="77598" r="91260" b="11095"/>
+          <a:stretch/>
+        </p:blipFill>
+        <p:spPr>
+          <a:xfrm>
+            <a:off x="5372339" y="5057415"/>
+            <a:ext cx="639463" cy="551543"/>
+          </a:xfrm>
+          <a:prstGeom prst="rect">
+            <a:avLst/>
+          </a:prstGeom>
+        </p:spPr>
+      </p:pic>
+      <p:pic>
+        <p:nvPicPr>
+          <p:cNvPr id="34" name="Imagem 33"/>
+          <p:cNvPicPr>
+            <a:picLocks noChangeAspect="1"/>
+          </p:cNvPicPr>
+          <p:nvPr/>
+        </p:nvPicPr>
+        <p:blipFill rotWithShape="1">
+          <a:blip r:embed="rId10">
+            <a:extLst>
+              <a:ext uri="{28A0092B-C50C-407E-A947-70E740481C1C}">
+                <a14:useLocalDpi xmlns:a14="http://schemas.microsoft.com/office/drawing/2010/main" val="0"/>
+              </a:ext>
+            </a:extLst>
+          </a:blip>
+          <a:srcRect t="61828" r="91062" b="25377"/>
+          <a:stretch/>
+        </p:blipFill>
+        <p:spPr>
+          <a:xfrm>
+            <a:off x="2437566" y="4005943"/>
+            <a:ext cx="653977" cy="624114"/>
+          </a:xfrm>
+          <a:prstGeom prst="rect">
+            <a:avLst/>
+          </a:prstGeom>
+        </p:spPr>
+      </p:pic>
+      <p:pic>
+        <p:nvPicPr>
+          <p:cNvPr id="35" name="Imagem 34"/>
+          <p:cNvPicPr>
+            <a:picLocks noChangeAspect="1"/>
+          </p:cNvPicPr>
+          <p:nvPr/>
+        </p:nvPicPr>
+        <p:blipFill rotWithShape="1">
+          <a:blip r:embed="rId11">
+            <a:extLst>
+              <a:ext uri="{28A0092B-C50C-407E-A947-70E740481C1C}">
+                <a14:useLocalDpi xmlns:a14="http://schemas.microsoft.com/office/drawing/2010/main" val="0"/>
+              </a:ext>
+            </a:extLst>
+          </a:blip>
+          <a:srcRect r="90373" b="85645"/>
+          <a:stretch/>
+        </p:blipFill>
+        <p:spPr>
+          <a:xfrm>
+            <a:off x="2393143" y="960428"/>
+            <a:ext cx="712914" cy="708715"/>
+          </a:xfrm>
+          <a:prstGeom prst="rect">
+            <a:avLst/>
+          </a:prstGeom>
+        </p:spPr>
+      </p:pic>
+    </p:spTree>
+    <p:extLst>
+      <p:ext uri="{BB962C8B-B14F-4D97-AF65-F5344CB8AC3E}">
+        <p14:creationId xmlns:p14="http://schemas.microsoft.com/office/powerpoint/2010/main" val="1887840893"/>
       </p:ext>
     </p:extLst>
   </p:cSld>

</xml_diff>

<commit_message>
Finalizando movimento do player com scroll de tela estilo RPG
</commit_message>
<xml_diff>
--- a/Modelagem do Game.pptx
+++ b/Modelagem do Game.pptx
@@ -9,6 +9,7 @@
     <p:sldId id="257" r:id="rId3"/>
     <p:sldId id="258" r:id="rId4"/>
     <p:sldId id="259" r:id="rId5"/>
+    <p:sldId id="260" r:id="rId6"/>
   </p:sldIdLst>
   <p:sldSz cx="12192000" cy="6858000"/>
   <p:notesSz cx="6858000" cy="9144000"/>
@@ -7503,6 +7504,66 @@
 </p:sld>
 </file>
 
+<file path=ppt/slides/slide5.xml><?xml version="1.0" encoding="utf-8"?>
+<p:sld xmlns:a="http://schemas.openxmlformats.org/drawingml/2006/main" xmlns:r="http://schemas.openxmlformats.org/officeDocument/2006/relationships" xmlns:p="http://schemas.openxmlformats.org/presentationml/2006/main">
+  <p:cSld>
+    <p:spTree>
+      <p:nvGrpSpPr>
+        <p:cNvPr id="1" name=""/>
+        <p:cNvGrpSpPr/>
+        <p:nvPr/>
+      </p:nvGrpSpPr>
+      <p:grpSpPr>
+        <a:xfrm>
+          <a:off x="0" y="0"/>
+          <a:ext cx="0" cy="0"/>
+          <a:chOff x="0" y="0"/>
+          <a:chExt cx="0" cy="0"/>
+        </a:xfrm>
+      </p:grpSpPr>
+      <p:pic>
+        <p:nvPicPr>
+          <p:cNvPr id="4" name="Imagem 3"/>
+          <p:cNvPicPr>
+            <a:picLocks noChangeAspect="1"/>
+          </p:cNvPicPr>
+          <p:nvPr/>
+        </p:nvPicPr>
+        <p:blipFill>
+          <a:blip r:embed="rId2">
+            <a:extLst>
+              <a:ext uri="{28A0092B-C50C-407E-A947-70E740481C1C}">
+                <a14:useLocalDpi xmlns:a14="http://schemas.microsoft.com/office/drawing/2010/main" val="0"/>
+              </a:ext>
+            </a:extLst>
+          </a:blip>
+          <a:stretch>
+            <a:fillRect/>
+          </a:stretch>
+        </p:blipFill>
+        <p:spPr>
+          <a:xfrm>
+            <a:off x="-9847776" y="-14187057"/>
+            <a:ext cx="34422276" cy="34422276"/>
+          </a:xfrm>
+          <a:prstGeom prst="rect">
+            <a:avLst/>
+          </a:prstGeom>
+        </p:spPr>
+      </p:pic>
+    </p:spTree>
+    <p:extLst>
+      <p:ext uri="{BB962C8B-B14F-4D97-AF65-F5344CB8AC3E}">
+        <p14:creationId xmlns:p14="http://schemas.microsoft.com/office/powerpoint/2010/main" val="525463952"/>
+      </p:ext>
+    </p:extLst>
+  </p:cSld>
+  <p:clrMapOvr>
+    <a:masterClrMapping/>
+  </p:clrMapOvr>
+</p:sld>
+</file>
+
 <file path=ppt/theme/theme1.xml><?xml version="1.0" encoding="utf-8"?>
 <a:theme xmlns:a="http://schemas.openxmlformats.org/drawingml/2006/main" name="Tema do Office">
   <a:themeElements>

</xml_diff>

<commit_message>
Finalizando ajustes nos controles com incremento da velocidade
</commit_message>
<xml_diff>
--- a/Modelagem do Game.pptx
+++ b/Modelagem do Game.pptx
@@ -7543,14 +7543,884 @@
         </p:blipFill>
         <p:spPr>
           <a:xfrm>
-            <a:off x="-9847776" y="-14187057"/>
-            <a:ext cx="34422276" cy="34422276"/>
+            <a:off x="-51452976" y="-28634577"/>
+            <a:ext cx="18000000" cy="18000000"/>
           </a:xfrm>
           <a:prstGeom prst="rect">
             <a:avLst/>
           </a:prstGeom>
         </p:spPr>
       </p:pic>
+      <p:grpSp>
+        <p:nvGrpSpPr>
+          <p:cNvPr id="2" name="Grupo 1"/>
+          <p:cNvGrpSpPr/>
+          <p:nvPr/>
+        </p:nvGrpSpPr>
+        <p:grpSpPr>
+          <a:xfrm>
+            <a:off x="-10133834" y="-7329606"/>
+            <a:ext cx="32255525" cy="21517212"/>
+            <a:chOff x="-10133834" y="-7329606"/>
+            <a:chExt cx="32255525" cy="21517212"/>
+          </a:xfrm>
+        </p:grpSpPr>
+        <p:grpSp>
+          <p:nvGrpSpPr>
+            <p:cNvPr id="3" name="Grupo 2"/>
+            <p:cNvGrpSpPr/>
+            <p:nvPr/>
+          </p:nvGrpSpPr>
+          <p:grpSpPr>
+            <a:xfrm>
+              <a:off x="614680" y="-7319645"/>
+              <a:ext cx="10779761" cy="21497290"/>
+              <a:chOff x="0" y="0"/>
+              <a:chExt cx="10779761" cy="21497688"/>
+            </a:xfrm>
+          </p:grpSpPr>
+          <p:grpSp>
+            <p:nvGrpSpPr>
+              <p:cNvPr id="5" name="Grupo 4"/>
+              <p:cNvGrpSpPr/>
+              <p:nvPr/>
+            </p:nvGrpSpPr>
+            <p:grpSpPr>
+              <a:xfrm>
+                <a:off x="0" y="0"/>
+                <a:ext cx="10779761" cy="10758805"/>
+                <a:chOff x="0" y="0"/>
+                <a:chExt cx="10780114" cy="10758849"/>
+              </a:xfrm>
+            </p:grpSpPr>
+            <p:pic>
+              <p:nvPicPr>
+                <p:cNvPr id="11" name="Imagem 10"/>
+                <p:cNvPicPr>
+                  <a:picLocks noChangeAspect="1"/>
+                </p:cNvPicPr>
+                <p:nvPr/>
+              </p:nvPicPr>
+              <p:blipFill>
+                <a:blip r:embed="rId2" cstate="print">
+                  <a:extLst>
+                    <a:ext uri="{28A0092B-C50C-407E-A947-70E740481C1C}">
+                      <a14:useLocalDpi xmlns:a14="http://schemas.microsoft.com/office/drawing/2010/main" val="0"/>
+                    </a:ext>
+                  </a:extLst>
+                </a:blip>
+                <a:stretch>
+                  <a:fillRect/>
+                </a:stretch>
+              </p:blipFill>
+              <p:spPr>
+                <a:xfrm>
+                  <a:off x="0" y="0"/>
+                  <a:ext cx="5400040" cy="5400040"/>
+                </a:xfrm>
+                <a:prstGeom prst="rect">
+                  <a:avLst/>
+                </a:prstGeom>
+              </p:spPr>
+            </p:pic>
+            <p:pic>
+              <p:nvPicPr>
+                <p:cNvPr id="12" name="Imagem 11"/>
+                <p:cNvPicPr>
+                  <a:picLocks noChangeAspect="1"/>
+                </p:cNvPicPr>
+                <p:nvPr/>
+              </p:nvPicPr>
+              <p:blipFill>
+                <a:blip r:embed="rId2" cstate="print">
+                  <a:extLst>
+                    <a:ext uri="{28A0092B-C50C-407E-A947-70E740481C1C}">
+                      <a14:useLocalDpi xmlns:a14="http://schemas.microsoft.com/office/drawing/2010/main" val="0"/>
+                    </a:ext>
+                  </a:extLst>
+                </a:blip>
+                <a:stretch>
+                  <a:fillRect/>
+                </a:stretch>
+              </p:blipFill>
+              <p:spPr>
+                <a:xfrm>
+                  <a:off x="0" y="5358809"/>
+                  <a:ext cx="5400040" cy="5400040"/>
+                </a:xfrm>
+                <a:prstGeom prst="rect">
+                  <a:avLst/>
+                </a:prstGeom>
+              </p:spPr>
+            </p:pic>
+            <p:pic>
+              <p:nvPicPr>
+                <p:cNvPr id="13" name="Imagem 12"/>
+                <p:cNvPicPr>
+                  <a:picLocks noChangeAspect="1"/>
+                </p:cNvPicPr>
+                <p:nvPr/>
+              </p:nvPicPr>
+              <p:blipFill>
+                <a:blip r:embed="rId2" cstate="print">
+                  <a:extLst>
+                    <a:ext uri="{28A0092B-C50C-407E-A947-70E740481C1C}">
+                      <a14:useLocalDpi xmlns:a14="http://schemas.microsoft.com/office/drawing/2010/main" val="0"/>
+                    </a:ext>
+                  </a:extLst>
+                </a:blip>
+                <a:stretch>
+                  <a:fillRect/>
+                </a:stretch>
+              </p:blipFill>
+              <p:spPr>
+                <a:xfrm>
+                  <a:off x="5380074" y="0"/>
+                  <a:ext cx="5400040" cy="5400040"/>
+                </a:xfrm>
+                <a:prstGeom prst="rect">
+                  <a:avLst/>
+                </a:prstGeom>
+              </p:spPr>
+            </p:pic>
+            <p:pic>
+              <p:nvPicPr>
+                <p:cNvPr id="14" name="Imagem 13"/>
+                <p:cNvPicPr>
+                  <a:picLocks noChangeAspect="1"/>
+                </p:cNvPicPr>
+                <p:nvPr/>
+              </p:nvPicPr>
+              <p:blipFill>
+                <a:blip r:embed="rId2" cstate="print">
+                  <a:extLst>
+                    <a:ext uri="{28A0092B-C50C-407E-A947-70E740481C1C}">
+                      <a14:useLocalDpi xmlns:a14="http://schemas.microsoft.com/office/drawing/2010/main" val="0"/>
+                    </a:ext>
+                  </a:extLst>
+                </a:blip>
+                <a:stretch>
+                  <a:fillRect/>
+                </a:stretch>
+              </p:blipFill>
+              <p:spPr>
+                <a:xfrm>
+                  <a:off x="5358809" y="5358809"/>
+                  <a:ext cx="5400040" cy="5400040"/>
+                </a:xfrm>
+                <a:prstGeom prst="rect">
+                  <a:avLst/>
+                </a:prstGeom>
+              </p:spPr>
+            </p:pic>
+          </p:grpSp>
+          <p:grpSp>
+            <p:nvGrpSpPr>
+              <p:cNvPr id="6" name="Grupo 5"/>
+              <p:cNvGrpSpPr/>
+              <p:nvPr/>
+            </p:nvGrpSpPr>
+            <p:grpSpPr>
+              <a:xfrm>
+                <a:off x="0" y="10738883"/>
+                <a:ext cx="10779761" cy="10758805"/>
+                <a:chOff x="0" y="0"/>
+                <a:chExt cx="10780114" cy="10758849"/>
+              </a:xfrm>
+            </p:grpSpPr>
+            <p:pic>
+              <p:nvPicPr>
+                <p:cNvPr id="7" name="Imagem 6"/>
+                <p:cNvPicPr>
+                  <a:picLocks noChangeAspect="1"/>
+                </p:cNvPicPr>
+                <p:nvPr/>
+              </p:nvPicPr>
+              <p:blipFill>
+                <a:blip r:embed="rId2" cstate="print">
+                  <a:extLst>
+                    <a:ext uri="{28A0092B-C50C-407E-A947-70E740481C1C}">
+                      <a14:useLocalDpi xmlns:a14="http://schemas.microsoft.com/office/drawing/2010/main" val="0"/>
+                    </a:ext>
+                  </a:extLst>
+                </a:blip>
+                <a:stretch>
+                  <a:fillRect/>
+                </a:stretch>
+              </p:blipFill>
+              <p:spPr>
+                <a:xfrm>
+                  <a:off x="0" y="0"/>
+                  <a:ext cx="5400040" cy="5400040"/>
+                </a:xfrm>
+                <a:prstGeom prst="rect">
+                  <a:avLst/>
+                </a:prstGeom>
+              </p:spPr>
+            </p:pic>
+            <p:pic>
+              <p:nvPicPr>
+                <p:cNvPr id="8" name="Imagem 7"/>
+                <p:cNvPicPr>
+                  <a:picLocks noChangeAspect="1"/>
+                </p:cNvPicPr>
+                <p:nvPr/>
+              </p:nvPicPr>
+              <p:blipFill>
+                <a:blip r:embed="rId2" cstate="print">
+                  <a:extLst>
+                    <a:ext uri="{28A0092B-C50C-407E-A947-70E740481C1C}">
+                      <a14:useLocalDpi xmlns:a14="http://schemas.microsoft.com/office/drawing/2010/main" val="0"/>
+                    </a:ext>
+                  </a:extLst>
+                </a:blip>
+                <a:stretch>
+                  <a:fillRect/>
+                </a:stretch>
+              </p:blipFill>
+              <p:spPr>
+                <a:xfrm>
+                  <a:off x="0" y="5358809"/>
+                  <a:ext cx="5400040" cy="5400040"/>
+                </a:xfrm>
+                <a:prstGeom prst="rect">
+                  <a:avLst/>
+                </a:prstGeom>
+              </p:spPr>
+            </p:pic>
+            <p:pic>
+              <p:nvPicPr>
+                <p:cNvPr id="9" name="Imagem 8"/>
+                <p:cNvPicPr>
+                  <a:picLocks noChangeAspect="1"/>
+                </p:cNvPicPr>
+                <p:nvPr/>
+              </p:nvPicPr>
+              <p:blipFill>
+                <a:blip r:embed="rId2" cstate="print">
+                  <a:extLst>
+                    <a:ext uri="{28A0092B-C50C-407E-A947-70E740481C1C}">
+                      <a14:useLocalDpi xmlns:a14="http://schemas.microsoft.com/office/drawing/2010/main" val="0"/>
+                    </a:ext>
+                  </a:extLst>
+                </a:blip>
+                <a:stretch>
+                  <a:fillRect/>
+                </a:stretch>
+              </p:blipFill>
+              <p:spPr>
+                <a:xfrm>
+                  <a:off x="5380074" y="0"/>
+                  <a:ext cx="5400040" cy="5400040"/>
+                </a:xfrm>
+                <a:prstGeom prst="rect">
+                  <a:avLst/>
+                </a:prstGeom>
+              </p:spPr>
+            </p:pic>
+            <p:pic>
+              <p:nvPicPr>
+                <p:cNvPr id="10" name="Imagem 9"/>
+                <p:cNvPicPr>
+                  <a:picLocks noChangeAspect="1"/>
+                </p:cNvPicPr>
+                <p:nvPr/>
+              </p:nvPicPr>
+              <p:blipFill>
+                <a:blip r:embed="rId2" cstate="print">
+                  <a:extLst>
+                    <a:ext uri="{28A0092B-C50C-407E-A947-70E740481C1C}">
+                      <a14:useLocalDpi xmlns:a14="http://schemas.microsoft.com/office/drawing/2010/main" val="0"/>
+                    </a:ext>
+                  </a:extLst>
+                </a:blip>
+                <a:stretch>
+                  <a:fillRect/>
+                </a:stretch>
+              </p:blipFill>
+              <p:spPr>
+                <a:xfrm>
+                  <a:off x="5358809" y="5358809"/>
+                  <a:ext cx="5400040" cy="5400040"/>
+                </a:xfrm>
+                <a:prstGeom prst="rect">
+                  <a:avLst/>
+                </a:prstGeom>
+              </p:spPr>
+            </p:pic>
+          </p:grpSp>
+        </p:grpSp>
+        <p:grpSp>
+          <p:nvGrpSpPr>
+            <p:cNvPr id="15" name="Grupo 14"/>
+            <p:cNvGrpSpPr/>
+            <p:nvPr/>
+          </p:nvGrpSpPr>
+          <p:grpSpPr>
+            <a:xfrm>
+              <a:off x="11341930" y="-7309684"/>
+              <a:ext cx="10779761" cy="21497290"/>
+              <a:chOff x="0" y="0"/>
+              <a:chExt cx="10779761" cy="21497688"/>
+            </a:xfrm>
+          </p:grpSpPr>
+          <p:grpSp>
+            <p:nvGrpSpPr>
+              <p:cNvPr id="16" name="Grupo 15"/>
+              <p:cNvGrpSpPr/>
+              <p:nvPr/>
+            </p:nvGrpSpPr>
+            <p:grpSpPr>
+              <a:xfrm>
+                <a:off x="0" y="0"/>
+                <a:ext cx="10779761" cy="10758805"/>
+                <a:chOff x="0" y="0"/>
+                <a:chExt cx="10780114" cy="10758849"/>
+              </a:xfrm>
+            </p:grpSpPr>
+            <p:pic>
+              <p:nvPicPr>
+                <p:cNvPr id="22" name="Imagem 21"/>
+                <p:cNvPicPr>
+                  <a:picLocks noChangeAspect="1"/>
+                </p:cNvPicPr>
+                <p:nvPr/>
+              </p:nvPicPr>
+              <p:blipFill>
+                <a:blip r:embed="rId2" cstate="print">
+                  <a:extLst>
+                    <a:ext uri="{28A0092B-C50C-407E-A947-70E740481C1C}">
+                      <a14:useLocalDpi xmlns:a14="http://schemas.microsoft.com/office/drawing/2010/main" val="0"/>
+                    </a:ext>
+                  </a:extLst>
+                </a:blip>
+                <a:stretch>
+                  <a:fillRect/>
+                </a:stretch>
+              </p:blipFill>
+              <p:spPr>
+                <a:xfrm>
+                  <a:off x="0" y="0"/>
+                  <a:ext cx="5400040" cy="5400040"/>
+                </a:xfrm>
+                <a:prstGeom prst="rect">
+                  <a:avLst/>
+                </a:prstGeom>
+              </p:spPr>
+            </p:pic>
+            <p:pic>
+              <p:nvPicPr>
+                <p:cNvPr id="23" name="Imagem 22"/>
+                <p:cNvPicPr>
+                  <a:picLocks noChangeAspect="1"/>
+                </p:cNvPicPr>
+                <p:nvPr/>
+              </p:nvPicPr>
+              <p:blipFill>
+                <a:blip r:embed="rId2" cstate="print">
+                  <a:extLst>
+                    <a:ext uri="{28A0092B-C50C-407E-A947-70E740481C1C}">
+                      <a14:useLocalDpi xmlns:a14="http://schemas.microsoft.com/office/drawing/2010/main" val="0"/>
+                    </a:ext>
+                  </a:extLst>
+                </a:blip>
+                <a:stretch>
+                  <a:fillRect/>
+                </a:stretch>
+              </p:blipFill>
+              <p:spPr>
+                <a:xfrm>
+                  <a:off x="0" y="5358809"/>
+                  <a:ext cx="5400040" cy="5400040"/>
+                </a:xfrm>
+                <a:prstGeom prst="rect">
+                  <a:avLst/>
+                </a:prstGeom>
+              </p:spPr>
+            </p:pic>
+            <p:pic>
+              <p:nvPicPr>
+                <p:cNvPr id="24" name="Imagem 23"/>
+                <p:cNvPicPr>
+                  <a:picLocks noChangeAspect="1"/>
+                </p:cNvPicPr>
+                <p:nvPr/>
+              </p:nvPicPr>
+              <p:blipFill>
+                <a:blip r:embed="rId2" cstate="print">
+                  <a:extLst>
+                    <a:ext uri="{28A0092B-C50C-407E-A947-70E740481C1C}">
+                      <a14:useLocalDpi xmlns:a14="http://schemas.microsoft.com/office/drawing/2010/main" val="0"/>
+                    </a:ext>
+                  </a:extLst>
+                </a:blip>
+                <a:stretch>
+                  <a:fillRect/>
+                </a:stretch>
+              </p:blipFill>
+              <p:spPr>
+                <a:xfrm>
+                  <a:off x="5380074" y="0"/>
+                  <a:ext cx="5400040" cy="5400040"/>
+                </a:xfrm>
+                <a:prstGeom prst="rect">
+                  <a:avLst/>
+                </a:prstGeom>
+              </p:spPr>
+            </p:pic>
+            <p:pic>
+              <p:nvPicPr>
+                <p:cNvPr id="25" name="Imagem 24"/>
+                <p:cNvPicPr>
+                  <a:picLocks noChangeAspect="1"/>
+                </p:cNvPicPr>
+                <p:nvPr/>
+              </p:nvPicPr>
+              <p:blipFill>
+                <a:blip r:embed="rId2" cstate="print">
+                  <a:extLst>
+                    <a:ext uri="{28A0092B-C50C-407E-A947-70E740481C1C}">
+                      <a14:useLocalDpi xmlns:a14="http://schemas.microsoft.com/office/drawing/2010/main" val="0"/>
+                    </a:ext>
+                  </a:extLst>
+                </a:blip>
+                <a:stretch>
+                  <a:fillRect/>
+                </a:stretch>
+              </p:blipFill>
+              <p:spPr>
+                <a:xfrm>
+                  <a:off x="5358809" y="5358809"/>
+                  <a:ext cx="5400040" cy="5400040"/>
+                </a:xfrm>
+                <a:prstGeom prst="rect">
+                  <a:avLst/>
+                </a:prstGeom>
+              </p:spPr>
+            </p:pic>
+          </p:grpSp>
+          <p:grpSp>
+            <p:nvGrpSpPr>
+              <p:cNvPr id="17" name="Grupo 16"/>
+              <p:cNvGrpSpPr/>
+              <p:nvPr/>
+            </p:nvGrpSpPr>
+            <p:grpSpPr>
+              <a:xfrm>
+                <a:off x="0" y="10738883"/>
+                <a:ext cx="10779761" cy="10758805"/>
+                <a:chOff x="0" y="0"/>
+                <a:chExt cx="10780114" cy="10758849"/>
+              </a:xfrm>
+            </p:grpSpPr>
+            <p:pic>
+              <p:nvPicPr>
+                <p:cNvPr id="18" name="Imagem 17"/>
+                <p:cNvPicPr>
+                  <a:picLocks noChangeAspect="1"/>
+                </p:cNvPicPr>
+                <p:nvPr/>
+              </p:nvPicPr>
+              <p:blipFill>
+                <a:blip r:embed="rId2" cstate="print">
+                  <a:extLst>
+                    <a:ext uri="{28A0092B-C50C-407E-A947-70E740481C1C}">
+                      <a14:useLocalDpi xmlns:a14="http://schemas.microsoft.com/office/drawing/2010/main" val="0"/>
+                    </a:ext>
+                  </a:extLst>
+                </a:blip>
+                <a:stretch>
+                  <a:fillRect/>
+                </a:stretch>
+              </p:blipFill>
+              <p:spPr>
+                <a:xfrm>
+                  <a:off x="0" y="0"/>
+                  <a:ext cx="5400040" cy="5400040"/>
+                </a:xfrm>
+                <a:prstGeom prst="rect">
+                  <a:avLst/>
+                </a:prstGeom>
+              </p:spPr>
+            </p:pic>
+            <p:pic>
+              <p:nvPicPr>
+                <p:cNvPr id="19" name="Imagem 18"/>
+                <p:cNvPicPr>
+                  <a:picLocks noChangeAspect="1"/>
+                </p:cNvPicPr>
+                <p:nvPr/>
+              </p:nvPicPr>
+              <p:blipFill>
+                <a:blip r:embed="rId2" cstate="print">
+                  <a:extLst>
+                    <a:ext uri="{28A0092B-C50C-407E-A947-70E740481C1C}">
+                      <a14:useLocalDpi xmlns:a14="http://schemas.microsoft.com/office/drawing/2010/main" val="0"/>
+                    </a:ext>
+                  </a:extLst>
+                </a:blip>
+                <a:stretch>
+                  <a:fillRect/>
+                </a:stretch>
+              </p:blipFill>
+              <p:spPr>
+                <a:xfrm>
+                  <a:off x="0" y="5358809"/>
+                  <a:ext cx="5400040" cy="5400040"/>
+                </a:xfrm>
+                <a:prstGeom prst="rect">
+                  <a:avLst/>
+                </a:prstGeom>
+              </p:spPr>
+            </p:pic>
+            <p:pic>
+              <p:nvPicPr>
+                <p:cNvPr id="20" name="Imagem 19"/>
+                <p:cNvPicPr>
+                  <a:picLocks noChangeAspect="1"/>
+                </p:cNvPicPr>
+                <p:nvPr/>
+              </p:nvPicPr>
+              <p:blipFill>
+                <a:blip r:embed="rId2" cstate="print">
+                  <a:extLst>
+                    <a:ext uri="{28A0092B-C50C-407E-A947-70E740481C1C}">
+                      <a14:useLocalDpi xmlns:a14="http://schemas.microsoft.com/office/drawing/2010/main" val="0"/>
+                    </a:ext>
+                  </a:extLst>
+                </a:blip>
+                <a:stretch>
+                  <a:fillRect/>
+                </a:stretch>
+              </p:blipFill>
+              <p:spPr>
+                <a:xfrm>
+                  <a:off x="5380074" y="0"/>
+                  <a:ext cx="5400040" cy="5400040"/>
+                </a:xfrm>
+                <a:prstGeom prst="rect">
+                  <a:avLst/>
+                </a:prstGeom>
+              </p:spPr>
+            </p:pic>
+            <p:pic>
+              <p:nvPicPr>
+                <p:cNvPr id="21" name="Imagem 20"/>
+                <p:cNvPicPr>
+                  <a:picLocks noChangeAspect="1"/>
+                </p:cNvPicPr>
+                <p:nvPr/>
+              </p:nvPicPr>
+              <p:blipFill>
+                <a:blip r:embed="rId2" cstate="print">
+                  <a:extLst>
+                    <a:ext uri="{28A0092B-C50C-407E-A947-70E740481C1C}">
+                      <a14:useLocalDpi xmlns:a14="http://schemas.microsoft.com/office/drawing/2010/main" val="0"/>
+                    </a:ext>
+                  </a:extLst>
+                </a:blip>
+                <a:stretch>
+                  <a:fillRect/>
+                </a:stretch>
+              </p:blipFill>
+              <p:spPr>
+                <a:xfrm>
+                  <a:off x="5358809" y="5358809"/>
+                  <a:ext cx="5400040" cy="5400040"/>
+                </a:xfrm>
+                <a:prstGeom prst="rect">
+                  <a:avLst/>
+                </a:prstGeom>
+              </p:spPr>
+            </p:pic>
+          </p:grpSp>
+        </p:grpSp>
+        <p:grpSp>
+          <p:nvGrpSpPr>
+            <p:cNvPr id="26" name="Grupo 25"/>
+            <p:cNvGrpSpPr/>
+            <p:nvPr/>
+          </p:nvGrpSpPr>
+          <p:grpSpPr>
+            <a:xfrm>
+              <a:off x="-10133834" y="-7329606"/>
+              <a:ext cx="10779761" cy="21497290"/>
+              <a:chOff x="0" y="0"/>
+              <a:chExt cx="10779761" cy="21497688"/>
+            </a:xfrm>
+          </p:grpSpPr>
+          <p:grpSp>
+            <p:nvGrpSpPr>
+              <p:cNvPr id="27" name="Grupo 26"/>
+              <p:cNvGrpSpPr/>
+              <p:nvPr/>
+            </p:nvGrpSpPr>
+            <p:grpSpPr>
+              <a:xfrm>
+                <a:off x="0" y="0"/>
+                <a:ext cx="10779761" cy="10758805"/>
+                <a:chOff x="0" y="0"/>
+                <a:chExt cx="10780114" cy="10758849"/>
+              </a:xfrm>
+            </p:grpSpPr>
+            <p:pic>
+              <p:nvPicPr>
+                <p:cNvPr id="33" name="Imagem 32"/>
+                <p:cNvPicPr>
+                  <a:picLocks noChangeAspect="1"/>
+                </p:cNvPicPr>
+                <p:nvPr/>
+              </p:nvPicPr>
+              <p:blipFill>
+                <a:blip r:embed="rId2" cstate="print">
+                  <a:extLst>
+                    <a:ext uri="{28A0092B-C50C-407E-A947-70E740481C1C}">
+                      <a14:useLocalDpi xmlns:a14="http://schemas.microsoft.com/office/drawing/2010/main" val="0"/>
+                    </a:ext>
+                  </a:extLst>
+                </a:blip>
+                <a:stretch>
+                  <a:fillRect/>
+                </a:stretch>
+              </p:blipFill>
+              <p:spPr>
+                <a:xfrm>
+                  <a:off x="0" y="0"/>
+                  <a:ext cx="5400040" cy="5400040"/>
+                </a:xfrm>
+                <a:prstGeom prst="rect">
+                  <a:avLst/>
+                </a:prstGeom>
+              </p:spPr>
+            </p:pic>
+            <p:pic>
+              <p:nvPicPr>
+                <p:cNvPr id="34" name="Imagem 33"/>
+                <p:cNvPicPr>
+                  <a:picLocks noChangeAspect="1"/>
+                </p:cNvPicPr>
+                <p:nvPr/>
+              </p:nvPicPr>
+              <p:blipFill>
+                <a:blip r:embed="rId2" cstate="print">
+                  <a:extLst>
+                    <a:ext uri="{28A0092B-C50C-407E-A947-70E740481C1C}">
+                      <a14:useLocalDpi xmlns:a14="http://schemas.microsoft.com/office/drawing/2010/main" val="0"/>
+                    </a:ext>
+                  </a:extLst>
+                </a:blip>
+                <a:stretch>
+                  <a:fillRect/>
+                </a:stretch>
+              </p:blipFill>
+              <p:spPr>
+                <a:xfrm>
+                  <a:off x="0" y="5358809"/>
+                  <a:ext cx="5400040" cy="5400040"/>
+                </a:xfrm>
+                <a:prstGeom prst="rect">
+                  <a:avLst/>
+                </a:prstGeom>
+              </p:spPr>
+            </p:pic>
+            <p:pic>
+              <p:nvPicPr>
+                <p:cNvPr id="35" name="Imagem 34"/>
+                <p:cNvPicPr>
+                  <a:picLocks noChangeAspect="1"/>
+                </p:cNvPicPr>
+                <p:nvPr/>
+              </p:nvPicPr>
+              <p:blipFill>
+                <a:blip r:embed="rId2" cstate="print">
+                  <a:extLst>
+                    <a:ext uri="{28A0092B-C50C-407E-A947-70E740481C1C}">
+                      <a14:useLocalDpi xmlns:a14="http://schemas.microsoft.com/office/drawing/2010/main" val="0"/>
+                    </a:ext>
+                  </a:extLst>
+                </a:blip>
+                <a:stretch>
+                  <a:fillRect/>
+                </a:stretch>
+              </p:blipFill>
+              <p:spPr>
+                <a:xfrm>
+                  <a:off x="5380074" y="0"/>
+                  <a:ext cx="5400040" cy="5400040"/>
+                </a:xfrm>
+                <a:prstGeom prst="rect">
+                  <a:avLst/>
+                </a:prstGeom>
+              </p:spPr>
+            </p:pic>
+            <p:pic>
+              <p:nvPicPr>
+                <p:cNvPr id="36" name="Imagem 35"/>
+                <p:cNvPicPr>
+                  <a:picLocks noChangeAspect="1"/>
+                </p:cNvPicPr>
+                <p:nvPr/>
+              </p:nvPicPr>
+              <p:blipFill>
+                <a:blip r:embed="rId2" cstate="print">
+                  <a:extLst>
+                    <a:ext uri="{28A0092B-C50C-407E-A947-70E740481C1C}">
+                      <a14:useLocalDpi xmlns:a14="http://schemas.microsoft.com/office/drawing/2010/main" val="0"/>
+                    </a:ext>
+                  </a:extLst>
+                </a:blip>
+                <a:stretch>
+                  <a:fillRect/>
+                </a:stretch>
+              </p:blipFill>
+              <p:spPr>
+                <a:xfrm>
+                  <a:off x="5358809" y="5358809"/>
+                  <a:ext cx="5400040" cy="5400040"/>
+                </a:xfrm>
+                <a:prstGeom prst="rect">
+                  <a:avLst/>
+                </a:prstGeom>
+              </p:spPr>
+            </p:pic>
+          </p:grpSp>
+          <p:grpSp>
+            <p:nvGrpSpPr>
+              <p:cNvPr id="28" name="Grupo 27"/>
+              <p:cNvGrpSpPr/>
+              <p:nvPr/>
+            </p:nvGrpSpPr>
+            <p:grpSpPr>
+              <a:xfrm>
+                <a:off x="0" y="10738883"/>
+                <a:ext cx="10779761" cy="10758805"/>
+                <a:chOff x="0" y="0"/>
+                <a:chExt cx="10780114" cy="10758849"/>
+              </a:xfrm>
+            </p:grpSpPr>
+            <p:pic>
+              <p:nvPicPr>
+                <p:cNvPr id="29" name="Imagem 28"/>
+                <p:cNvPicPr>
+                  <a:picLocks noChangeAspect="1"/>
+                </p:cNvPicPr>
+                <p:nvPr/>
+              </p:nvPicPr>
+              <p:blipFill>
+                <a:blip r:embed="rId2" cstate="print">
+                  <a:extLst>
+                    <a:ext uri="{28A0092B-C50C-407E-A947-70E740481C1C}">
+                      <a14:useLocalDpi xmlns:a14="http://schemas.microsoft.com/office/drawing/2010/main" val="0"/>
+                    </a:ext>
+                  </a:extLst>
+                </a:blip>
+                <a:stretch>
+                  <a:fillRect/>
+                </a:stretch>
+              </p:blipFill>
+              <p:spPr>
+                <a:xfrm>
+                  <a:off x="0" y="0"/>
+                  <a:ext cx="5400040" cy="5400040"/>
+                </a:xfrm>
+                <a:prstGeom prst="rect">
+                  <a:avLst/>
+                </a:prstGeom>
+              </p:spPr>
+            </p:pic>
+            <p:pic>
+              <p:nvPicPr>
+                <p:cNvPr id="30" name="Imagem 29"/>
+                <p:cNvPicPr>
+                  <a:picLocks noChangeAspect="1"/>
+                </p:cNvPicPr>
+                <p:nvPr/>
+              </p:nvPicPr>
+              <p:blipFill>
+                <a:blip r:embed="rId2" cstate="print">
+                  <a:extLst>
+                    <a:ext uri="{28A0092B-C50C-407E-A947-70E740481C1C}">
+                      <a14:useLocalDpi xmlns:a14="http://schemas.microsoft.com/office/drawing/2010/main" val="0"/>
+                    </a:ext>
+                  </a:extLst>
+                </a:blip>
+                <a:stretch>
+                  <a:fillRect/>
+                </a:stretch>
+              </p:blipFill>
+              <p:spPr>
+                <a:xfrm>
+                  <a:off x="0" y="5358809"/>
+                  <a:ext cx="5400040" cy="5400040"/>
+                </a:xfrm>
+                <a:prstGeom prst="rect">
+                  <a:avLst/>
+                </a:prstGeom>
+              </p:spPr>
+            </p:pic>
+            <p:pic>
+              <p:nvPicPr>
+                <p:cNvPr id="31" name="Imagem 30"/>
+                <p:cNvPicPr>
+                  <a:picLocks noChangeAspect="1"/>
+                </p:cNvPicPr>
+                <p:nvPr/>
+              </p:nvPicPr>
+              <p:blipFill>
+                <a:blip r:embed="rId2" cstate="print">
+                  <a:extLst>
+                    <a:ext uri="{28A0092B-C50C-407E-A947-70E740481C1C}">
+                      <a14:useLocalDpi xmlns:a14="http://schemas.microsoft.com/office/drawing/2010/main" val="0"/>
+                    </a:ext>
+                  </a:extLst>
+                </a:blip>
+                <a:stretch>
+                  <a:fillRect/>
+                </a:stretch>
+              </p:blipFill>
+              <p:spPr>
+                <a:xfrm>
+                  <a:off x="5380074" y="0"/>
+                  <a:ext cx="5400040" cy="5400040"/>
+                </a:xfrm>
+                <a:prstGeom prst="rect">
+                  <a:avLst/>
+                </a:prstGeom>
+              </p:spPr>
+            </p:pic>
+            <p:pic>
+              <p:nvPicPr>
+                <p:cNvPr id="32" name="Imagem 31"/>
+                <p:cNvPicPr>
+                  <a:picLocks noChangeAspect="1"/>
+                </p:cNvPicPr>
+                <p:nvPr/>
+              </p:nvPicPr>
+              <p:blipFill>
+                <a:blip r:embed="rId2" cstate="print">
+                  <a:extLst>
+                    <a:ext uri="{28A0092B-C50C-407E-A947-70E740481C1C}">
+                      <a14:useLocalDpi xmlns:a14="http://schemas.microsoft.com/office/drawing/2010/main" val="0"/>
+                    </a:ext>
+                  </a:extLst>
+                </a:blip>
+                <a:stretch>
+                  <a:fillRect/>
+                </a:stretch>
+              </p:blipFill>
+              <p:spPr>
+                <a:xfrm>
+                  <a:off x="5358809" y="5358809"/>
+                  <a:ext cx="5400040" cy="5400040"/>
+                </a:xfrm>
+                <a:prstGeom prst="rect">
+                  <a:avLst/>
+                </a:prstGeom>
+              </p:spPr>
+            </p:pic>
+          </p:grpSp>
+        </p:grpSp>
+      </p:grpSp>
     </p:spTree>
     <p:extLst>
       <p:ext uri="{BB962C8B-B14F-4D97-AF65-F5344CB8AC3E}">

</xml_diff>